<commit_message>
Adding Phone_Keypad Problem for Recursion revision
</commit_message>
<xml_diff>
--- a/RecursionAndBacktracking/Recursion_Backtracking.pptx
+++ b/RecursionAndBacktracking/Recursion_Backtracking.pptx
@@ -7,6 +7,7 @@
   <p:sldIdLst>
     <p:sldId id="257" r:id="rId2"/>
     <p:sldId id="258" r:id="rId3"/>
+    <p:sldId id="259" r:id="rId4"/>
   </p:sldIdLst>
   <p:sldSz cx="12192000" cy="6858000"/>
   <p:notesSz cx="6858000" cy="9144000"/>
@@ -112,6 +113,7 @@
           <p14:sldIdLst>
             <p14:sldId id="257"/>
             <p14:sldId id="258"/>
+            <p14:sldId id="259"/>
           </p14:sldIdLst>
         </p14:section>
       </p14:sectionLst>
@@ -272,7 +274,7 @@
           <a:p>
             <a:fld id="{BDC0887E-30F6-48B0-B326-7E062E530290}" type="datetimeFigureOut">
               <a:rPr lang="en-IN" smtClean="0"/>
-              <a:t>31-01-2022</a:t>
+              <a:t>01-02-2022</a:t>
             </a:fld>
             <a:endParaRPr lang="en-IN"/>
           </a:p>
@@ -472,7 +474,7 @@
           <a:p>
             <a:fld id="{BDC0887E-30F6-48B0-B326-7E062E530290}" type="datetimeFigureOut">
               <a:rPr lang="en-IN" smtClean="0"/>
-              <a:t>31-01-2022</a:t>
+              <a:t>01-02-2022</a:t>
             </a:fld>
             <a:endParaRPr lang="en-IN"/>
           </a:p>
@@ -682,7 +684,7 @@
           <a:p>
             <a:fld id="{BDC0887E-30F6-48B0-B326-7E062E530290}" type="datetimeFigureOut">
               <a:rPr lang="en-IN" smtClean="0"/>
-              <a:t>31-01-2022</a:t>
+              <a:t>01-02-2022</a:t>
             </a:fld>
             <a:endParaRPr lang="en-IN"/>
           </a:p>
@@ -882,7 +884,7 @@
           <a:p>
             <a:fld id="{BDC0887E-30F6-48B0-B326-7E062E530290}" type="datetimeFigureOut">
               <a:rPr lang="en-IN" smtClean="0"/>
-              <a:t>31-01-2022</a:t>
+              <a:t>01-02-2022</a:t>
             </a:fld>
             <a:endParaRPr lang="en-IN"/>
           </a:p>
@@ -1158,7 +1160,7 @@
           <a:p>
             <a:fld id="{BDC0887E-30F6-48B0-B326-7E062E530290}" type="datetimeFigureOut">
               <a:rPr lang="en-IN" smtClean="0"/>
-              <a:t>31-01-2022</a:t>
+              <a:t>01-02-2022</a:t>
             </a:fld>
             <a:endParaRPr lang="en-IN"/>
           </a:p>
@@ -1426,7 +1428,7 @@
           <a:p>
             <a:fld id="{BDC0887E-30F6-48B0-B326-7E062E530290}" type="datetimeFigureOut">
               <a:rPr lang="en-IN" smtClean="0"/>
-              <a:t>31-01-2022</a:t>
+              <a:t>01-02-2022</a:t>
             </a:fld>
             <a:endParaRPr lang="en-IN"/>
           </a:p>
@@ -1841,7 +1843,7 @@
           <a:p>
             <a:fld id="{BDC0887E-30F6-48B0-B326-7E062E530290}" type="datetimeFigureOut">
               <a:rPr lang="en-IN" smtClean="0"/>
-              <a:t>31-01-2022</a:t>
+              <a:t>01-02-2022</a:t>
             </a:fld>
             <a:endParaRPr lang="en-IN"/>
           </a:p>
@@ -1983,7 +1985,7 @@
           <a:p>
             <a:fld id="{BDC0887E-30F6-48B0-B326-7E062E530290}" type="datetimeFigureOut">
               <a:rPr lang="en-IN" smtClean="0"/>
-              <a:t>31-01-2022</a:t>
+              <a:t>01-02-2022</a:t>
             </a:fld>
             <a:endParaRPr lang="en-IN"/>
           </a:p>
@@ -2096,7 +2098,7 @@
           <a:p>
             <a:fld id="{BDC0887E-30F6-48B0-B326-7E062E530290}" type="datetimeFigureOut">
               <a:rPr lang="en-IN" smtClean="0"/>
-              <a:t>31-01-2022</a:t>
+              <a:t>01-02-2022</a:t>
             </a:fld>
             <a:endParaRPr lang="en-IN"/>
           </a:p>
@@ -2409,7 +2411,7 @@
           <a:p>
             <a:fld id="{BDC0887E-30F6-48B0-B326-7E062E530290}" type="datetimeFigureOut">
               <a:rPr lang="en-IN" smtClean="0"/>
-              <a:t>31-01-2022</a:t>
+              <a:t>01-02-2022</a:t>
             </a:fld>
             <a:endParaRPr lang="en-IN"/>
           </a:p>
@@ -2698,7 +2700,7 @@
           <a:p>
             <a:fld id="{BDC0887E-30F6-48B0-B326-7E062E530290}" type="datetimeFigureOut">
               <a:rPr lang="en-IN" smtClean="0"/>
-              <a:t>31-01-2022</a:t>
+              <a:t>01-02-2022</a:t>
             </a:fld>
             <a:endParaRPr lang="en-IN"/>
           </a:p>
@@ -2941,7 +2943,7 @@
           <a:p>
             <a:fld id="{BDC0887E-30F6-48B0-B326-7E062E530290}" type="datetimeFigureOut">
               <a:rPr lang="en-IN" smtClean="0"/>
-              <a:t>31-01-2022</a:t>
+              <a:t>01-02-2022</a:t>
             </a:fld>
             <a:endParaRPr lang="en-IN"/>
           </a:p>
@@ -5617,10 +5619,703 @@
           </a:p>
         </p:txBody>
       </p:sp>
+      <p:sp>
+        <p:nvSpPr>
+          <p:cNvPr id="3" name="TextBox 2">
+            <a:extLst>
+              <a:ext uri="{FF2B5EF4-FFF2-40B4-BE49-F238E27FC236}">
+                <a16:creationId xmlns:a16="http://schemas.microsoft.com/office/drawing/2014/main" id="{B42F3AB1-BE10-4C64-BA23-E53A7C7F542B}"/>
+              </a:ext>
+            </a:extLst>
+          </p:cNvPr>
+          <p:cNvSpPr txBox="1"/>
+          <p:nvPr/>
+        </p:nvSpPr>
+        <p:spPr>
+          <a:xfrm>
+            <a:off x="7221196" y="4135860"/>
+            <a:ext cx="4623275" cy="784830"/>
+          </a:xfrm>
+          <a:prstGeom prst="rect">
+            <a:avLst/>
+          </a:prstGeom>
+          <a:noFill/>
+        </p:spPr>
+        <p:txBody>
+          <a:bodyPr wrap="square" rtlCol="0">
+            <a:spAutoFit/>
+          </a:bodyPr>
+          <a:lstStyle/>
+          <a:p>
+            <a:r>
+              <a:rPr lang="en-IN" dirty="0"/>
+              <a:t>Code : </a:t>
+            </a:r>
+            <a:r>
+              <a:rPr lang="en-IN" sz="900" dirty="0">
+                <a:hlinkClick r:id="rId10"/>
+              </a:rPr>
+              <a:t>https://github.com/abmishra1234/4AM_Club_Coding/tree/main/RecursionAndBacktracking</a:t>
+            </a:r>
+            <a:endParaRPr lang="en-IN" sz="900" dirty="0"/>
+          </a:p>
+          <a:p>
+            <a:endParaRPr lang="en-IN" dirty="0"/>
+          </a:p>
+        </p:txBody>
+      </p:sp>
     </p:spTree>
     <p:extLst>
       <p:ext uri="{BB962C8B-B14F-4D97-AF65-F5344CB8AC3E}">
         <p14:creationId xmlns:p14="http://schemas.microsoft.com/office/powerpoint/2010/main" val="1687135795"/>
+      </p:ext>
+    </p:extLst>
+  </p:cSld>
+  <p:clrMapOvr>
+    <a:masterClrMapping/>
+  </p:clrMapOvr>
+</p:sld>
+</file>
+
+<file path=ppt/slides/slide3.xml><?xml version="1.0" encoding="utf-8"?>
+<p:sld xmlns:a="http://schemas.openxmlformats.org/drawingml/2006/main" xmlns:r="http://schemas.openxmlformats.org/officeDocument/2006/relationships" xmlns:p="http://schemas.openxmlformats.org/presentationml/2006/main">
+  <p:cSld>
+    <p:spTree>
+      <p:nvGrpSpPr>
+        <p:cNvPr id="1" name=""/>
+        <p:cNvGrpSpPr/>
+        <p:nvPr/>
+      </p:nvGrpSpPr>
+      <p:grpSpPr>
+        <a:xfrm>
+          <a:off x="0" y="0"/>
+          <a:ext cx="0" cy="0"/>
+          <a:chOff x="0" y="0"/>
+          <a:chExt cx="0" cy="0"/>
+        </a:xfrm>
+      </p:grpSpPr>
+      <p:sp>
+        <p:nvSpPr>
+          <p:cNvPr id="6" name="Rectangle 5">
+            <a:extLst>
+              <a:ext uri="{FF2B5EF4-FFF2-40B4-BE49-F238E27FC236}">
+                <a16:creationId xmlns:a16="http://schemas.microsoft.com/office/drawing/2014/main" id="{23D9A284-E705-4058-BC97-E411758071E2}"/>
+              </a:ext>
+            </a:extLst>
+          </p:cNvPr>
+          <p:cNvSpPr/>
+          <p:nvPr/>
+        </p:nvSpPr>
+        <p:spPr>
+          <a:xfrm>
+            <a:off x="0" y="0"/>
+            <a:ext cx="12192000" cy="623843"/>
+          </a:xfrm>
+          <a:prstGeom prst="rect">
+            <a:avLst/>
+          </a:prstGeom>
+        </p:spPr>
+        <p:style>
+          <a:lnRef idx="2">
+            <a:schemeClr val="accent1">
+              <a:shade val="50000"/>
+            </a:schemeClr>
+          </a:lnRef>
+          <a:fillRef idx="1">
+            <a:schemeClr val="accent1"/>
+          </a:fillRef>
+          <a:effectRef idx="0">
+            <a:schemeClr val="accent1"/>
+          </a:effectRef>
+          <a:fontRef idx="minor">
+            <a:schemeClr val="lt1"/>
+          </a:fontRef>
+        </p:style>
+        <p:txBody>
+          <a:bodyPr rtlCol="0" anchor="ctr"/>
+          <a:lstStyle/>
+          <a:p>
+            <a:pPr algn="ctr"/>
+            <a:endParaRPr lang="en-IN" b="1" i="0" dirty="0">
+              <a:effectLst/>
+              <a:latin typeface="Nunito Sans" pitchFamily="2" charset="0"/>
+            </a:endParaRPr>
+          </a:p>
+          <a:p>
+            <a:pPr algn="ctr"/>
+            <a:r>
+              <a:rPr lang="en-IN" b="1" dirty="0">
+                <a:latin typeface="Nunito Sans" pitchFamily="2" charset="0"/>
+              </a:rPr>
+              <a:t>Problem – Phone keypad problem</a:t>
+            </a:r>
+            <a:endParaRPr lang="en-IN" b="1" i="0" dirty="0">
+              <a:effectLst/>
+              <a:latin typeface="Nunito Sans" pitchFamily="2" charset="0"/>
+            </a:endParaRPr>
+          </a:p>
+          <a:p>
+            <a:pPr algn="ctr"/>
+            <a:endParaRPr lang="en-IN" dirty="0"/>
+          </a:p>
+        </p:txBody>
+      </p:sp>
+      <p:sp>
+        <p:nvSpPr>
+          <p:cNvPr id="2" name="Rectangle 1">
+            <a:extLst>
+              <a:ext uri="{FF2B5EF4-FFF2-40B4-BE49-F238E27FC236}">
+                <a16:creationId xmlns:a16="http://schemas.microsoft.com/office/drawing/2014/main" id="{92FC7832-74DA-4590-8BF7-CB38914B9190}"/>
+              </a:ext>
+            </a:extLst>
+          </p:cNvPr>
+          <p:cNvSpPr/>
+          <p:nvPr/>
+        </p:nvSpPr>
+        <p:spPr>
+          <a:xfrm>
+            <a:off x="101600" y="749826"/>
+            <a:ext cx="11977511" cy="5662263"/>
+          </a:xfrm>
+          <a:prstGeom prst="rect">
+            <a:avLst/>
+          </a:prstGeom>
+          <a:noFill/>
+          <a:ln w="9525" cap="flat" cmpd="sng" algn="ctr">
+            <a:solidFill>
+              <a:schemeClr val="accent3"/>
+            </a:solidFill>
+            <a:prstDash val="solid"/>
+            <a:round/>
+            <a:headEnd type="none" w="med" len="med"/>
+            <a:tailEnd type="none" w="med" len="med"/>
+          </a:ln>
+        </p:spPr>
+        <p:style>
+          <a:lnRef idx="0">
+            <a:scrgbClr r="0" g="0" b="0"/>
+          </a:lnRef>
+          <a:fillRef idx="0">
+            <a:scrgbClr r="0" g="0" b="0"/>
+          </a:fillRef>
+          <a:effectRef idx="0">
+            <a:scrgbClr r="0" g="0" b="0"/>
+          </a:effectRef>
+          <a:fontRef idx="minor">
+            <a:schemeClr val="accent3"/>
+          </a:fontRef>
+        </p:style>
+        <p:txBody>
+          <a:bodyPr rtlCol="0" anchor="ctr"/>
+          <a:lstStyle/>
+          <a:p>
+            <a:pPr algn="ctr"/>
+            <a:endParaRPr lang="en-IN"/>
+          </a:p>
+        </p:txBody>
+      </p:sp>
+      <p:pic>
+        <p:nvPicPr>
+          <p:cNvPr id="9" name="Picture 8">
+            <a:extLst>
+              <a:ext uri="{FF2B5EF4-FFF2-40B4-BE49-F238E27FC236}">
+                <a16:creationId xmlns:a16="http://schemas.microsoft.com/office/drawing/2014/main" id="{A4B6963B-B3D9-4C0A-A349-B46E7FBCC292}"/>
+              </a:ext>
+            </a:extLst>
+          </p:cNvPr>
+          <p:cNvPicPr>
+            <a:picLocks noChangeAspect="1"/>
+          </p:cNvPicPr>
+          <p:nvPr/>
+        </p:nvPicPr>
+        <p:blipFill>
+          <a:blip r:embed="rId2"/>
+          <a:stretch>
+            <a:fillRect/>
+          </a:stretch>
+        </p:blipFill>
+        <p:spPr>
+          <a:xfrm>
+            <a:off x="8244475" y="1326339"/>
+            <a:ext cx="3372321" cy="3743847"/>
+          </a:xfrm>
+          <a:prstGeom prst="rect">
+            <a:avLst/>
+          </a:prstGeom>
+        </p:spPr>
+      </p:pic>
+      <p:sp>
+        <p:nvSpPr>
+          <p:cNvPr id="13" name="TextBox 12">
+            <a:extLst>
+              <a:ext uri="{FF2B5EF4-FFF2-40B4-BE49-F238E27FC236}">
+                <a16:creationId xmlns:a16="http://schemas.microsoft.com/office/drawing/2014/main" id="{85D22AC9-DFC3-4A6B-A1C9-C6410C69CB95}"/>
+              </a:ext>
+            </a:extLst>
+          </p:cNvPr>
+          <p:cNvSpPr txBox="1"/>
+          <p:nvPr/>
+        </p:nvSpPr>
+        <p:spPr>
+          <a:xfrm>
+            <a:off x="299103" y="965675"/>
+            <a:ext cx="7483057" cy="4493538"/>
+          </a:xfrm>
+          <a:prstGeom prst="rect">
+            <a:avLst/>
+          </a:prstGeom>
+          <a:noFill/>
+        </p:spPr>
+        <p:txBody>
+          <a:bodyPr wrap="square" rtlCol="0">
+            <a:spAutoFit/>
+          </a:bodyPr>
+          <a:lstStyle/>
+          <a:p>
+            <a:r>
+              <a:rPr lang="en-IN" sz="1000" b="1" i="0" dirty="0">
+                <a:solidFill>
+                  <a:srgbClr val="000000"/>
+                </a:solidFill>
+                <a:effectLst/>
+                <a:latin typeface="Century Gothic" panose="020B0502020202020204" pitchFamily="34" charset="0"/>
+              </a:rPr>
+              <a:t>Phone Keypad Problem</a:t>
+            </a:r>
+          </a:p>
+          <a:p>
+            <a:r>
+              <a:rPr lang="en-US" sz="1000" b="0" i="0" dirty="0">
+                <a:solidFill>
+                  <a:srgbClr val="3D3D4E"/>
+                </a:solidFill>
+                <a:effectLst/>
+                <a:latin typeface="Century Gothic" panose="020B0502020202020204" pitchFamily="34" charset="0"/>
+              </a:rPr>
+              <a:t>Before the advent of </a:t>
+            </a:r>
+            <a:r>
+              <a:rPr lang="en-US" sz="1000" b="1" i="0" dirty="0">
+                <a:solidFill>
+                  <a:srgbClr val="3D3D4E"/>
+                </a:solidFill>
+                <a:effectLst/>
+                <a:latin typeface="Century Gothic" panose="020B0502020202020204" pitchFamily="34" charset="0"/>
+              </a:rPr>
+              <a:t>QWERTY</a:t>
+            </a:r>
+            <a:r>
+              <a:rPr lang="en-US" sz="1000" b="0" i="0" dirty="0">
+                <a:solidFill>
+                  <a:srgbClr val="3D3D4E"/>
+                </a:solidFill>
+                <a:effectLst/>
+                <a:latin typeface="Century Gothic" panose="020B0502020202020204" pitchFamily="34" charset="0"/>
+              </a:rPr>
+              <a:t> keyboards, texts and numbers were placed on the same key. For example, </a:t>
+            </a:r>
+            <a:r>
+              <a:rPr lang="en-US" sz="1000" b="1" i="0" dirty="0">
+                <a:solidFill>
+                  <a:srgbClr val="3D3D4E"/>
+                </a:solidFill>
+                <a:effectLst/>
+                <a:latin typeface="Century Gothic" panose="020B0502020202020204" pitchFamily="34" charset="0"/>
+              </a:rPr>
+              <a:t>2</a:t>
+            </a:r>
+            <a:r>
+              <a:rPr lang="en-US" sz="1000" b="0" i="0" dirty="0">
+                <a:solidFill>
+                  <a:srgbClr val="3D3D4E"/>
+                </a:solidFill>
+                <a:effectLst/>
+                <a:latin typeface="Century Gothic" panose="020B0502020202020204" pitchFamily="34" charset="0"/>
+              </a:rPr>
+              <a:t> had </a:t>
+            </a:r>
+            <a:r>
+              <a:rPr lang="en-US" sz="1000" b="1" i="0" dirty="0">
+                <a:solidFill>
+                  <a:srgbClr val="3D3D4E"/>
+                </a:solidFill>
+                <a:effectLst/>
+                <a:latin typeface="Century Gothic" panose="020B0502020202020204" pitchFamily="34" charset="0"/>
+              </a:rPr>
+              <a:t>ABC</a:t>
+            </a:r>
+            <a:r>
+              <a:rPr lang="en-US" sz="1000" b="0" i="0" dirty="0">
+                <a:solidFill>
+                  <a:srgbClr val="3D3D4E"/>
+                </a:solidFill>
+                <a:effectLst/>
+                <a:latin typeface="Century Gothic" panose="020B0502020202020204" pitchFamily="34" charset="0"/>
+              </a:rPr>
+              <a:t> and if we wanted to write anything starting with </a:t>
+            </a:r>
+            <a:r>
+              <a:rPr lang="en-US" sz="1000" b="1" i="0" dirty="0">
+                <a:solidFill>
+                  <a:srgbClr val="3D3D4E"/>
+                </a:solidFill>
+                <a:effectLst/>
+                <a:latin typeface="Century Gothic" panose="020B0502020202020204" pitchFamily="34" charset="0"/>
+              </a:rPr>
+              <a:t>A</a:t>
+            </a:r>
+            <a:r>
+              <a:rPr lang="en-US" sz="1000" b="0" i="0" dirty="0">
+                <a:solidFill>
+                  <a:srgbClr val="3D3D4E"/>
+                </a:solidFill>
+                <a:effectLst/>
+                <a:latin typeface="Century Gothic" panose="020B0502020202020204" pitchFamily="34" charset="0"/>
+              </a:rPr>
+              <a:t>, we needed to type key </a:t>
+            </a:r>
+            <a:r>
+              <a:rPr lang="en-US" sz="1000" b="1" i="0" dirty="0">
+                <a:solidFill>
+                  <a:srgbClr val="3D3D4E"/>
+                </a:solidFill>
+                <a:effectLst/>
+                <a:latin typeface="Century Gothic" panose="020B0502020202020204" pitchFamily="34" charset="0"/>
+              </a:rPr>
+              <a:t>2</a:t>
+            </a:r>
+            <a:r>
+              <a:rPr lang="en-US" sz="1000" b="0" i="0" dirty="0">
+                <a:solidFill>
+                  <a:srgbClr val="3D3D4E"/>
+                </a:solidFill>
+                <a:effectLst/>
+                <a:latin typeface="Century Gothic" panose="020B0502020202020204" pitchFamily="34" charset="0"/>
+              </a:rPr>
+              <a:t> once. If we wanted to type </a:t>
+            </a:r>
+            <a:r>
+              <a:rPr lang="en-US" sz="1000" b="1" i="0" dirty="0">
+                <a:solidFill>
+                  <a:srgbClr val="3D3D4E"/>
+                </a:solidFill>
+                <a:effectLst/>
+                <a:latin typeface="Century Gothic" panose="020B0502020202020204" pitchFamily="34" charset="0"/>
+              </a:rPr>
+              <a:t>B</a:t>
+            </a:r>
+            <a:r>
+              <a:rPr lang="en-US" sz="1000" b="0" i="0" dirty="0">
+                <a:solidFill>
+                  <a:srgbClr val="3D3D4E"/>
+                </a:solidFill>
+                <a:effectLst/>
+                <a:latin typeface="Century Gothic" panose="020B0502020202020204" pitchFamily="34" charset="0"/>
+              </a:rPr>
+              <a:t>, key </a:t>
+            </a:r>
+            <a:r>
+              <a:rPr lang="en-US" sz="1000" b="1" i="0" dirty="0">
+                <a:solidFill>
+                  <a:srgbClr val="3D3D4E"/>
+                </a:solidFill>
+                <a:effectLst/>
+                <a:latin typeface="Century Gothic" panose="020B0502020202020204" pitchFamily="34" charset="0"/>
+              </a:rPr>
+              <a:t>2</a:t>
+            </a:r>
+            <a:r>
+              <a:rPr lang="en-US" sz="1000" b="0" i="0" dirty="0">
+                <a:solidFill>
+                  <a:srgbClr val="3D3D4E"/>
+                </a:solidFill>
+                <a:effectLst/>
+                <a:latin typeface="Century Gothic" panose="020B0502020202020204" pitchFamily="34" charset="0"/>
+              </a:rPr>
+              <a:t> had to be pressed twice, and thrice for typing </a:t>
+            </a:r>
+            <a:r>
+              <a:rPr lang="en-US" sz="1000" b="1" i="0" dirty="0">
+                <a:solidFill>
+                  <a:srgbClr val="3D3D4E"/>
+                </a:solidFill>
+                <a:effectLst/>
+                <a:latin typeface="Century Gothic" panose="020B0502020202020204" pitchFamily="34" charset="0"/>
+              </a:rPr>
+              <a:t>C</a:t>
+            </a:r>
+            <a:r>
+              <a:rPr lang="en-US" sz="1000" b="0" i="0" dirty="0">
+                <a:solidFill>
+                  <a:srgbClr val="3D3D4E"/>
+                </a:solidFill>
+                <a:effectLst/>
+                <a:latin typeface="Century Gothic" panose="020B0502020202020204" pitchFamily="34" charset="0"/>
+              </a:rPr>
+              <a:t>. </a:t>
+            </a:r>
+          </a:p>
+          <a:p>
+            <a:endParaRPr lang="en-US" sz="1000" dirty="0">
+              <a:solidFill>
+                <a:srgbClr val="3D3D4E"/>
+              </a:solidFill>
+              <a:latin typeface="Century Gothic" panose="020B0502020202020204" pitchFamily="34" charset="0"/>
+            </a:endParaRPr>
+          </a:p>
+          <a:p>
+            <a:r>
+              <a:rPr lang="en-US" sz="1000" b="0" i="0" dirty="0">
+                <a:solidFill>
+                  <a:srgbClr val="3D3D4E"/>
+                </a:solidFill>
+                <a:effectLst/>
+                <a:latin typeface="Century Gothic" panose="020B0502020202020204" pitchFamily="34" charset="0"/>
+              </a:rPr>
+              <a:t>		</a:t>
+            </a:r>
+            <a:r>
+              <a:rPr lang="en-US" sz="1000" b="1" i="0" dirty="0">
+                <a:solidFill>
+                  <a:srgbClr val="3D3D4E"/>
+                </a:solidFill>
+                <a:effectLst/>
+                <a:latin typeface="Century Gothic" panose="020B0502020202020204" pitchFamily="34" charset="0"/>
+              </a:rPr>
+              <a:t>Right side is a picture of such a keypad</a:t>
+            </a:r>
+            <a:r>
+              <a:rPr lang="en-US" sz="1000" b="0" i="0" dirty="0">
+                <a:solidFill>
+                  <a:srgbClr val="3D3D4E"/>
+                </a:solidFill>
+                <a:effectLst/>
+                <a:latin typeface="Century Gothic" panose="020B0502020202020204" pitchFamily="34" charset="0"/>
+              </a:rPr>
+              <a:t>.</a:t>
+            </a:r>
+          </a:p>
+          <a:p>
+            <a:endParaRPr lang="en-US" sz="1000" dirty="0">
+              <a:solidFill>
+                <a:srgbClr val="3D3D4E"/>
+              </a:solidFill>
+              <a:latin typeface="Century Gothic" panose="020B0502020202020204" pitchFamily="34" charset="0"/>
+            </a:endParaRPr>
+          </a:p>
+          <a:p>
+            <a:r>
+              <a:rPr lang="en-US" sz="1000" dirty="0">
+                <a:solidFill>
+                  <a:srgbClr val="3D3D4E"/>
+                </a:solidFill>
+                <a:latin typeface="Century Gothic" panose="020B0502020202020204" pitchFamily="34" charset="0"/>
+              </a:rPr>
+              <a:t>Given a keypad as shown in the diagram, and an n digit number, list all possible words by pressing these numbers.</a:t>
+            </a:r>
+          </a:p>
+          <a:p>
+            <a:endParaRPr lang="en-US" sz="1000" dirty="0">
+              <a:solidFill>
+                <a:srgbClr val="3D3D4E"/>
+              </a:solidFill>
+              <a:latin typeface="Century Gothic" panose="020B0502020202020204" pitchFamily="34" charset="0"/>
+            </a:endParaRPr>
+          </a:p>
+          <a:p>
+            <a:r>
+              <a:rPr lang="en-US" sz="1000" dirty="0">
+                <a:solidFill>
+                  <a:srgbClr val="3D3D4E"/>
+                </a:solidFill>
+                <a:latin typeface="Century Gothic" panose="020B0502020202020204" pitchFamily="34" charset="0"/>
+              </a:rPr>
+              <a:t>For example, </a:t>
+            </a:r>
+          </a:p>
+          <a:p>
+            <a:r>
+              <a:rPr lang="en-US" sz="1000" dirty="0">
+                <a:solidFill>
+                  <a:srgbClr val="3D3D4E"/>
+                </a:solidFill>
+                <a:latin typeface="Century Gothic" panose="020B0502020202020204" pitchFamily="34" charset="0"/>
+              </a:rPr>
+              <a:t>the value of n = 234. </a:t>
+            </a:r>
+          </a:p>
+          <a:p>
+            <a:r>
+              <a:rPr lang="en-US" sz="1000" dirty="0">
+                <a:solidFill>
+                  <a:srgbClr val="3D3D4E"/>
+                </a:solidFill>
+                <a:latin typeface="Century Gothic" panose="020B0502020202020204" pitchFamily="34" charset="0"/>
+              </a:rPr>
+              <a:t>Then, we can generate the following words: total 27 words can be formed from this</a:t>
+            </a:r>
+          </a:p>
+          <a:p>
+            <a:endParaRPr lang="en-US" sz="1000" dirty="0">
+              <a:solidFill>
+                <a:srgbClr val="3D3D4E"/>
+              </a:solidFill>
+              <a:latin typeface="Century Gothic" panose="020B0502020202020204" pitchFamily="34" charset="0"/>
+            </a:endParaRPr>
+          </a:p>
+          <a:p>
+            <a:r>
+              <a:rPr lang="en-US" sz="1000" dirty="0">
+                <a:solidFill>
+                  <a:srgbClr val="3D3D4E"/>
+                </a:solidFill>
+                <a:latin typeface="Century Gothic" panose="020B0502020202020204" pitchFamily="34" charset="0"/>
+              </a:rPr>
+              <a:t>adg adh adi aeg aeh aei afg afh afi bdg bdh bdi beg beh bei bfg bfh bfi cdg cdh cdi ceg ceh cei cfg cfh cfi</a:t>
+            </a:r>
+          </a:p>
+          <a:p>
+            <a:endParaRPr lang="en-US" sz="1000" dirty="0">
+              <a:solidFill>
+                <a:srgbClr val="3D3D4E"/>
+              </a:solidFill>
+              <a:latin typeface="Century Gothic" panose="020B0502020202020204" pitchFamily="34" charset="0"/>
+            </a:endParaRPr>
+          </a:p>
+          <a:p>
+            <a:r>
+              <a:rPr lang="en-US" sz="1000" b="1" dirty="0">
+                <a:solidFill>
+                  <a:srgbClr val="3D3D4E"/>
+                </a:solidFill>
+                <a:latin typeface="Century Gothic" panose="020B0502020202020204" pitchFamily="34" charset="0"/>
+              </a:rPr>
+              <a:t>Solution ( Recursive Approach)</a:t>
+            </a:r>
+          </a:p>
+          <a:p>
+            <a:endParaRPr lang="en-US" sz="1000" b="0" i="0" dirty="0">
+              <a:solidFill>
+                <a:srgbClr val="3D3D4E"/>
+              </a:solidFill>
+              <a:effectLst/>
+              <a:latin typeface="Century Gothic" panose="020B0502020202020204" pitchFamily="34" charset="0"/>
+            </a:endParaRPr>
+          </a:p>
+          <a:p>
+            <a:r>
+              <a:rPr lang="en-US" sz="1000" b="0" i="0" dirty="0">
+                <a:solidFill>
+                  <a:srgbClr val="3D3D4E"/>
+                </a:solidFill>
+                <a:effectLst/>
+                <a:latin typeface="Century Gothic" panose="020B0502020202020204" pitchFamily="34" charset="0"/>
+              </a:rPr>
+              <a:t>It can be observed that each digit can represent 3 to 4 different alphabets (apart from 0 and 1). </a:t>
+            </a:r>
+            <a:endParaRPr lang="en-US" sz="1000" b="1" dirty="0">
+              <a:solidFill>
+                <a:srgbClr val="3D3D4E"/>
+              </a:solidFill>
+              <a:latin typeface="Century Gothic" panose="020B0502020202020204" pitchFamily="34" charset="0"/>
+            </a:endParaRPr>
+          </a:p>
+          <a:p>
+            <a:r>
+              <a:rPr lang="en-US" sz="1000" dirty="0">
+                <a:solidFill>
+                  <a:srgbClr val="3D3D4E"/>
+                </a:solidFill>
+                <a:latin typeface="Century Gothic" panose="020B0502020202020204" pitchFamily="34" charset="0"/>
+              </a:rPr>
+              <a:t>The Idea is to form a recursive function. Map the number with its string of probable alphabets, i.e., 2 with ABC, 3 with DEF,  etc. The recursive function will try all the alphabets mapped to the current digit in alphabetic order and again call the recursive function for the next digit and print the current output string.</a:t>
+            </a:r>
+          </a:p>
+          <a:p>
+            <a:endParaRPr lang="en-US" sz="1000" dirty="0">
+              <a:solidFill>
+                <a:srgbClr val="3D3D4E"/>
+              </a:solidFill>
+              <a:latin typeface="Century Gothic" panose="020B0502020202020204" pitchFamily="34" charset="0"/>
+            </a:endParaRPr>
+          </a:p>
+          <a:p>
+            <a:endParaRPr lang="en-US" sz="1000" dirty="0">
+              <a:solidFill>
+                <a:srgbClr val="3D3D4E"/>
+              </a:solidFill>
+              <a:latin typeface="Century Gothic" panose="020B0502020202020204" pitchFamily="34" charset="0"/>
+            </a:endParaRPr>
+          </a:p>
+          <a:p>
+            <a:endParaRPr lang="en-US" sz="1000" dirty="0">
+              <a:solidFill>
+                <a:srgbClr val="3D3D4E"/>
+              </a:solidFill>
+              <a:latin typeface="Century Gothic" panose="020B0502020202020204" pitchFamily="34" charset="0"/>
+            </a:endParaRPr>
+          </a:p>
+          <a:p>
+            <a:endParaRPr lang="en-US" sz="1000" dirty="0">
+              <a:solidFill>
+                <a:srgbClr val="3D3D4E"/>
+              </a:solidFill>
+              <a:latin typeface="Century Gothic" panose="020B0502020202020204" pitchFamily="34" charset="0"/>
+            </a:endParaRPr>
+          </a:p>
+          <a:p>
+            <a:endParaRPr lang="en-IN" dirty="0"/>
+          </a:p>
+          <a:p>
+            <a:endParaRPr lang="en-IN" dirty="0"/>
+          </a:p>
+        </p:txBody>
+      </p:sp>
+      <p:cxnSp>
+        <p:nvCxnSpPr>
+          <p:cNvPr id="21" name="Straight Arrow Connector 20">
+            <a:extLst>
+              <a:ext uri="{FF2B5EF4-FFF2-40B4-BE49-F238E27FC236}">
+                <a16:creationId xmlns:a16="http://schemas.microsoft.com/office/drawing/2014/main" id="{C924DA27-3BAF-4215-B868-BD15B7A67EB7}"/>
+              </a:ext>
+            </a:extLst>
+          </p:cNvPr>
+          <p:cNvCxnSpPr>
+            <a:cxnSpLocks/>
+          </p:cNvCxnSpPr>
+          <p:nvPr/>
+        </p:nvCxnSpPr>
+        <p:spPr>
+          <a:xfrm>
+            <a:off x="4674550" y="1854437"/>
+            <a:ext cx="3819970" cy="126900"/>
+          </a:xfrm>
+          <a:prstGeom prst="straightConnector1">
+            <a:avLst/>
+          </a:prstGeom>
+          <a:ln>
+            <a:tailEnd type="triangle"/>
+          </a:ln>
+        </p:spPr>
+        <p:style>
+          <a:lnRef idx="3">
+            <a:schemeClr val="accent3"/>
+          </a:lnRef>
+          <a:fillRef idx="0">
+            <a:schemeClr val="accent3"/>
+          </a:fillRef>
+          <a:effectRef idx="2">
+            <a:schemeClr val="accent3"/>
+          </a:effectRef>
+          <a:fontRef idx="minor">
+            <a:schemeClr val="tx1"/>
+          </a:fontRef>
+        </p:style>
+      </p:cxnSp>
+    </p:spTree>
+    <p:extLst>
+      <p:ext uri="{BB962C8B-B14F-4D97-AF65-F5344CB8AC3E}">
+        <p14:creationId xmlns:p14="http://schemas.microsoft.com/office/powerpoint/2010/main" val="2506123877"/>
       </p:ext>
     </p:extLst>
   </p:cSld>

</xml_diff>

<commit_message>
NQueen Problem, very standard problem but worth to revise it.
</commit_message>
<xml_diff>
--- a/RecursionAndBacktracking/Recursion_Backtracking.pptx
+++ b/RecursionAndBacktracking/Recursion_Backtracking.pptx
@@ -8,6 +8,7 @@
     <p:sldId id="257" r:id="rId2"/>
     <p:sldId id="258" r:id="rId3"/>
     <p:sldId id="259" r:id="rId4"/>
+    <p:sldId id="260" r:id="rId5"/>
   </p:sldIdLst>
   <p:sldSz cx="12192000" cy="6858000"/>
   <p:notesSz cx="6858000" cy="9144000"/>
@@ -114,6 +115,7 @@
             <p14:sldId id="257"/>
             <p14:sldId id="258"/>
             <p14:sldId id="259"/>
+            <p14:sldId id="260"/>
           </p14:sldIdLst>
         </p14:section>
       </p14:sectionLst>
@@ -274,7 +276,7 @@
           <a:p>
             <a:fld id="{BDC0887E-30F6-48B0-B326-7E062E530290}" type="datetimeFigureOut">
               <a:rPr lang="en-IN" smtClean="0"/>
-              <a:t>01-02-2022</a:t>
+              <a:t>02-02-2022</a:t>
             </a:fld>
             <a:endParaRPr lang="en-IN"/>
           </a:p>
@@ -474,7 +476,7 @@
           <a:p>
             <a:fld id="{BDC0887E-30F6-48B0-B326-7E062E530290}" type="datetimeFigureOut">
               <a:rPr lang="en-IN" smtClean="0"/>
-              <a:t>01-02-2022</a:t>
+              <a:t>02-02-2022</a:t>
             </a:fld>
             <a:endParaRPr lang="en-IN"/>
           </a:p>
@@ -684,7 +686,7 @@
           <a:p>
             <a:fld id="{BDC0887E-30F6-48B0-B326-7E062E530290}" type="datetimeFigureOut">
               <a:rPr lang="en-IN" smtClean="0"/>
-              <a:t>01-02-2022</a:t>
+              <a:t>02-02-2022</a:t>
             </a:fld>
             <a:endParaRPr lang="en-IN"/>
           </a:p>
@@ -884,7 +886,7 @@
           <a:p>
             <a:fld id="{BDC0887E-30F6-48B0-B326-7E062E530290}" type="datetimeFigureOut">
               <a:rPr lang="en-IN" smtClean="0"/>
-              <a:t>01-02-2022</a:t>
+              <a:t>02-02-2022</a:t>
             </a:fld>
             <a:endParaRPr lang="en-IN"/>
           </a:p>
@@ -1160,7 +1162,7 @@
           <a:p>
             <a:fld id="{BDC0887E-30F6-48B0-B326-7E062E530290}" type="datetimeFigureOut">
               <a:rPr lang="en-IN" smtClean="0"/>
-              <a:t>01-02-2022</a:t>
+              <a:t>02-02-2022</a:t>
             </a:fld>
             <a:endParaRPr lang="en-IN"/>
           </a:p>
@@ -1428,7 +1430,7 @@
           <a:p>
             <a:fld id="{BDC0887E-30F6-48B0-B326-7E062E530290}" type="datetimeFigureOut">
               <a:rPr lang="en-IN" smtClean="0"/>
-              <a:t>01-02-2022</a:t>
+              <a:t>02-02-2022</a:t>
             </a:fld>
             <a:endParaRPr lang="en-IN"/>
           </a:p>
@@ -1843,7 +1845,7 @@
           <a:p>
             <a:fld id="{BDC0887E-30F6-48B0-B326-7E062E530290}" type="datetimeFigureOut">
               <a:rPr lang="en-IN" smtClean="0"/>
-              <a:t>01-02-2022</a:t>
+              <a:t>02-02-2022</a:t>
             </a:fld>
             <a:endParaRPr lang="en-IN"/>
           </a:p>
@@ -1985,7 +1987,7 @@
           <a:p>
             <a:fld id="{BDC0887E-30F6-48B0-B326-7E062E530290}" type="datetimeFigureOut">
               <a:rPr lang="en-IN" smtClean="0"/>
-              <a:t>01-02-2022</a:t>
+              <a:t>02-02-2022</a:t>
             </a:fld>
             <a:endParaRPr lang="en-IN"/>
           </a:p>
@@ -2098,7 +2100,7 @@
           <a:p>
             <a:fld id="{BDC0887E-30F6-48B0-B326-7E062E530290}" type="datetimeFigureOut">
               <a:rPr lang="en-IN" smtClean="0"/>
-              <a:t>01-02-2022</a:t>
+              <a:t>02-02-2022</a:t>
             </a:fld>
             <a:endParaRPr lang="en-IN"/>
           </a:p>
@@ -2411,7 +2413,7 @@
           <a:p>
             <a:fld id="{BDC0887E-30F6-48B0-B326-7E062E530290}" type="datetimeFigureOut">
               <a:rPr lang="en-IN" smtClean="0"/>
-              <a:t>01-02-2022</a:t>
+              <a:t>02-02-2022</a:t>
             </a:fld>
             <a:endParaRPr lang="en-IN"/>
           </a:p>
@@ -2700,7 +2702,7 @@
           <a:p>
             <a:fld id="{BDC0887E-30F6-48B0-B326-7E062E530290}" type="datetimeFigureOut">
               <a:rPr lang="en-IN" smtClean="0"/>
-              <a:t>01-02-2022</a:t>
+              <a:t>02-02-2022</a:t>
             </a:fld>
             <a:endParaRPr lang="en-IN"/>
           </a:p>
@@ -2943,7 +2945,7 @@
           <a:p>
             <a:fld id="{BDC0887E-30F6-48B0-B326-7E062E530290}" type="datetimeFigureOut">
               <a:rPr lang="en-IN" smtClean="0"/>
-              <a:t>01-02-2022</a:t>
+              <a:t>02-02-2022</a:t>
             </a:fld>
             <a:endParaRPr lang="en-IN"/>
           </a:p>
@@ -6325,6 +6327,532 @@
 </p:sld>
 </file>
 
+<file path=ppt/slides/slide4.xml><?xml version="1.0" encoding="utf-8"?>
+<p:sld xmlns:a="http://schemas.openxmlformats.org/drawingml/2006/main" xmlns:r="http://schemas.openxmlformats.org/officeDocument/2006/relationships" xmlns:p="http://schemas.openxmlformats.org/presentationml/2006/main">
+  <p:cSld>
+    <p:spTree>
+      <p:nvGrpSpPr>
+        <p:cNvPr id="1" name=""/>
+        <p:cNvGrpSpPr/>
+        <p:nvPr/>
+      </p:nvGrpSpPr>
+      <p:grpSpPr>
+        <a:xfrm>
+          <a:off x="0" y="0"/>
+          <a:ext cx="0" cy="0"/>
+          <a:chOff x="0" y="0"/>
+          <a:chExt cx="0" cy="0"/>
+        </a:xfrm>
+      </p:grpSpPr>
+      <p:sp>
+        <p:nvSpPr>
+          <p:cNvPr id="6" name="Rectangle 5">
+            <a:extLst>
+              <a:ext uri="{FF2B5EF4-FFF2-40B4-BE49-F238E27FC236}">
+                <a16:creationId xmlns:a16="http://schemas.microsoft.com/office/drawing/2014/main" id="{23D9A284-E705-4058-BC97-E411758071E2}"/>
+              </a:ext>
+            </a:extLst>
+          </p:cNvPr>
+          <p:cNvSpPr/>
+          <p:nvPr/>
+        </p:nvSpPr>
+        <p:spPr>
+          <a:xfrm>
+            <a:off x="0" y="0"/>
+            <a:ext cx="12192000" cy="623843"/>
+          </a:xfrm>
+          <a:prstGeom prst="rect">
+            <a:avLst/>
+          </a:prstGeom>
+        </p:spPr>
+        <p:style>
+          <a:lnRef idx="2">
+            <a:schemeClr val="accent1">
+              <a:shade val="50000"/>
+            </a:schemeClr>
+          </a:lnRef>
+          <a:fillRef idx="1">
+            <a:schemeClr val="accent1"/>
+          </a:fillRef>
+          <a:effectRef idx="0">
+            <a:schemeClr val="accent1"/>
+          </a:effectRef>
+          <a:fontRef idx="minor">
+            <a:schemeClr val="lt1"/>
+          </a:fontRef>
+        </p:style>
+        <p:txBody>
+          <a:bodyPr rtlCol="0" anchor="ctr"/>
+          <a:lstStyle/>
+          <a:p>
+            <a:pPr algn="ctr"/>
+            <a:endParaRPr lang="en-IN" b="1" i="0" dirty="0">
+              <a:effectLst/>
+              <a:latin typeface="Nunito Sans" pitchFamily="2" charset="0"/>
+            </a:endParaRPr>
+          </a:p>
+          <a:p>
+            <a:pPr algn="ctr"/>
+            <a:r>
+              <a:rPr lang="en-IN" b="1" dirty="0">
+                <a:latin typeface="Nunito Sans" pitchFamily="2" charset="0"/>
+              </a:rPr>
+              <a:t>Problem – N Queens problem</a:t>
+            </a:r>
+            <a:endParaRPr lang="en-IN" b="1" i="0" dirty="0">
+              <a:effectLst/>
+              <a:latin typeface="Nunito Sans" pitchFamily="2" charset="0"/>
+            </a:endParaRPr>
+          </a:p>
+          <a:p>
+            <a:pPr algn="ctr"/>
+            <a:endParaRPr lang="en-IN" dirty="0"/>
+          </a:p>
+        </p:txBody>
+      </p:sp>
+      <p:sp>
+        <p:nvSpPr>
+          <p:cNvPr id="2" name="Rectangle 1">
+            <a:extLst>
+              <a:ext uri="{FF2B5EF4-FFF2-40B4-BE49-F238E27FC236}">
+                <a16:creationId xmlns:a16="http://schemas.microsoft.com/office/drawing/2014/main" id="{92FC7832-74DA-4590-8BF7-CB38914B9190}"/>
+              </a:ext>
+            </a:extLst>
+          </p:cNvPr>
+          <p:cNvSpPr/>
+          <p:nvPr/>
+        </p:nvSpPr>
+        <p:spPr>
+          <a:xfrm>
+            <a:off x="101600" y="749826"/>
+            <a:ext cx="11977511" cy="5662263"/>
+          </a:xfrm>
+          <a:prstGeom prst="rect">
+            <a:avLst/>
+          </a:prstGeom>
+          <a:noFill/>
+          <a:ln w="9525" cap="flat" cmpd="sng" algn="ctr">
+            <a:solidFill>
+              <a:schemeClr val="accent3"/>
+            </a:solidFill>
+            <a:prstDash val="solid"/>
+            <a:round/>
+            <a:headEnd type="none" w="med" len="med"/>
+            <a:tailEnd type="none" w="med" len="med"/>
+          </a:ln>
+        </p:spPr>
+        <p:style>
+          <a:lnRef idx="0">
+            <a:scrgbClr r="0" g="0" b="0"/>
+          </a:lnRef>
+          <a:fillRef idx="0">
+            <a:scrgbClr r="0" g="0" b="0"/>
+          </a:fillRef>
+          <a:effectRef idx="0">
+            <a:scrgbClr r="0" g="0" b="0"/>
+          </a:effectRef>
+          <a:fontRef idx="minor">
+            <a:schemeClr val="accent3"/>
+          </a:fontRef>
+        </p:style>
+        <p:txBody>
+          <a:bodyPr rtlCol="0" anchor="ctr"/>
+          <a:lstStyle/>
+          <a:p>
+            <a:pPr algn="ctr"/>
+            <a:endParaRPr lang="en-IN"/>
+          </a:p>
+        </p:txBody>
+      </p:sp>
+      <p:sp>
+        <p:nvSpPr>
+          <p:cNvPr id="13" name="TextBox 12">
+            <a:extLst>
+              <a:ext uri="{FF2B5EF4-FFF2-40B4-BE49-F238E27FC236}">
+                <a16:creationId xmlns:a16="http://schemas.microsoft.com/office/drawing/2014/main" id="{85D22AC9-DFC3-4A6B-A1C9-C6410C69CB95}"/>
+              </a:ext>
+            </a:extLst>
+          </p:cNvPr>
+          <p:cNvSpPr txBox="1"/>
+          <p:nvPr/>
+        </p:nvSpPr>
+        <p:spPr>
+          <a:xfrm>
+            <a:off x="299103" y="965675"/>
+            <a:ext cx="7483057" cy="4647426"/>
+          </a:xfrm>
+          <a:prstGeom prst="rect">
+            <a:avLst/>
+          </a:prstGeom>
+          <a:noFill/>
+        </p:spPr>
+        <p:txBody>
+          <a:bodyPr wrap="square" rtlCol="0">
+            <a:spAutoFit/>
+          </a:bodyPr>
+          <a:lstStyle/>
+          <a:p>
+            <a:r>
+              <a:rPr lang="en-IN" sz="1000" b="1" i="0" dirty="0">
+                <a:solidFill>
+                  <a:srgbClr val="000000"/>
+                </a:solidFill>
+                <a:effectLst/>
+                <a:latin typeface="Century Gothic" panose="020B0502020202020204" pitchFamily="34" charset="0"/>
+              </a:rPr>
+              <a:t>N Queens Problem – Very famous recursive and backtrack problem</a:t>
+            </a:r>
+          </a:p>
+          <a:p>
+            <a:endParaRPr lang="en-IN" sz="1000">
+              <a:solidFill>
+                <a:srgbClr val="008000"/>
+              </a:solidFill>
+              <a:latin typeface="Century Gothic" panose="020B0502020202020204" pitchFamily="34" charset="0"/>
+            </a:endParaRPr>
+          </a:p>
+          <a:p>
+            <a:r>
+              <a:rPr lang="en-IN" sz="1000">
+                <a:solidFill>
+                  <a:srgbClr val="008000"/>
+                </a:solidFill>
+                <a:latin typeface="Century Gothic" panose="020B0502020202020204" pitchFamily="34" charset="0"/>
+              </a:rPr>
+              <a:t>N </a:t>
+            </a:r>
+            <a:r>
+              <a:rPr lang="en-IN" sz="1000" dirty="0">
+                <a:solidFill>
+                  <a:srgbClr val="008000"/>
+                </a:solidFill>
+                <a:latin typeface="Century Gothic" panose="020B0502020202020204" pitchFamily="34" charset="0"/>
+              </a:rPr>
+              <a:t>- Queens Problem</a:t>
+            </a:r>
+            <a:endParaRPr lang="en-IN" sz="1000" dirty="0">
+              <a:solidFill>
+                <a:srgbClr val="000000"/>
+              </a:solidFill>
+              <a:latin typeface="Century Gothic" panose="020B0502020202020204" pitchFamily="34" charset="0"/>
+            </a:endParaRPr>
+          </a:p>
+          <a:p>
+            <a:r>
+              <a:rPr lang="en-IN" sz="1000" dirty="0">
+                <a:solidFill>
+                  <a:srgbClr val="008000"/>
+                </a:solidFill>
+                <a:latin typeface="Century Gothic" panose="020B0502020202020204" pitchFamily="34" charset="0"/>
+              </a:rPr>
+              <a:t>Problem statement</a:t>
+            </a:r>
+            <a:endParaRPr lang="en-IN" sz="1000" dirty="0">
+              <a:solidFill>
+                <a:srgbClr val="000000"/>
+              </a:solidFill>
+              <a:latin typeface="Century Gothic" panose="020B0502020202020204" pitchFamily="34" charset="0"/>
+            </a:endParaRPr>
+          </a:p>
+          <a:p>
+            <a:endParaRPr lang="en-IN" sz="1000" dirty="0">
+              <a:solidFill>
+                <a:srgbClr val="000000"/>
+              </a:solidFill>
+              <a:latin typeface="Century Gothic" panose="020B0502020202020204" pitchFamily="34" charset="0"/>
+            </a:endParaRPr>
+          </a:p>
+          <a:p>
+            <a:r>
+              <a:rPr lang="en-IN" sz="1000" dirty="0">
+                <a:solidFill>
+                  <a:srgbClr val="008000"/>
+                </a:solidFill>
+                <a:latin typeface="Century Gothic" panose="020B0502020202020204" pitchFamily="34" charset="0"/>
+              </a:rPr>
+              <a:t>Problem statement</a:t>
+            </a:r>
+            <a:endParaRPr lang="en-IN" sz="1000" dirty="0">
+              <a:solidFill>
+                <a:srgbClr val="000000"/>
+              </a:solidFill>
+              <a:latin typeface="Century Gothic" panose="020B0502020202020204" pitchFamily="34" charset="0"/>
+            </a:endParaRPr>
+          </a:p>
+          <a:p>
+            <a:r>
+              <a:rPr lang="en-US" sz="1000" dirty="0">
+                <a:solidFill>
+                  <a:srgbClr val="008000"/>
+                </a:solidFill>
+                <a:latin typeface="Century Gothic" panose="020B0502020202020204" pitchFamily="34" charset="0"/>
+              </a:rPr>
+              <a:t>You are given an empty chessboard of size N * N. </a:t>
+            </a:r>
+            <a:endParaRPr lang="en-US" sz="1000" dirty="0">
+              <a:solidFill>
+                <a:srgbClr val="000000"/>
+              </a:solidFill>
+              <a:latin typeface="Century Gothic" panose="020B0502020202020204" pitchFamily="34" charset="0"/>
+            </a:endParaRPr>
+          </a:p>
+          <a:p>
+            <a:endParaRPr lang="en-IN" sz="1000" dirty="0">
+              <a:solidFill>
+                <a:srgbClr val="000000"/>
+              </a:solidFill>
+              <a:latin typeface="Century Gothic" panose="020B0502020202020204" pitchFamily="34" charset="0"/>
+            </a:endParaRPr>
+          </a:p>
+          <a:p>
+            <a:r>
+              <a:rPr lang="en-US" sz="1000" dirty="0">
+                <a:solidFill>
+                  <a:srgbClr val="008000"/>
+                </a:solidFill>
+                <a:latin typeface="Century Gothic" panose="020B0502020202020204" pitchFamily="34" charset="0"/>
+              </a:rPr>
+              <a:t>Find the number of ways to place N queens on the board, </a:t>
+            </a:r>
+            <a:endParaRPr lang="en-US" sz="1000" dirty="0">
+              <a:solidFill>
+                <a:srgbClr val="000000"/>
+              </a:solidFill>
+              <a:latin typeface="Century Gothic" panose="020B0502020202020204" pitchFamily="34" charset="0"/>
+            </a:endParaRPr>
+          </a:p>
+          <a:p>
+            <a:r>
+              <a:rPr lang="en-US" sz="1000" dirty="0">
+                <a:solidFill>
+                  <a:srgbClr val="008000"/>
+                </a:solidFill>
+                <a:latin typeface="Century Gothic" panose="020B0502020202020204" pitchFamily="34" charset="0"/>
+              </a:rPr>
+              <a:t>such that no two queens can kill each other in one move. </a:t>
+            </a:r>
+            <a:endParaRPr lang="en-US" sz="1000" dirty="0">
+              <a:solidFill>
+                <a:srgbClr val="000000"/>
+              </a:solidFill>
+              <a:latin typeface="Century Gothic" panose="020B0502020202020204" pitchFamily="34" charset="0"/>
+            </a:endParaRPr>
+          </a:p>
+          <a:p>
+            <a:r>
+              <a:rPr lang="en-US" sz="1000" dirty="0">
+                <a:solidFill>
+                  <a:srgbClr val="008000"/>
+                </a:solidFill>
+                <a:latin typeface="Century Gothic" panose="020B0502020202020204" pitchFamily="34" charset="0"/>
+              </a:rPr>
+              <a:t>A queen can move vertically, horizontally, and diagonally.</a:t>
+            </a:r>
+            <a:endParaRPr lang="en-US" sz="1000" dirty="0">
+              <a:solidFill>
+                <a:srgbClr val="000000"/>
+              </a:solidFill>
+              <a:latin typeface="Century Gothic" panose="020B0502020202020204" pitchFamily="34" charset="0"/>
+            </a:endParaRPr>
+          </a:p>
+          <a:p>
+            <a:endParaRPr lang="en-IN" sz="1000" dirty="0">
+              <a:solidFill>
+                <a:srgbClr val="000000"/>
+              </a:solidFill>
+              <a:latin typeface="Century Gothic" panose="020B0502020202020204" pitchFamily="34" charset="0"/>
+            </a:endParaRPr>
+          </a:p>
+          <a:p>
+            <a:r>
+              <a:rPr lang="en-IN" sz="1000" dirty="0">
+                <a:solidFill>
+                  <a:srgbClr val="008000"/>
+                </a:solidFill>
+                <a:latin typeface="Century Gothic" panose="020B0502020202020204" pitchFamily="34" charset="0"/>
+              </a:rPr>
+              <a:t>Solution:</a:t>
+            </a:r>
+            <a:endParaRPr lang="en-IN" sz="1000" dirty="0">
+              <a:solidFill>
+                <a:srgbClr val="000000"/>
+              </a:solidFill>
+              <a:latin typeface="Century Gothic" panose="020B0502020202020204" pitchFamily="34" charset="0"/>
+            </a:endParaRPr>
+          </a:p>
+          <a:p>
+            <a:r>
+              <a:rPr lang="en-IN" sz="1000" dirty="0">
+                <a:solidFill>
+                  <a:srgbClr val="008000"/>
+                </a:solidFill>
+                <a:latin typeface="Century Gothic" panose="020B0502020202020204" pitchFamily="34" charset="0"/>
+              </a:rPr>
+              <a:t>[Backtracking Approach]</a:t>
+            </a:r>
+            <a:endParaRPr lang="en-IN" sz="1000" dirty="0">
+              <a:solidFill>
+                <a:srgbClr val="000000"/>
+              </a:solidFill>
+              <a:latin typeface="Century Gothic" panose="020B0502020202020204" pitchFamily="34" charset="0"/>
+            </a:endParaRPr>
+          </a:p>
+          <a:p>
+            <a:r>
+              <a:rPr lang="en-US" sz="1000" dirty="0">
+                <a:solidFill>
+                  <a:srgbClr val="008000"/>
+                </a:solidFill>
+                <a:latin typeface="Century Gothic" panose="020B0502020202020204" pitchFamily="34" charset="0"/>
+              </a:rPr>
+              <a:t>The idea is to place queens one by one in different columns, starting from the leftmost column.</a:t>
+            </a:r>
+            <a:endParaRPr lang="en-US" sz="1000" dirty="0">
+              <a:solidFill>
+                <a:srgbClr val="000000"/>
+              </a:solidFill>
+              <a:latin typeface="Century Gothic" panose="020B0502020202020204" pitchFamily="34" charset="0"/>
+            </a:endParaRPr>
+          </a:p>
+          <a:p>
+            <a:r>
+              <a:rPr lang="en-US" sz="1000" dirty="0">
+                <a:solidFill>
+                  <a:srgbClr val="008000"/>
+                </a:solidFill>
+                <a:latin typeface="Century Gothic" panose="020B0502020202020204" pitchFamily="34" charset="0"/>
+              </a:rPr>
+              <a:t>When we place a queen in a column, we checked for clashes with already placed queens. </a:t>
+            </a:r>
+            <a:endParaRPr lang="en-US" sz="1000" dirty="0">
+              <a:solidFill>
+                <a:srgbClr val="000000"/>
+              </a:solidFill>
+              <a:latin typeface="Century Gothic" panose="020B0502020202020204" pitchFamily="34" charset="0"/>
+            </a:endParaRPr>
+          </a:p>
+          <a:p>
+            <a:r>
+              <a:rPr lang="en-US" sz="1000" dirty="0">
+                <a:solidFill>
+                  <a:srgbClr val="008000"/>
+                </a:solidFill>
+                <a:latin typeface="Century Gothic" panose="020B0502020202020204" pitchFamily="34" charset="0"/>
+              </a:rPr>
+              <a:t>In the current column, if we find a row for which there is no clash, we mark this row &amp; column</a:t>
+            </a:r>
+            <a:endParaRPr lang="en-US" sz="1000" dirty="0">
+              <a:solidFill>
+                <a:srgbClr val="000000"/>
+              </a:solidFill>
+              <a:latin typeface="Century Gothic" panose="020B0502020202020204" pitchFamily="34" charset="0"/>
+            </a:endParaRPr>
+          </a:p>
+          <a:p>
+            <a:r>
+              <a:rPr lang="en-US" sz="1000" dirty="0">
+                <a:solidFill>
+                  <a:srgbClr val="008000"/>
+                </a:solidFill>
+                <a:latin typeface="Century Gothic" panose="020B0502020202020204" pitchFamily="34" charset="0"/>
+              </a:rPr>
+              <a:t>as part of solution. if we don't find such a row due to clashes, we return false and backtrack.</a:t>
+            </a:r>
+            <a:endParaRPr lang="en-IN" sz="1000" b="1" dirty="0">
+              <a:solidFill>
+                <a:srgbClr val="000000"/>
+              </a:solidFill>
+              <a:latin typeface="Century Gothic" panose="020B0502020202020204" pitchFamily="34" charset="0"/>
+            </a:endParaRPr>
+          </a:p>
+          <a:p>
+            <a:endParaRPr lang="en-IN" sz="1000" b="1" i="0" dirty="0">
+              <a:solidFill>
+                <a:srgbClr val="000000"/>
+              </a:solidFill>
+              <a:effectLst/>
+              <a:latin typeface="Century Gothic" panose="020B0502020202020204" pitchFamily="34" charset="0"/>
+            </a:endParaRPr>
+          </a:p>
+          <a:p>
+            <a:endParaRPr lang="en-IN" sz="1000" b="1" i="0" dirty="0">
+              <a:solidFill>
+                <a:srgbClr val="000000"/>
+              </a:solidFill>
+              <a:effectLst/>
+              <a:latin typeface="Century Gothic" panose="020B0502020202020204" pitchFamily="34" charset="0"/>
+            </a:endParaRPr>
+          </a:p>
+          <a:p>
+            <a:endParaRPr lang="en-IN" sz="1000" dirty="0">
+              <a:solidFill>
+                <a:srgbClr val="000000"/>
+              </a:solidFill>
+              <a:latin typeface="Century Gothic" panose="020B0502020202020204" pitchFamily="34" charset="0"/>
+            </a:endParaRPr>
+          </a:p>
+          <a:p>
+            <a:endParaRPr lang="en-IN" sz="1000" b="1" i="0" dirty="0">
+              <a:solidFill>
+                <a:srgbClr val="000000"/>
+              </a:solidFill>
+              <a:effectLst/>
+              <a:latin typeface="Century Gothic" panose="020B0502020202020204" pitchFamily="34" charset="0"/>
+            </a:endParaRPr>
+          </a:p>
+          <a:p>
+            <a:endParaRPr lang="en-US" sz="1000" dirty="0">
+              <a:solidFill>
+                <a:srgbClr val="3D3D4E"/>
+              </a:solidFill>
+              <a:latin typeface="Century Gothic" panose="020B0502020202020204" pitchFamily="34" charset="0"/>
+            </a:endParaRPr>
+          </a:p>
+          <a:p>
+            <a:endParaRPr lang="en-US" sz="1000" dirty="0">
+              <a:solidFill>
+                <a:srgbClr val="3D3D4E"/>
+              </a:solidFill>
+              <a:latin typeface="Century Gothic" panose="020B0502020202020204" pitchFamily="34" charset="0"/>
+            </a:endParaRPr>
+          </a:p>
+          <a:p>
+            <a:endParaRPr lang="en-US" sz="1000" dirty="0">
+              <a:solidFill>
+                <a:srgbClr val="3D3D4E"/>
+              </a:solidFill>
+              <a:latin typeface="Century Gothic" panose="020B0502020202020204" pitchFamily="34" charset="0"/>
+            </a:endParaRPr>
+          </a:p>
+          <a:p>
+            <a:endParaRPr lang="en-US" sz="1000" dirty="0">
+              <a:solidFill>
+                <a:srgbClr val="3D3D4E"/>
+              </a:solidFill>
+              <a:latin typeface="Century Gothic" panose="020B0502020202020204" pitchFamily="34" charset="0"/>
+            </a:endParaRPr>
+          </a:p>
+          <a:p>
+            <a:endParaRPr lang="en-IN" dirty="0"/>
+          </a:p>
+          <a:p>
+            <a:endParaRPr lang="en-IN" dirty="0"/>
+          </a:p>
+        </p:txBody>
+      </p:sp>
+    </p:spTree>
+    <p:extLst>
+      <p:ext uri="{BB962C8B-B14F-4D97-AF65-F5344CB8AC3E}">
+        <p14:creationId xmlns:p14="http://schemas.microsoft.com/office/powerpoint/2010/main" val="3717722501"/>
+      </p:ext>
+    </p:extLst>
+  </p:cSld>
+  <p:clrMapOvr>
+    <a:masterClrMapping/>
+  </p:clrMapOvr>
+</p:sld>
+</file>
+
 <file path=ppt/theme/theme1.xml><?xml version="1.0" encoding="utf-8"?>
 <a:theme xmlns:a="http://schemas.openxmlformats.org/drawingml/2006/main" name="Office Theme">
   <a:themeElements>

</xml_diff>

<commit_message>
Iterative to Recursive method conversion
</commit_message>
<xml_diff>
--- a/RecursionAndBacktracking/Recursion_Backtracking.pptx
+++ b/RecursionAndBacktracking/Recursion_Backtracking.pptx
@@ -10,10 +10,11 @@
     <p:sldId id="263" r:id="rId4"/>
     <p:sldId id="264" r:id="rId5"/>
     <p:sldId id="265" r:id="rId6"/>
-    <p:sldId id="261" r:id="rId7"/>
-    <p:sldId id="258" r:id="rId8"/>
-    <p:sldId id="259" r:id="rId9"/>
-    <p:sldId id="260" r:id="rId10"/>
+    <p:sldId id="266" r:id="rId7"/>
+    <p:sldId id="261" r:id="rId8"/>
+    <p:sldId id="258" r:id="rId9"/>
+    <p:sldId id="259" r:id="rId10"/>
+    <p:sldId id="260" r:id="rId11"/>
   </p:sldIdLst>
   <p:sldSz cx="12192000" cy="6858000"/>
   <p:notesSz cx="6858000" cy="9144000"/>
@@ -122,6 +123,7 @@
             <p14:sldId id="263"/>
             <p14:sldId id="264"/>
             <p14:sldId id="265"/>
+            <p14:sldId id="266"/>
             <p14:sldId id="261"/>
             <p14:sldId id="258"/>
             <p14:sldId id="259"/>
@@ -4064,6 +4066,741 @@
 </p:sld>
 </file>
 
+<file path=ppt/slides/slide10.xml><?xml version="1.0" encoding="utf-8"?>
+<p:sld xmlns:a="http://schemas.openxmlformats.org/drawingml/2006/main" xmlns:r="http://schemas.openxmlformats.org/officeDocument/2006/relationships" xmlns:p="http://schemas.openxmlformats.org/presentationml/2006/main">
+  <p:cSld>
+    <p:spTree>
+      <p:nvGrpSpPr>
+        <p:cNvPr id="1" name=""/>
+        <p:cNvGrpSpPr/>
+        <p:nvPr/>
+      </p:nvGrpSpPr>
+      <p:grpSpPr>
+        <a:xfrm>
+          <a:off x="0" y="0"/>
+          <a:ext cx="0" cy="0"/>
+          <a:chOff x="0" y="0"/>
+          <a:chExt cx="0" cy="0"/>
+        </a:xfrm>
+      </p:grpSpPr>
+      <p:sp>
+        <p:nvSpPr>
+          <p:cNvPr id="6" name="Rectangle 5">
+            <a:extLst>
+              <a:ext uri="{FF2B5EF4-FFF2-40B4-BE49-F238E27FC236}">
+                <a16:creationId xmlns:a16="http://schemas.microsoft.com/office/drawing/2014/main" id="{23D9A284-E705-4058-BC97-E411758071E2}"/>
+              </a:ext>
+            </a:extLst>
+          </p:cNvPr>
+          <p:cNvSpPr/>
+          <p:nvPr/>
+        </p:nvSpPr>
+        <p:spPr>
+          <a:xfrm>
+            <a:off x="0" y="0"/>
+            <a:ext cx="12192000" cy="623843"/>
+          </a:xfrm>
+          <a:prstGeom prst="rect">
+            <a:avLst/>
+          </a:prstGeom>
+        </p:spPr>
+        <p:style>
+          <a:lnRef idx="2">
+            <a:schemeClr val="accent1">
+              <a:shade val="50000"/>
+            </a:schemeClr>
+          </a:lnRef>
+          <a:fillRef idx="1">
+            <a:schemeClr val="accent1"/>
+          </a:fillRef>
+          <a:effectRef idx="0">
+            <a:schemeClr val="accent1"/>
+          </a:effectRef>
+          <a:fontRef idx="minor">
+            <a:schemeClr val="lt1"/>
+          </a:fontRef>
+        </p:style>
+        <p:txBody>
+          <a:bodyPr rtlCol="0" anchor="ctr"/>
+          <a:lstStyle/>
+          <a:p>
+            <a:pPr algn="ctr"/>
+            <a:endParaRPr lang="en-IN" b="1" i="0" dirty="0">
+              <a:effectLst/>
+              <a:latin typeface="Nunito Sans" pitchFamily="2" charset="0"/>
+            </a:endParaRPr>
+          </a:p>
+          <a:p>
+            <a:pPr algn="ctr"/>
+            <a:r>
+              <a:rPr lang="en-IN" b="1" dirty="0">
+                <a:latin typeface="Nunito Sans" pitchFamily="2" charset="0"/>
+              </a:rPr>
+              <a:t>Problem – N Queens problem</a:t>
+            </a:r>
+            <a:endParaRPr lang="en-IN" b="1" i="0" dirty="0">
+              <a:effectLst/>
+              <a:latin typeface="Nunito Sans" pitchFamily="2" charset="0"/>
+            </a:endParaRPr>
+          </a:p>
+          <a:p>
+            <a:pPr algn="ctr"/>
+            <a:endParaRPr lang="en-IN" dirty="0"/>
+          </a:p>
+        </p:txBody>
+      </p:sp>
+      <p:sp>
+        <p:nvSpPr>
+          <p:cNvPr id="2" name="Rectangle 1">
+            <a:extLst>
+              <a:ext uri="{FF2B5EF4-FFF2-40B4-BE49-F238E27FC236}">
+                <a16:creationId xmlns:a16="http://schemas.microsoft.com/office/drawing/2014/main" id="{92FC7832-74DA-4590-8BF7-CB38914B9190}"/>
+              </a:ext>
+            </a:extLst>
+          </p:cNvPr>
+          <p:cNvSpPr/>
+          <p:nvPr/>
+        </p:nvSpPr>
+        <p:spPr>
+          <a:xfrm>
+            <a:off x="101600" y="749826"/>
+            <a:ext cx="11977511" cy="5662263"/>
+          </a:xfrm>
+          <a:prstGeom prst="rect">
+            <a:avLst/>
+          </a:prstGeom>
+          <a:noFill/>
+          <a:ln w="9525" cap="flat" cmpd="sng" algn="ctr">
+            <a:solidFill>
+              <a:schemeClr val="accent3"/>
+            </a:solidFill>
+            <a:prstDash val="solid"/>
+            <a:round/>
+            <a:headEnd type="none" w="med" len="med"/>
+            <a:tailEnd type="none" w="med" len="med"/>
+          </a:ln>
+        </p:spPr>
+        <p:style>
+          <a:lnRef idx="0">
+            <a:scrgbClr r="0" g="0" b="0"/>
+          </a:lnRef>
+          <a:fillRef idx="0">
+            <a:scrgbClr r="0" g="0" b="0"/>
+          </a:fillRef>
+          <a:effectRef idx="0">
+            <a:scrgbClr r="0" g="0" b="0"/>
+          </a:effectRef>
+          <a:fontRef idx="minor">
+            <a:schemeClr val="accent3"/>
+          </a:fontRef>
+        </p:style>
+        <p:txBody>
+          <a:bodyPr rtlCol="0" anchor="ctr"/>
+          <a:lstStyle/>
+          <a:p>
+            <a:pPr algn="ctr"/>
+            <a:endParaRPr lang="en-IN"/>
+          </a:p>
+        </p:txBody>
+      </p:sp>
+      <p:sp>
+        <p:nvSpPr>
+          <p:cNvPr id="13" name="TextBox 12">
+            <a:extLst>
+              <a:ext uri="{FF2B5EF4-FFF2-40B4-BE49-F238E27FC236}">
+                <a16:creationId xmlns:a16="http://schemas.microsoft.com/office/drawing/2014/main" id="{85D22AC9-DFC3-4A6B-A1C9-C6410C69CB95}"/>
+              </a:ext>
+            </a:extLst>
+          </p:cNvPr>
+          <p:cNvSpPr txBox="1"/>
+          <p:nvPr/>
+        </p:nvSpPr>
+        <p:spPr>
+          <a:xfrm>
+            <a:off x="299104" y="965675"/>
+            <a:ext cx="5982056" cy="4955203"/>
+          </a:xfrm>
+          <a:prstGeom prst="rect">
+            <a:avLst/>
+          </a:prstGeom>
+          <a:noFill/>
+        </p:spPr>
+        <p:txBody>
+          <a:bodyPr wrap="square" rtlCol="0">
+            <a:spAutoFit/>
+          </a:bodyPr>
+          <a:lstStyle/>
+          <a:p>
+            <a:r>
+              <a:rPr lang="en-IN" sz="1000" b="1" i="0" dirty="0">
+                <a:solidFill>
+                  <a:srgbClr val="000000"/>
+                </a:solidFill>
+                <a:effectLst/>
+                <a:latin typeface="Century Gothic" panose="020B0502020202020204" pitchFamily="34" charset="0"/>
+              </a:rPr>
+              <a:t>N Queens Problem – Very famous recursive and backtrack problem</a:t>
+            </a:r>
+          </a:p>
+          <a:p>
+            <a:endParaRPr lang="en-IN" sz="1000" dirty="0">
+              <a:solidFill>
+                <a:srgbClr val="008000"/>
+              </a:solidFill>
+              <a:latin typeface="Century Gothic" panose="020B0502020202020204" pitchFamily="34" charset="0"/>
+            </a:endParaRPr>
+          </a:p>
+          <a:p>
+            <a:r>
+              <a:rPr lang="en-IN" sz="1000" dirty="0">
+                <a:solidFill>
+                  <a:srgbClr val="008000"/>
+                </a:solidFill>
+                <a:latin typeface="Century Gothic" panose="020B0502020202020204" pitchFamily="34" charset="0"/>
+              </a:rPr>
+              <a:t>N - Queens Problem</a:t>
+            </a:r>
+            <a:endParaRPr lang="en-IN" sz="1000" dirty="0">
+              <a:solidFill>
+                <a:srgbClr val="000000"/>
+              </a:solidFill>
+              <a:latin typeface="Century Gothic" panose="020B0502020202020204" pitchFamily="34" charset="0"/>
+            </a:endParaRPr>
+          </a:p>
+          <a:p>
+            <a:r>
+              <a:rPr lang="en-IN" sz="1000" dirty="0">
+                <a:solidFill>
+                  <a:srgbClr val="008000"/>
+                </a:solidFill>
+                <a:latin typeface="Century Gothic" panose="020B0502020202020204" pitchFamily="34" charset="0"/>
+              </a:rPr>
+              <a:t>Problem statement</a:t>
+            </a:r>
+            <a:endParaRPr lang="en-IN" sz="1000" dirty="0">
+              <a:solidFill>
+                <a:srgbClr val="000000"/>
+              </a:solidFill>
+              <a:latin typeface="Century Gothic" panose="020B0502020202020204" pitchFamily="34" charset="0"/>
+            </a:endParaRPr>
+          </a:p>
+          <a:p>
+            <a:endParaRPr lang="en-IN" sz="1000" dirty="0">
+              <a:solidFill>
+                <a:srgbClr val="000000"/>
+              </a:solidFill>
+              <a:latin typeface="Century Gothic" panose="020B0502020202020204" pitchFamily="34" charset="0"/>
+            </a:endParaRPr>
+          </a:p>
+          <a:p>
+            <a:r>
+              <a:rPr lang="en-IN" sz="1000" dirty="0">
+                <a:solidFill>
+                  <a:srgbClr val="008000"/>
+                </a:solidFill>
+                <a:latin typeface="Century Gothic" panose="020B0502020202020204" pitchFamily="34" charset="0"/>
+              </a:rPr>
+              <a:t>Problem statement</a:t>
+            </a:r>
+            <a:endParaRPr lang="en-IN" sz="1000" dirty="0">
+              <a:solidFill>
+                <a:srgbClr val="000000"/>
+              </a:solidFill>
+              <a:latin typeface="Century Gothic" panose="020B0502020202020204" pitchFamily="34" charset="0"/>
+            </a:endParaRPr>
+          </a:p>
+          <a:p>
+            <a:r>
+              <a:rPr lang="en-US" sz="1000" dirty="0">
+                <a:solidFill>
+                  <a:srgbClr val="008000"/>
+                </a:solidFill>
+                <a:latin typeface="Century Gothic" panose="020B0502020202020204" pitchFamily="34" charset="0"/>
+              </a:rPr>
+              <a:t>You are given an empty chessboard of size N * N. </a:t>
+            </a:r>
+            <a:endParaRPr lang="en-US" sz="1000" dirty="0">
+              <a:solidFill>
+                <a:srgbClr val="000000"/>
+              </a:solidFill>
+              <a:latin typeface="Century Gothic" panose="020B0502020202020204" pitchFamily="34" charset="0"/>
+            </a:endParaRPr>
+          </a:p>
+          <a:p>
+            <a:endParaRPr lang="en-IN" sz="1000" dirty="0">
+              <a:solidFill>
+                <a:srgbClr val="000000"/>
+              </a:solidFill>
+              <a:latin typeface="Century Gothic" panose="020B0502020202020204" pitchFamily="34" charset="0"/>
+            </a:endParaRPr>
+          </a:p>
+          <a:p>
+            <a:r>
+              <a:rPr lang="en-US" sz="1000" dirty="0">
+                <a:solidFill>
+                  <a:srgbClr val="008000"/>
+                </a:solidFill>
+                <a:latin typeface="Century Gothic" panose="020B0502020202020204" pitchFamily="34" charset="0"/>
+              </a:rPr>
+              <a:t>Find the number of ways to place N queens on the board, </a:t>
+            </a:r>
+            <a:endParaRPr lang="en-US" sz="1000" dirty="0">
+              <a:solidFill>
+                <a:srgbClr val="000000"/>
+              </a:solidFill>
+              <a:latin typeface="Century Gothic" panose="020B0502020202020204" pitchFamily="34" charset="0"/>
+            </a:endParaRPr>
+          </a:p>
+          <a:p>
+            <a:r>
+              <a:rPr lang="en-US" sz="1000" dirty="0">
+                <a:solidFill>
+                  <a:srgbClr val="008000"/>
+                </a:solidFill>
+                <a:latin typeface="Century Gothic" panose="020B0502020202020204" pitchFamily="34" charset="0"/>
+              </a:rPr>
+              <a:t>such that no two queens can kill each other in one move. </a:t>
+            </a:r>
+            <a:endParaRPr lang="en-US" sz="1000" dirty="0">
+              <a:solidFill>
+                <a:srgbClr val="000000"/>
+              </a:solidFill>
+              <a:latin typeface="Century Gothic" panose="020B0502020202020204" pitchFamily="34" charset="0"/>
+            </a:endParaRPr>
+          </a:p>
+          <a:p>
+            <a:r>
+              <a:rPr lang="en-US" sz="1000" dirty="0">
+                <a:solidFill>
+                  <a:srgbClr val="008000"/>
+                </a:solidFill>
+                <a:latin typeface="Century Gothic" panose="020B0502020202020204" pitchFamily="34" charset="0"/>
+              </a:rPr>
+              <a:t>A queen can move vertically, horizontally, and diagonally.</a:t>
+            </a:r>
+            <a:endParaRPr lang="en-US" sz="1000" dirty="0">
+              <a:solidFill>
+                <a:srgbClr val="000000"/>
+              </a:solidFill>
+              <a:latin typeface="Century Gothic" panose="020B0502020202020204" pitchFamily="34" charset="0"/>
+            </a:endParaRPr>
+          </a:p>
+          <a:p>
+            <a:endParaRPr lang="en-IN" sz="1000" dirty="0">
+              <a:solidFill>
+                <a:srgbClr val="000000"/>
+              </a:solidFill>
+              <a:latin typeface="Century Gothic" panose="020B0502020202020204" pitchFamily="34" charset="0"/>
+            </a:endParaRPr>
+          </a:p>
+          <a:p>
+            <a:r>
+              <a:rPr lang="en-IN" sz="1000" dirty="0">
+                <a:solidFill>
+                  <a:srgbClr val="008000"/>
+                </a:solidFill>
+                <a:latin typeface="Century Gothic" panose="020B0502020202020204" pitchFamily="34" charset="0"/>
+              </a:rPr>
+              <a:t>Solution:</a:t>
+            </a:r>
+          </a:p>
+          <a:p>
+            <a:endParaRPr lang="en-IN" sz="1000" dirty="0">
+              <a:solidFill>
+                <a:srgbClr val="000000"/>
+              </a:solidFill>
+              <a:latin typeface="Century Gothic" panose="020B0502020202020204" pitchFamily="34" charset="0"/>
+            </a:endParaRPr>
+          </a:p>
+          <a:p>
+            <a:r>
+              <a:rPr lang="en-IN" sz="1000" dirty="0">
+                <a:solidFill>
+                  <a:srgbClr val="008000"/>
+                </a:solidFill>
+                <a:latin typeface="Century Gothic" panose="020B0502020202020204" pitchFamily="34" charset="0"/>
+              </a:rPr>
+              <a:t>[Backtracking Approach]</a:t>
+            </a:r>
+            <a:endParaRPr lang="en-IN" sz="1000" dirty="0">
+              <a:solidFill>
+                <a:srgbClr val="000000"/>
+              </a:solidFill>
+              <a:latin typeface="Century Gothic" panose="020B0502020202020204" pitchFamily="34" charset="0"/>
+            </a:endParaRPr>
+          </a:p>
+          <a:p>
+            <a:r>
+              <a:rPr lang="en-US" sz="1000" dirty="0">
+                <a:solidFill>
+                  <a:srgbClr val="008000"/>
+                </a:solidFill>
+                <a:latin typeface="Century Gothic" panose="020B0502020202020204" pitchFamily="34" charset="0"/>
+              </a:rPr>
+              <a:t>The idea is to place queens one by one in different columns, starting from the leftmost column.</a:t>
+            </a:r>
+            <a:endParaRPr lang="en-US" sz="1000" dirty="0">
+              <a:solidFill>
+                <a:srgbClr val="000000"/>
+              </a:solidFill>
+              <a:latin typeface="Century Gothic" panose="020B0502020202020204" pitchFamily="34" charset="0"/>
+            </a:endParaRPr>
+          </a:p>
+          <a:p>
+            <a:r>
+              <a:rPr lang="en-US" sz="1000" dirty="0">
+                <a:solidFill>
+                  <a:srgbClr val="008000"/>
+                </a:solidFill>
+                <a:latin typeface="Century Gothic" panose="020B0502020202020204" pitchFamily="34" charset="0"/>
+              </a:rPr>
+              <a:t>When we place a queen in a column, we checked for clashes with already placed queens. </a:t>
+            </a:r>
+            <a:endParaRPr lang="en-US" sz="1000" dirty="0">
+              <a:solidFill>
+                <a:srgbClr val="000000"/>
+              </a:solidFill>
+              <a:latin typeface="Century Gothic" panose="020B0502020202020204" pitchFamily="34" charset="0"/>
+            </a:endParaRPr>
+          </a:p>
+          <a:p>
+            <a:r>
+              <a:rPr lang="en-US" sz="1000" dirty="0">
+                <a:solidFill>
+                  <a:srgbClr val="008000"/>
+                </a:solidFill>
+                <a:latin typeface="Century Gothic" panose="020B0502020202020204" pitchFamily="34" charset="0"/>
+              </a:rPr>
+              <a:t>In the current column, if we find a row for which there is no clash, we mark this row &amp; column</a:t>
+            </a:r>
+            <a:endParaRPr lang="en-US" sz="1000" dirty="0">
+              <a:solidFill>
+                <a:srgbClr val="000000"/>
+              </a:solidFill>
+              <a:latin typeface="Century Gothic" panose="020B0502020202020204" pitchFamily="34" charset="0"/>
+            </a:endParaRPr>
+          </a:p>
+          <a:p>
+            <a:r>
+              <a:rPr lang="en-US" sz="1000" dirty="0">
+                <a:solidFill>
+                  <a:srgbClr val="008000"/>
+                </a:solidFill>
+                <a:latin typeface="Century Gothic" panose="020B0502020202020204" pitchFamily="34" charset="0"/>
+              </a:rPr>
+              <a:t>as part of solution. if we don't find such a row due to clashes, we return false and backtrack.</a:t>
+            </a:r>
+            <a:endParaRPr lang="en-IN" sz="1000" b="1" dirty="0">
+              <a:solidFill>
+                <a:srgbClr val="000000"/>
+              </a:solidFill>
+              <a:latin typeface="Century Gothic" panose="020B0502020202020204" pitchFamily="34" charset="0"/>
+            </a:endParaRPr>
+          </a:p>
+          <a:p>
+            <a:endParaRPr lang="en-IN" sz="1000" b="1" i="0" dirty="0">
+              <a:solidFill>
+                <a:srgbClr val="000000"/>
+              </a:solidFill>
+              <a:effectLst/>
+              <a:latin typeface="Century Gothic" panose="020B0502020202020204" pitchFamily="34" charset="0"/>
+            </a:endParaRPr>
+          </a:p>
+          <a:p>
+            <a:r>
+              <a:rPr lang="en-IN" sz="1000" b="1" i="0" dirty="0">
+                <a:solidFill>
+                  <a:srgbClr val="000000"/>
+                </a:solidFill>
+                <a:effectLst/>
+                <a:latin typeface="Century Gothic" panose="020B0502020202020204" pitchFamily="34" charset="0"/>
+              </a:rPr>
+              <a:t>Code Link : </a:t>
+            </a:r>
+          </a:p>
+          <a:p>
+            <a:endParaRPr lang="en-IN" sz="1000" dirty="0">
+              <a:solidFill>
+                <a:srgbClr val="000000"/>
+              </a:solidFill>
+              <a:latin typeface="Century Gothic" panose="020B0502020202020204" pitchFamily="34" charset="0"/>
+            </a:endParaRPr>
+          </a:p>
+          <a:p>
+            <a:endParaRPr lang="en-IN" sz="1000" b="1" i="0" dirty="0">
+              <a:solidFill>
+                <a:srgbClr val="000000"/>
+              </a:solidFill>
+              <a:effectLst/>
+              <a:latin typeface="Century Gothic" panose="020B0502020202020204" pitchFamily="34" charset="0"/>
+            </a:endParaRPr>
+          </a:p>
+          <a:p>
+            <a:endParaRPr lang="en-US" sz="1000" dirty="0">
+              <a:solidFill>
+                <a:srgbClr val="3D3D4E"/>
+              </a:solidFill>
+              <a:latin typeface="Century Gothic" panose="020B0502020202020204" pitchFamily="34" charset="0"/>
+            </a:endParaRPr>
+          </a:p>
+          <a:p>
+            <a:endParaRPr lang="en-US" sz="1000" dirty="0">
+              <a:solidFill>
+                <a:srgbClr val="3D3D4E"/>
+              </a:solidFill>
+              <a:latin typeface="Century Gothic" panose="020B0502020202020204" pitchFamily="34" charset="0"/>
+            </a:endParaRPr>
+          </a:p>
+          <a:p>
+            <a:endParaRPr lang="en-US" sz="1000" dirty="0">
+              <a:solidFill>
+                <a:srgbClr val="3D3D4E"/>
+              </a:solidFill>
+              <a:latin typeface="Century Gothic" panose="020B0502020202020204" pitchFamily="34" charset="0"/>
+            </a:endParaRPr>
+          </a:p>
+          <a:p>
+            <a:endParaRPr lang="en-US" sz="1000" dirty="0">
+              <a:solidFill>
+                <a:srgbClr val="3D3D4E"/>
+              </a:solidFill>
+              <a:latin typeface="Century Gothic" panose="020B0502020202020204" pitchFamily="34" charset="0"/>
+            </a:endParaRPr>
+          </a:p>
+          <a:p>
+            <a:endParaRPr lang="en-IN" dirty="0"/>
+          </a:p>
+          <a:p>
+            <a:endParaRPr lang="en-IN" dirty="0"/>
+          </a:p>
+        </p:txBody>
+      </p:sp>
+      <p:sp>
+        <p:nvSpPr>
+          <p:cNvPr id="3" name="Rectangle 2">
+            <a:extLst>
+              <a:ext uri="{FF2B5EF4-FFF2-40B4-BE49-F238E27FC236}">
+                <a16:creationId xmlns:a16="http://schemas.microsoft.com/office/drawing/2014/main" id="{F6A7575A-0BA4-4673-99B9-B68ECA40AFA3}"/>
+              </a:ext>
+            </a:extLst>
+          </p:cNvPr>
+          <p:cNvSpPr/>
+          <p:nvPr/>
+        </p:nvSpPr>
+        <p:spPr>
+          <a:xfrm>
+            <a:off x="256374" y="940037"/>
+            <a:ext cx="5913690" cy="4982199"/>
+          </a:xfrm>
+          <a:prstGeom prst="rect">
+            <a:avLst/>
+          </a:prstGeom>
+          <a:solidFill>
+            <a:schemeClr val="accent4">
+              <a:alpha val="50000"/>
+            </a:schemeClr>
+          </a:solidFill>
+          <a:ln>
+            <a:noFill/>
+          </a:ln>
+        </p:spPr>
+        <p:style>
+          <a:lnRef idx="0">
+            <a:scrgbClr r="0" g="0" b="0"/>
+          </a:lnRef>
+          <a:fillRef idx="0">
+            <a:scrgbClr r="0" g="0" b="0"/>
+          </a:fillRef>
+          <a:effectRef idx="0">
+            <a:scrgbClr r="0" g="0" b="0"/>
+          </a:effectRef>
+          <a:fontRef idx="minor">
+            <a:schemeClr val="lt1"/>
+          </a:fontRef>
+        </p:style>
+        <p:txBody>
+          <a:bodyPr rtlCol="0" anchor="ctr"/>
+          <a:lstStyle/>
+          <a:p>
+            <a:pPr algn="ctr"/>
+            <a:endParaRPr lang="en-IN" dirty="0"/>
+          </a:p>
+        </p:txBody>
+      </p:sp>
+      <p:sp>
+        <p:nvSpPr>
+          <p:cNvPr id="10" name="TextBox 9">
+            <a:extLst>
+              <a:ext uri="{FF2B5EF4-FFF2-40B4-BE49-F238E27FC236}">
+                <a16:creationId xmlns:a16="http://schemas.microsoft.com/office/drawing/2014/main" id="{A6CBCF43-9ADC-4F16-888D-6B12DB6EB847}"/>
+              </a:ext>
+            </a:extLst>
+          </p:cNvPr>
+          <p:cNvSpPr txBox="1"/>
+          <p:nvPr/>
+        </p:nvSpPr>
+        <p:spPr>
+          <a:xfrm>
+            <a:off x="6512846" y="991313"/>
+            <a:ext cx="5006885" cy="2339102"/>
+          </a:xfrm>
+          <a:prstGeom prst="rect">
+            <a:avLst/>
+          </a:prstGeom>
+          <a:noFill/>
+        </p:spPr>
+        <p:txBody>
+          <a:bodyPr wrap="square" rtlCol="0">
+            <a:spAutoFit/>
+          </a:bodyPr>
+          <a:lstStyle/>
+          <a:p>
+            <a:r>
+              <a:rPr lang="en-IN" sz="1000" b="1" i="0" dirty="0">
+                <a:solidFill>
+                  <a:srgbClr val="000000"/>
+                </a:solidFill>
+                <a:effectLst/>
+                <a:latin typeface="Nunito Sans" pitchFamily="2" charset="0"/>
+              </a:rPr>
+              <a:t>Rat in a Maze Problem</a:t>
+            </a:r>
+          </a:p>
+          <a:p>
+            <a:r>
+              <a:rPr lang="en-IN" sz="1000" b="1" i="0" dirty="0">
+                <a:effectLst/>
+                <a:latin typeface="Nunito Sans" pitchFamily="2" charset="0"/>
+              </a:rPr>
+              <a:t>Problem statement</a:t>
+            </a:r>
+          </a:p>
+          <a:p>
+            <a:endParaRPr lang="en-IN" sz="1000" b="1" dirty="0">
+              <a:solidFill>
+                <a:srgbClr val="000000"/>
+              </a:solidFill>
+              <a:latin typeface="Nunito Sans" pitchFamily="2" charset="0"/>
+            </a:endParaRPr>
+          </a:p>
+          <a:p>
+            <a:endParaRPr lang="en-IN" sz="1000" b="1" i="0" dirty="0">
+              <a:solidFill>
+                <a:srgbClr val="000000"/>
+              </a:solidFill>
+              <a:effectLst/>
+              <a:latin typeface="Nunito Sans" pitchFamily="2" charset="0"/>
+            </a:endParaRPr>
+          </a:p>
+          <a:p>
+            <a:endParaRPr lang="en-IN" sz="1000" b="1" i="0" dirty="0">
+              <a:solidFill>
+                <a:srgbClr val="000000"/>
+              </a:solidFill>
+              <a:effectLst/>
+              <a:latin typeface="Nunito Sans" pitchFamily="2" charset="0"/>
+            </a:endParaRPr>
+          </a:p>
+          <a:p>
+            <a:endParaRPr lang="en-IN" sz="1000" dirty="0">
+              <a:solidFill>
+                <a:srgbClr val="008000"/>
+              </a:solidFill>
+              <a:latin typeface="Century Gothic" panose="020B0502020202020204" pitchFamily="34" charset="0"/>
+            </a:endParaRPr>
+          </a:p>
+          <a:p>
+            <a:endParaRPr lang="en-IN" sz="1000" b="1" i="0" dirty="0">
+              <a:solidFill>
+                <a:srgbClr val="000000"/>
+              </a:solidFill>
+              <a:effectLst/>
+              <a:latin typeface="Century Gothic" panose="020B0502020202020204" pitchFamily="34" charset="0"/>
+            </a:endParaRPr>
+          </a:p>
+          <a:p>
+            <a:endParaRPr lang="en-US" sz="1000" dirty="0">
+              <a:solidFill>
+                <a:srgbClr val="3D3D4E"/>
+              </a:solidFill>
+              <a:latin typeface="Century Gothic" panose="020B0502020202020204" pitchFamily="34" charset="0"/>
+            </a:endParaRPr>
+          </a:p>
+          <a:p>
+            <a:endParaRPr lang="en-US" sz="1000" dirty="0">
+              <a:solidFill>
+                <a:srgbClr val="3D3D4E"/>
+              </a:solidFill>
+              <a:latin typeface="Century Gothic" panose="020B0502020202020204" pitchFamily="34" charset="0"/>
+            </a:endParaRPr>
+          </a:p>
+          <a:p>
+            <a:endParaRPr lang="en-US" sz="1000" dirty="0">
+              <a:solidFill>
+                <a:srgbClr val="3D3D4E"/>
+              </a:solidFill>
+              <a:latin typeface="Century Gothic" panose="020B0502020202020204" pitchFamily="34" charset="0"/>
+            </a:endParaRPr>
+          </a:p>
+          <a:p>
+            <a:endParaRPr lang="en-US" sz="1000" dirty="0">
+              <a:solidFill>
+                <a:srgbClr val="3D3D4E"/>
+              </a:solidFill>
+              <a:latin typeface="Century Gothic" panose="020B0502020202020204" pitchFamily="34" charset="0"/>
+            </a:endParaRPr>
+          </a:p>
+          <a:p>
+            <a:endParaRPr lang="en-IN" dirty="0"/>
+          </a:p>
+          <a:p>
+            <a:endParaRPr lang="en-IN" dirty="0"/>
+          </a:p>
+        </p:txBody>
+      </p:sp>
+      <p:pic>
+        <p:nvPicPr>
+          <p:cNvPr id="5" name="Picture 4">
+            <a:extLst>
+              <a:ext uri="{FF2B5EF4-FFF2-40B4-BE49-F238E27FC236}">
+                <a16:creationId xmlns:a16="http://schemas.microsoft.com/office/drawing/2014/main" id="{78AC6497-C445-483F-AB59-F12F1269F26A}"/>
+              </a:ext>
+            </a:extLst>
+          </p:cNvPr>
+          <p:cNvPicPr>
+            <a:picLocks noChangeAspect="1"/>
+          </p:cNvPicPr>
+          <p:nvPr/>
+        </p:nvPicPr>
+        <p:blipFill>
+          <a:blip r:embed="rId2"/>
+          <a:stretch>
+            <a:fillRect/>
+          </a:stretch>
+        </p:blipFill>
+        <p:spPr>
+          <a:xfrm>
+            <a:off x="1479054" y="4122028"/>
+            <a:ext cx="3400596" cy="1658671"/>
+          </a:xfrm>
+          <a:prstGeom prst="rect">
+            <a:avLst/>
+          </a:prstGeom>
+        </p:spPr>
+      </p:pic>
+    </p:spTree>
+    <p:extLst>
+      <p:ext uri="{BB962C8B-B14F-4D97-AF65-F5344CB8AC3E}">
+        <p14:creationId xmlns:p14="http://schemas.microsoft.com/office/powerpoint/2010/main" val="3717722501"/>
+      </p:ext>
+    </p:extLst>
+  </p:cSld>
+  <p:clrMapOvr>
+    <a:masterClrMapping/>
+  </p:clrMapOvr>
+</p:sld>
+</file>
+
 <file path=ppt/slides/slide2.xml><?xml version="1.0" encoding="utf-8"?>
 <p:sld xmlns:a="http://schemas.openxmlformats.org/drawingml/2006/main" xmlns:r="http://schemas.openxmlformats.org/officeDocument/2006/relationships" xmlns:p="http://schemas.openxmlformats.org/presentationml/2006/main">
   <p:cSld>
@@ -7066,19 +7803,8 @@
                 <a:effectLst/>
                 <a:latin typeface="Nunito Sans" pitchFamily="2" charset="0"/>
               </a:rPr>
-              <a:t>Recursion &amp; Backtracking – Recursion </a:t>
-            </a:r>
-            <a:r>
-              <a:rPr lang="en-IN" b="1" i="0">
-                <a:effectLst/>
-                <a:latin typeface="Nunito Sans" pitchFamily="2" charset="0"/>
-              </a:rPr>
-              <a:t>vs Iteration </a:t>
-            </a:r>
-            <a:endParaRPr lang="en-IN" b="1" i="0" dirty="0">
-              <a:effectLst/>
-              <a:latin typeface="Nunito Sans" pitchFamily="2" charset="0"/>
-            </a:endParaRPr>
+              <a:t>Recursion &amp; Backtracking – Recursion vs Iteration </a:t>
+            </a:r>
           </a:p>
           <a:p>
             <a:pPr algn="ctr"/>
@@ -7323,7 +8049,7 @@
                 </a:solidFill>
                 <a:latin typeface="Century Gothic" panose="020B0502020202020204" pitchFamily="34" charset="0"/>
               </a:rPr>
-              <a:t>Advantages</a:t>
+              <a:t>Iteration</a:t>
             </a:r>
           </a:p>
           <a:p>
@@ -7341,59 +8067,28 @@
             </a:endParaRPr>
           </a:p>
           <a:p>
-            <a:pPr>
+            <a:pPr marL="0" indent="0">
               <a:spcBef>
                 <a:spcPts val="0"/>
               </a:spcBef>
-              <a:buFont typeface="Wingdings" panose="05000000000000000000" pitchFamily="2" charset="2"/>
-              <a:buChar char="ü"/>
-            </a:pPr>
-            <a:r>
-              <a:rPr lang="en-US" sz="1000" i="0" dirty="0">
-                <a:solidFill>
-                  <a:srgbClr val="3D3D4E"/>
-                </a:solidFill>
-                <a:effectLst/>
-                <a:latin typeface="Century Gothic" panose="020B0502020202020204" pitchFamily="34" charset="0"/>
-              </a:rPr>
-              <a:t>Code is simpler and it has limited case to handle</a:t>
-            </a:r>
-            <a:r>
-              <a:rPr lang="en-IN" sz="1000" i="0" dirty="0">
+              <a:buNone/>
+            </a:pPr>
+            <a:r>
+              <a:rPr lang="en-IN" sz="1000" dirty="0">
                 <a:solidFill>
                   <a:srgbClr val="000000"/>
                 </a:solidFill>
-                <a:effectLst/>
-                <a:latin typeface="Century Gothic" panose="020B0502020202020204" pitchFamily="34" charset="0"/>
-              </a:rPr>
-              <a:t>. Meaning every recursion method have only two step ( base condition and recursion relationship )</a:t>
-            </a:r>
-          </a:p>
-          <a:p>
-            <a:pPr>
+                <a:latin typeface="Century Gothic" panose="020B0502020202020204" pitchFamily="34" charset="0"/>
+              </a:rPr>
+              <a:t>Iterative code is much like recursion. It is a loop of repeating the same task again &amp; again. If so than this is doing the same what recursion is doing for me. Then what is the difference in them?</a:t>
+            </a:r>
+          </a:p>
+          <a:p>
+            <a:pPr marL="0" indent="0">
               <a:spcBef>
                 <a:spcPts val="0"/>
               </a:spcBef>
-              <a:buFont typeface="Wingdings" panose="05000000000000000000" pitchFamily="2" charset="2"/>
-              <a:buChar char="ü"/>
-            </a:pPr>
-            <a:r>
-              <a:rPr lang="en-IN" sz="1000" dirty="0">
-                <a:solidFill>
-                  <a:srgbClr val="000000"/>
-                </a:solidFill>
-                <a:latin typeface="Century Gothic" panose="020B0502020202020204" pitchFamily="34" charset="0"/>
-              </a:rPr>
-              <a:t>Some problems are inherently recursive for example Graph and Tree etc.</a:t>
-            </a:r>
-          </a:p>
-          <a:p>
-            <a:pPr>
-              <a:spcBef>
-                <a:spcPts val="0"/>
-              </a:spcBef>
-              <a:buFont typeface="Wingdings" panose="05000000000000000000" pitchFamily="2" charset="2"/>
-              <a:buChar char="ü"/>
+              <a:buNone/>
             </a:pPr>
             <a:endParaRPr lang="en-IN" sz="1000" dirty="0">
               <a:solidFill>
@@ -7403,12 +8098,192 @@
             </a:endParaRPr>
           </a:p>
           <a:p>
+            <a:pPr marL="0" indent="0">
+              <a:spcBef>
+                <a:spcPts val="0"/>
+              </a:spcBef>
+              <a:buNone/>
+            </a:pPr>
+            <a:r>
+              <a:rPr lang="en-IN" sz="1000" b="1" dirty="0">
+                <a:solidFill>
+                  <a:srgbClr val="000000"/>
+                </a:solidFill>
+                <a:latin typeface="Century Gothic" panose="020B0502020202020204" pitchFamily="34" charset="0"/>
+              </a:rPr>
+              <a:t>Yes, </a:t>
+            </a:r>
+            <a:r>
+              <a:rPr lang="en-IN" sz="1000" dirty="0">
+                <a:solidFill>
+                  <a:srgbClr val="000000"/>
+                </a:solidFill>
+                <a:latin typeface="Century Gothic" panose="020B0502020202020204" pitchFamily="34" charset="0"/>
+              </a:rPr>
+              <a:t>There are good number of differences between them,</a:t>
+            </a:r>
+          </a:p>
+          <a:p>
+            <a:pPr marL="0" indent="0">
+              <a:spcBef>
+                <a:spcPts val="0"/>
+              </a:spcBef>
+              <a:buNone/>
+            </a:pPr>
+            <a:endParaRPr lang="en-IN" sz="1000" b="1" dirty="0">
+              <a:solidFill>
+                <a:srgbClr val="000000"/>
+              </a:solidFill>
+              <a:latin typeface="Century Gothic" panose="020B0502020202020204" pitchFamily="34" charset="0"/>
+            </a:endParaRPr>
+          </a:p>
+          <a:p>
             <a:pPr>
               <a:spcBef>
                 <a:spcPts val="0"/>
               </a:spcBef>
               <a:buFont typeface="Wingdings" panose="05000000000000000000" pitchFamily="2" charset="2"/>
               <a:buChar char="ü"/>
+            </a:pPr>
+            <a:r>
+              <a:rPr lang="en-US" sz="1000" b="0" i="0" dirty="0">
+                <a:solidFill>
+                  <a:srgbClr val="3D3D4E"/>
+                </a:solidFill>
+                <a:effectLst/>
+                <a:latin typeface="Century Gothic" panose="020B0502020202020204" pitchFamily="34" charset="0"/>
+              </a:rPr>
+              <a:t>Recursion uses the </a:t>
+            </a:r>
+            <a:r>
+              <a:rPr lang="en-US" sz="1000" b="1" i="0" dirty="0">
+                <a:solidFill>
+                  <a:srgbClr val="3D3D4E"/>
+                </a:solidFill>
+                <a:effectLst/>
+                <a:latin typeface="Century Gothic" panose="020B0502020202020204" pitchFamily="34" charset="0"/>
+              </a:rPr>
+              <a:t>system</a:t>
+            </a:r>
+            <a:r>
+              <a:rPr lang="en-US" sz="1000" b="0" i="0" dirty="0">
+                <a:solidFill>
+                  <a:srgbClr val="3D3D4E"/>
+                </a:solidFill>
+                <a:effectLst/>
+                <a:latin typeface="Century Gothic" panose="020B0502020202020204" pitchFamily="34" charset="0"/>
+              </a:rPr>
+              <a:t> </a:t>
+            </a:r>
+            <a:r>
+              <a:rPr lang="en-US" sz="1000" b="1" i="0" dirty="0">
+                <a:solidFill>
+                  <a:srgbClr val="3D3D4E"/>
+                </a:solidFill>
+                <a:effectLst/>
+                <a:latin typeface="Century Gothic" panose="020B0502020202020204" pitchFamily="34" charset="0"/>
+              </a:rPr>
+              <a:t>stack</a:t>
+            </a:r>
+            <a:r>
+              <a:rPr lang="en-US" sz="1000" b="0" i="0" dirty="0">
+                <a:solidFill>
+                  <a:srgbClr val="3D3D4E"/>
+                </a:solidFill>
+                <a:effectLst/>
+                <a:latin typeface="Century Gothic" panose="020B0502020202020204" pitchFamily="34" charset="0"/>
+              </a:rPr>
+              <a:t> to store the variable changes for each recursive call, whereas iterative code does not.</a:t>
+            </a:r>
+          </a:p>
+          <a:p>
+            <a:pPr>
+              <a:spcBef>
+                <a:spcPts val="0"/>
+              </a:spcBef>
+              <a:buFont typeface="Wingdings" panose="05000000000000000000" pitchFamily="2" charset="2"/>
+              <a:buChar char="ü"/>
+            </a:pPr>
+            <a:endParaRPr lang="en-US" sz="1000" dirty="0">
+              <a:solidFill>
+                <a:srgbClr val="3D3D4E"/>
+              </a:solidFill>
+              <a:latin typeface="Century Gothic" panose="020B0502020202020204" pitchFamily="34" charset="0"/>
+            </a:endParaRPr>
+          </a:p>
+          <a:p>
+            <a:pPr>
+              <a:spcBef>
+                <a:spcPts val="0"/>
+              </a:spcBef>
+              <a:buFont typeface="Wingdings" panose="05000000000000000000" pitchFamily="2" charset="2"/>
+              <a:buChar char="ü"/>
+            </a:pPr>
+            <a:r>
+              <a:rPr lang="en-US" sz="1000" b="0" i="0" dirty="0">
+                <a:solidFill>
+                  <a:srgbClr val="3D3D4E"/>
+                </a:solidFill>
+                <a:effectLst/>
+                <a:latin typeface="Century Gothic" panose="020B0502020202020204" pitchFamily="34" charset="0"/>
+              </a:rPr>
+              <a:t>Recursive code have overhead of space and time compared with iterative code</a:t>
+            </a:r>
+          </a:p>
+          <a:p>
+            <a:pPr>
+              <a:spcBef>
+                <a:spcPts val="0"/>
+              </a:spcBef>
+              <a:buFont typeface="Wingdings" panose="05000000000000000000" pitchFamily="2" charset="2"/>
+              <a:buChar char="ü"/>
+            </a:pPr>
+            <a:endParaRPr lang="en-US" sz="1000" dirty="0">
+              <a:solidFill>
+                <a:srgbClr val="3D3D4E"/>
+              </a:solidFill>
+              <a:latin typeface="Century Gothic" panose="020B0502020202020204" pitchFamily="34" charset="0"/>
+            </a:endParaRPr>
+          </a:p>
+          <a:p>
+            <a:pPr>
+              <a:spcBef>
+                <a:spcPts val="0"/>
+              </a:spcBef>
+              <a:buFont typeface="Wingdings" panose="05000000000000000000" pitchFamily="2" charset="2"/>
+              <a:buChar char="ü"/>
+            </a:pPr>
+            <a:r>
+              <a:rPr lang="en-US" sz="1000" b="0" i="0" dirty="0">
+                <a:solidFill>
+                  <a:srgbClr val="3D3D4E"/>
+                </a:solidFill>
+                <a:effectLst/>
+                <a:latin typeface="Century Gothic" panose="020B0502020202020204" pitchFamily="34" charset="0"/>
+              </a:rPr>
+              <a:t>Recursive code is smaller and neater than iterative code</a:t>
+            </a:r>
+          </a:p>
+          <a:p>
+            <a:pPr marL="0" indent="0">
+              <a:spcBef>
+                <a:spcPts val="0"/>
+              </a:spcBef>
+              <a:buNone/>
+            </a:pPr>
+            <a:endParaRPr lang="en-US" sz="1000" dirty="0">
+              <a:solidFill>
+                <a:srgbClr val="3D3D4E"/>
+              </a:solidFill>
+              <a:latin typeface="Century Gothic" panose="020B0502020202020204" pitchFamily="34" charset="0"/>
+            </a:endParaRPr>
+          </a:p>
+          <a:p>
+            <a:pPr marL="0" indent="0">
+              <a:spcBef>
+                <a:spcPts val="0"/>
+              </a:spcBef>
+              <a:buNone/>
             </a:pPr>
             <a:endParaRPr lang="en-IN" sz="1000" dirty="0">
               <a:solidFill>
@@ -7424,145 +8299,86 @@
               </a:spcBef>
               <a:buNone/>
             </a:pPr>
-            <a:endParaRPr lang="en-IN" sz="1000" dirty="0">
-              <a:solidFill>
-                <a:srgbClr val="000000"/>
-              </a:solidFill>
-              <a:latin typeface="Century Gothic" panose="020B0502020202020204" pitchFamily="34" charset="0"/>
-            </a:endParaRPr>
-          </a:p>
-          <a:p>
-            <a:pPr marL="0" indent="0">
-              <a:spcBef>
-                <a:spcPts val="0"/>
-              </a:spcBef>
-              <a:buNone/>
-            </a:pPr>
-            <a:endParaRPr lang="en-IN" sz="1000" dirty="0">
-              <a:solidFill>
-                <a:srgbClr val="000000"/>
-              </a:solidFill>
-              <a:latin typeface="Century Gothic" panose="020B0502020202020204" pitchFamily="34" charset="0"/>
-            </a:endParaRPr>
-          </a:p>
-          <a:p>
-            <a:pPr marL="0" indent="0">
-              <a:spcBef>
-                <a:spcPts val="0"/>
-              </a:spcBef>
-              <a:buNone/>
-            </a:pPr>
-            <a:endParaRPr lang="en-IN" sz="1000" dirty="0">
-              <a:solidFill>
-                <a:srgbClr val="000000"/>
-              </a:solidFill>
-              <a:latin typeface="Century Gothic" panose="020B0502020202020204" pitchFamily="34" charset="0"/>
-            </a:endParaRPr>
-          </a:p>
-          <a:p>
-            <a:pPr marL="0" indent="0">
-              <a:spcBef>
-                <a:spcPts val="0"/>
-              </a:spcBef>
-              <a:buNone/>
-            </a:pPr>
-            <a:endParaRPr lang="en-IN" sz="1000" dirty="0">
-              <a:solidFill>
-                <a:srgbClr val="000000"/>
-              </a:solidFill>
-              <a:latin typeface="Century Gothic" panose="020B0502020202020204" pitchFamily="34" charset="0"/>
-            </a:endParaRPr>
-          </a:p>
-          <a:p>
-            <a:pPr marL="0" indent="0">
-              <a:spcBef>
-                <a:spcPts val="0"/>
-              </a:spcBef>
-              <a:buNone/>
-            </a:pPr>
-            <a:endParaRPr lang="en-IN" sz="1000" dirty="0">
-              <a:solidFill>
-                <a:srgbClr val="000000"/>
-              </a:solidFill>
-              <a:latin typeface="Century Gothic" panose="020B0502020202020204" pitchFamily="34" charset="0"/>
-            </a:endParaRPr>
-          </a:p>
-          <a:p>
-            <a:pPr marL="0" indent="0">
-              <a:spcBef>
-                <a:spcPts val="0"/>
-              </a:spcBef>
-              <a:buNone/>
-            </a:pPr>
-            <a:r>
-              <a:rPr lang="en-IN" sz="1000" b="1" dirty="0">
-                <a:solidFill>
-                  <a:srgbClr val="000000"/>
-                </a:solidFill>
-                <a:latin typeface="Century Gothic" panose="020B0502020202020204" pitchFamily="34" charset="0"/>
-              </a:rPr>
-              <a:t>Disadvantages</a:t>
-            </a:r>
-          </a:p>
-          <a:p>
-            <a:pPr>
-              <a:spcBef>
-                <a:spcPts val="0"/>
-              </a:spcBef>
-              <a:buFont typeface="Wingdings" panose="05000000000000000000" pitchFamily="2" charset="2"/>
-              <a:buChar char="ü"/>
-            </a:pPr>
-            <a:endParaRPr lang="en-IN" sz="1000" dirty="0">
-              <a:solidFill>
-                <a:srgbClr val="000000"/>
-              </a:solidFill>
-              <a:latin typeface="Century Gothic" panose="020B0502020202020204" pitchFamily="34" charset="0"/>
-            </a:endParaRPr>
-          </a:p>
-          <a:p>
-            <a:pPr>
-              <a:spcBef>
-                <a:spcPts val="0"/>
-              </a:spcBef>
-              <a:buFont typeface="Wingdings" panose="05000000000000000000" pitchFamily="2" charset="2"/>
-              <a:buChar char="ü"/>
-            </a:pPr>
-            <a:r>
-              <a:rPr lang="en-IN" sz="1000" dirty="0">
-                <a:solidFill>
-                  <a:srgbClr val="000000"/>
-                </a:solidFill>
-                <a:latin typeface="Century Gothic" panose="020B0502020202020204" pitchFamily="34" charset="0"/>
-              </a:rPr>
-              <a:t>Recursion method have bigger memory requirement than their Iterative version</a:t>
-            </a:r>
-          </a:p>
-          <a:p>
-            <a:pPr>
-              <a:spcBef>
-                <a:spcPts val="0"/>
-              </a:spcBef>
-              <a:buFont typeface="Wingdings" panose="05000000000000000000" pitchFamily="2" charset="2"/>
-              <a:buChar char="ü"/>
-            </a:pPr>
-            <a:r>
-              <a:rPr lang="en-IN" sz="1000" dirty="0">
-                <a:solidFill>
-                  <a:srgbClr val="000000"/>
-                </a:solidFill>
-                <a:latin typeface="Century Gothic" panose="020B0502020202020204" pitchFamily="34" charset="0"/>
-              </a:rPr>
-              <a:t>In theory recursion is taking more time than iterative method</a:t>
-            </a:r>
-          </a:p>
-          <a:p>
-            <a:pPr>
-              <a:spcBef>
-                <a:spcPts val="0"/>
-              </a:spcBef>
-              <a:buFont typeface="Wingdings" panose="05000000000000000000" pitchFamily="2" charset="2"/>
-              <a:buChar char="ü"/>
-            </a:pPr>
+            <a:r>
+              <a:rPr lang="en-US" sz="1000" b="1" i="0" dirty="0">
+                <a:solidFill>
+                  <a:srgbClr val="3D3D4E"/>
+                </a:solidFill>
+                <a:effectLst/>
+                <a:latin typeface="Century Gothic" panose="020B0502020202020204" pitchFamily="34" charset="0"/>
+              </a:rPr>
+              <a:t>Recursion</a:t>
+            </a:r>
+            <a:r>
+              <a:rPr lang="en-US" sz="1000" b="0" i="0" dirty="0">
+                <a:solidFill>
+                  <a:srgbClr val="3D3D4E"/>
+                </a:solidFill>
+                <a:effectLst/>
+                <a:latin typeface="Century Gothic" panose="020B0502020202020204" pitchFamily="34" charset="0"/>
+              </a:rPr>
+              <a:t> provides us with </a:t>
+            </a:r>
+            <a:r>
+              <a:rPr lang="en-US" sz="1000" b="1" i="0" dirty="0">
+                <a:solidFill>
+                  <a:srgbClr val="3D3D4E"/>
+                </a:solidFill>
+                <a:effectLst/>
+                <a:latin typeface="Century Gothic" panose="020B0502020202020204" pitchFamily="34" charset="0"/>
+              </a:rPr>
+              <a:t>neater</a:t>
+            </a:r>
+            <a:r>
+              <a:rPr lang="en-US" sz="1000" b="0" i="0" dirty="0">
+                <a:solidFill>
+                  <a:srgbClr val="3D3D4E"/>
+                </a:solidFill>
+                <a:effectLst/>
+                <a:latin typeface="Century Gothic" panose="020B0502020202020204" pitchFamily="34" charset="0"/>
+              </a:rPr>
+              <a:t>, more concise code but more than that it gives us the </a:t>
+            </a:r>
+            <a:r>
+              <a:rPr lang="en-US" sz="1000" b="1" i="0" dirty="0">
+                <a:solidFill>
+                  <a:srgbClr val="3D3D4E"/>
+                </a:solidFill>
+                <a:effectLst/>
+                <a:latin typeface="Century Gothic" panose="020B0502020202020204" pitchFamily="34" charset="0"/>
+              </a:rPr>
+              <a:t>advantage of a stack that tracks all memory changes</a:t>
+            </a:r>
+            <a:r>
+              <a:rPr lang="en-US" sz="1000" b="0" i="0" dirty="0">
+                <a:solidFill>
+                  <a:srgbClr val="3D3D4E"/>
+                </a:solidFill>
+                <a:effectLst/>
+                <a:latin typeface="Century Gothic" panose="020B0502020202020204" pitchFamily="34" charset="0"/>
+              </a:rPr>
+              <a:t>. For this reason, in problems like </a:t>
+            </a:r>
+            <a:r>
+              <a:rPr lang="en-US" sz="1000" b="1" i="1" dirty="0">
+                <a:solidFill>
+                  <a:srgbClr val="3D3D4E"/>
+                </a:solidFill>
+                <a:effectLst/>
+                <a:latin typeface="Century Gothic" panose="020B0502020202020204" pitchFamily="34" charset="0"/>
+              </a:rPr>
+              <a:t>quicksort</a:t>
+            </a:r>
+            <a:r>
+              <a:rPr lang="en-US" sz="1000" b="0" i="0" dirty="0">
+                <a:solidFill>
+                  <a:srgbClr val="3D3D4E"/>
+                </a:solidFill>
+                <a:effectLst/>
+                <a:latin typeface="Century Gothic" panose="020B0502020202020204" pitchFamily="34" charset="0"/>
+              </a:rPr>
+              <a:t>, recursion becomes a better solution as the recursion stack makes it easier to implement the sorting algorithm.</a:t>
+            </a:r>
             <a:endParaRPr lang="en-IN" sz="1000" dirty="0">
               <a:solidFill>
                 <a:srgbClr val="000000"/>
@@ -7607,20 +8423,76 @@
               </a:spcBef>
               <a:buNone/>
             </a:pPr>
-            <a:endParaRPr lang="en-IN" sz="1000" dirty="0">
-              <a:solidFill>
-                <a:srgbClr val="000000"/>
-              </a:solidFill>
-              <a:latin typeface="Century Gothic" panose="020B0502020202020204" pitchFamily="34" charset="0"/>
-            </a:endParaRPr>
-          </a:p>
-          <a:p>
-            <a:pPr marL="0" indent="0">
-              <a:spcBef>
-                <a:spcPts val="0"/>
-              </a:spcBef>
-              <a:buNone/>
-            </a:pPr>
+            <a:r>
+              <a:rPr lang="en-US" sz="1000" b="0" i="0" dirty="0">
+                <a:solidFill>
+                  <a:srgbClr val="3D3D4E"/>
+                </a:solidFill>
+                <a:effectLst/>
+                <a:latin typeface="Century Gothic" panose="020B0502020202020204" pitchFamily="34" charset="0"/>
+              </a:rPr>
+              <a:t>On the other hand, </a:t>
+            </a:r>
+            <a:r>
+              <a:rPr lang="en-US" sz="1000" b="1" i="0" dirty="0">
+                <a:solidFill>
+                  <a:srgbClr val="3D3D4E"/>
+                </a:solidFill>
+                <a:effectLst/>
+                <a:latin typeface="Century Gothic" panose="020B0502020202020204" pitchFamily="34" charset="0"/>
+              </a:rPr>
+              <a:t>iteration is faster and more useful to solve simple problems</a:t>
+            </a:r>
+            <a:r>
+              <a:rPr lang="en-US" sz="1000" b="0" i="0" dirty="0">
+                <a:solidFill>
+                  <a:srgbClr val="3D3D4E"/>
+                </a:solidFill>
+                <a:effectLst/>
+                <a:latin typeface="Century Gothic" panose="020B0502020202020204" pitchFamily="34" charset="0"/>
+              </a:rPr>
+              <a:t> like </a:t>
+            </a:r>
+            <a:r>
+              <a:rPr lang="en-US" sz="1000" b="0" i="1" dirty="0">
+                <a:solidFill>
+                  <a:srgbClr val="3D3D4E"/>
+                </a:solidFill>
+                <a:effectLst/>
+                <a:latin typeface="Century Gothic" panose="020B0502020202020204" pitchFamily="34" charset="0"/>
+              </a:rPr>
+              <a:t>printing a string letter by letter</a:t>
+            </a:r>
+            <a:r>
+              <a:rPr lang="en-US" sz="1000" b="0" i="0" dirty="0">
+                <a:solidFill>
+                  <a:srgbClr val="3D3D4E"/>
+                </a:solidFill>
+                <a:effectLst/>
+                <a:latin typeface="Century Gothic" panose="020B0502020202020204" pitchFamily="34" charset="0"/>
+              </a:rPr>
+              <a:t>, where the </a:t>
+            </a:r>
+            <a:r>
+              <a:rPr lang="en-US" sz="1000" b="1" i="0" dirty="0">
+                <a:solidFill>
+                  <a:srgbClr val="3D3D4E"/>
+                </a:solidFill>
+                <a:effectLst/>
+                <a:latin typeface="Century Gothic" panose="020B0502020202020204" pitchFamily="34" charset="0"/>
+              </a:rPr>
+              <a:t>recursion stack just takes up extra memory</a:t>
+            </a:r>
+            <a:r>
+              <a:rPr lang="en-US" sz="1000" b="0" i="0" dirty="0">
+                <a:solidFill>
+                  <a:srgbClr val="3D3D4E"/>
+                </a:solidFill>
+                <a:effectLst/>
+                <a:latin typeface="Century Gothic" panose="020B0502020202020204" pitchFamily="34" charset="0"/>
+              </a:rPr>
+              <a:t>.</a:t>
+            </a:r>
             <a:endParaRPr lang="en-IN" sz="1000" i="0" dirty="0">
               <a:solidFill>
                 <a:srgbClr val="000000"/>
@@ -7640,181 +8512,6 @@
               <a:solidFill>
                 <a:srgbClr val="000000"/>
               </a:solidFill>
-              <a:latin typeface="Century Gothic" panose="020B0502020202020204" pitchFamily="34" charset="0"/>
-            </a:endParaRPr>
-          </a:p>
-          <a:p>
-            <a:pPr marL="0" indent="0">
-              <a:spcBef>
-                <a:spcPts val="0"/>
-              </a:spcBef>
-              <a:buNone/>
-            </a:pPr>
-            <a:endParaRPr lang="en-IN" sz="1000" i="0" dirty="0">
-              <a:solidFill>
-                <a:srgbClr val="000000"/>
-              </a:solidFill>
-              <a:effectLst/>
-              <a:latin typeface="Century Gothic" panose="020B0502020202020204" pitchFamily="34" charset="0"/>
-            </a:endParaRPr>
-          </a:p>
-          <a:p>
-            <a:pPr marL="0" indent="0">
-              <a:spcBef>
-                <a:spcPts val="0"/>
-              </a:spcBef>
-              <a:buNone/>
-            </a:pPr>
-            <a:endParaRPr lang="en-IN" sz="1000" dirty="0">
-              <a:solidFill>
-                <a:srgbClr val="000000"/>
-              </a:solidFill>
-              <a:latin typeface="Century Gothic" panose="020B0502020202020204" pitchFamily="34" charset="0"/>
-            </a:endParaRPr>
-          </a:p>
-          <a:p>
-            <a:pPr marL="0" indent="0">
-              <a:spcBef>
-                <a:spcPts val="0"/>
-              </a:spcBef>
-              <a:buNone/>
-            </a:pPr>
-            <a:endParaRPr lang="en-IN" sz="1000" i="0" dirty="0">
-              <a:solidFill>
-                <a:srgbClr val="000000"/>
-              </a:solidFill>
-              <a:effectLst/>
-              <a:latin typeface="Century Gothic" panose="020B0502020202020204" pitchFamily="34" charset="0"/>
-            </a:endParaRPr>
-          </a:p>
-          <a:p>
-            <a:pPr marL="0" indent="0">
-              <a:spcBef>
-                <a:spcPts val="0"/>
-              </a:spcBef>
-              <a:buNone/>
-            </a:pPr>
-            <a:endParaRPr lang="en-IN" sz="1000" dirty="0">
-              <a:solidFill>
-                <a:srgbClr val="000000"/>
-              </a:solidFill>
-              <a:latin typeface="Century Gothic" panose="020B0502020202020204" pitchFamily="34" charset="0"/>
-            </a:endParaRPr>
-          </a:p>
-          <a:p>
-            <a:pPr marL="0" indent="0">
-              <a:spcBef>
-                <a:spcPts val="0"/>
-              </a:spcBef>
-              <a:buNone/>
-            </a:pPr>
-            <a:endParaRPr lang="en-IN" sz="1000" i="0" dirty="0">
-              <a:solidFill>
-                <a:srgbClr val="000000"/>
-              </a:solidFill>
-              <a:effectLst/>
-              <a:latin typeface="Century Gothic" panose="020B0502020202020204" pitchFamily="34" charset="0"/>
-            </a:endParaRPr>
-          </a:p>
-          <a:p>
-            <a:pPr marL="0" indent="0">
-              <a:spcBef>
-                <a:spcPts val="0"/>
-              </a:spcBef>
-              <a:buNone/>
-            </a:pPr>
-            <a:endParaRPr lang="en-IN" sz="1000" dirty="0">
-              <a:solidFill>
-                <a:srgbClr val="000000"/>
-              </a:solidFill>
-              <a:latin typeface="Century Gothic" panose="020B0502020202020204" pitchFamily="34" charset="0"/>
-            </a:endParaRPr>
-          </a:p>
-          <a:p>
-            <a:pPr marL="0" indent="0">
-              <a:spcBef>
-                <a:spcPts val="0"/>
-              </a:spcBef>
-              <a:buNone/>
-            </a:pPr>
-            <a:endParaRPr lang="en-IN" sz="1000" i="0" dirty="0">
-              <a:solidFill>
-                <a:srgbClr val="000000"/>
-              </a:solidFill>
-              <a:effectLst/>
-              <a:latin typeface="Century Gothic" panose="020B0502020202020204" pitchFamily="34" charset="0"/>
-            </a:endParaRPr>
-          </a:p>
-          <a:p>
-            <a:pPr marL="0" indent="0">
-              <a:spcBef>
-                <a:spcPts val="0"/>
-              </a:spcBef>
-              <a:buNone/>
-            </a:pPr>
-            <a:endParaRPr lang="en-IN" sz="1000" dirty="0">
-              <a:solidFill>
-                <a:srgbClr val="000000"/>
-              </a:solidFill>
-              <a:latin typeface="Century Gothic" panose="020B0502020202020204" pitchFamily="34" charset="0"/>
-            </a:endParaRPr>
-          </a:p>
-          <a:p>
-            <a:pPr marL="0" indent="0">
-              <a:spcBef>
-                <a:spcPts val="0"/>
-              </a:spcBef>
-              <a:buNone/>
-            </a:pPr>
-            <a:endParaRPr lang="en-IN" sz="1000" i="0" dirty="0">
-              <a:solidFill>
-                <a:srgbClr val="000000"/>
-              </a:solidFill>
-              <a:effectLst/>
-              <a:latin typeface="Century Gothic" panose="020B0502020202020204" pitchFamily="34" charset="0"/>
-            </a:endParaRPr>
-          </a:p>
-          <a:p>
-            <a:pPr marL="0" indent="0">
-              <a:spcBef>
-                <a:spcPts val="0"/>
-              </a:spcBef>
-              <a:buNone/>
-            </a:pPr>
-            <a:endParaRPr lang="en-IN" sz="1000" dirty="0">
-              <a:solidFill>
-                <a:srgbClr val="000000"/>
-              </a:solidFill>
-              <a:latin typeface="Century Gothic" panose="020B0502020202020204" pitchFamily="34" charset="0"/>
-            </a:endParaRPr>
-          </a:p>
-          <a:p>
-            <a:pPr marL="0" indent="0">
-              <a:spcBef>
-                <a:spcPts val="0"/>
-              </a:spcBef>
-              <a:buNone/>
-            </a:pPr>
-            <a:endParaRPr lang="en-IN" sz="1000" i="0" dirty="0">
-              <a:solidFill>
-                <a:srgbClr val="000000"/>
-              </a:solidFill>
-              <a:effectLst/>
-              <a:latin typeface="Century Gothic" panose="020B0502020202020204" pitchFamily="34" charset="0"/>
-            </a:endParaRPr>
-          </a:p>
-          <a:p>
-            <a:pPr marL="0" indent="0">
-              <a:spcBef>
-                <a:spcPts val="0"/>
-              </a:spcBef>
-              <a:buNone/>
-            </a:pPr>
-            <a:endParaRPr lang="en-IN" sz="1000" i="0" dirty="0">
-              <a:solidFill>
-                <a:srgbClr val="000000"/>
-              </a:solidFill>
-              <a:effectLst/>
               <a:latin typeface="Century Gothic" panose="020B0502020202020204" pitchFamily="34" charset="0"/>
             </a:endParaRPr>
           </a:p>
@@ -7891,10 +8588,10 @@
       </p:sp>
       <p:pic>
         <p:nvPicPr>
-          <p:cNvPr id="5" name="Picture 4">
-            <a:extLst>
-              <a:ext uri="{FF2B5EF4-FFF2-40B4-BE49-F238E27FC236}">
-                <a16:creationId xmlns:a16="http://schemas.microsoft.com/office/drawing/2014/main" id="{0DF7ABB5-B742-403B-B0D7-788DBF5FC18B}"/>
+          <p:cNvPr id="4" name="Picture 3">
+            <a:extLst>
+              <a:ext uri="{FF2B5EF4-FFF2-40B4-BE49-F238E27FC236}">
+                <a16:creationId xmlns:a16="http://schemas.microsoft.com/office/drawing/2014/main" id="{0F2DEAF8-160D-4007-9BCC-2167920C2205}"/>
               </a:ext>
             </a:extLst>
           </p:cNvPr>
@@ -7911,8 +8608,8 @@
         </p:blipFill>
         <p:spPr>
           <a:xfrm>
-            <a:off x="6453645" y="771710"/>
-            <a:ext cx="4229302" cy="2108223"/>
+            <a:off x="6601383" y="1444424"/>
+            <a:ext cx="5018381" cy="3221579"/>
           </a:xfrm>
           <a:prstGeom prst="rect">
             <a:avLst/>
@@ -7921,10 +8618,10 @@
       </p:pic>
       <p:pic>
         <p:nvPicPr>
-          <p:cNvPr id="8" name="Picture 7">
-            <a:extLst>
-              <a:ext uri="{FF2B5EF4-FFF2-40B4-BE49-F238E27FC236}">
-                <a16:creationId xmlns:a16="http://schemas.microsoft.com/office/drawing/2014/main" id="{6DF1CEAC-E4D4-495F-B02A-8032304FE90C}"/>
+          <p:cNvPr id="10" name="Picture 9">
+            <a:extLst>
+              <a:ext uri="{FF2B5EF4-FFF2-40B4-BE49-F238E27FC236}">
+                <a16:creationId xmlns:a16="http://schemas.microsoft.com/office/drawing/2014/main" id="{83DD6D7F-FDAD-4A54-B04E-98C03B2CBF6B}"/>
               </a:ext>
             </a:extLst>
           </p:cNvPr>
@@ -7941,8 +8638,8 @@
         </p:blipFill>
         <p:spPr>
           <a:xfrm>
-            <a:off x="6655425" y="3005916"/>
-            <a:ext cx="3825742" cy="2170158"/>
+            <a:off x="2050991" y="4453790"/>
+            <a:ext cx="2470312" cy="1887191"/>
           </a:xfrm>
           <a:prstGeom prst="rect">
             <a:avLst/>
@@ -8033,7 +8730,20 @@
                 <a:effectLst/>
                 <a:latin typeface="Nunito Sans" pitchFamily="2" charset="0"/>
               </a:rPr>
-              <a:t>Recursion &amp; Backtracking - Introduction</a:t>
+              <a:t>Recursion &amp; Backtracking – </a:t>
+            </a:r>
+            <a:r>
+              <a:rPr lang="en-IN" b="1" dirty="0">
+                <a:latin typeface="Nunito Sans" pitchFamily="2" charset="0"/>
+              </a:rPr>
+              <a:t>Convert iterative to recursive</a:t>
+            </a:r>
+            <a:r>
+              <a:rPr lang="en-IN" b="1" i="0" dirty="0">
+                <a:effectLst/>
+                <a:latin typeface="Nunito Sans" pitchFamily="2" charset="0"/>
+              </a:rPr>
+              <a:t> </a:t>
             </a:r>
           </a:p>
           <a:p>
@@ -8058,8 +8768,8 @@
         </p:nvSpPr>
         <p:spPr>
           <a:xfrm>
-            <a:off x="447675" y="865841"/>
-            <a:ext cx="10906125" cy="5126318"/>
+            <a:off x="189484" y="895105"/>
+            <a:ext cx="6023309" cy="5368962"/>
           </a:xfrm>
           <a:prstGeom prst="rect">
             <a:avLst/>
@@ -8235,202 +8945,19 @@
           </a:lstStyle>
           <a:p>
             <a:pPr marL="0" indent="0">
-              <a:buFont typeface="Arial" panose="020B0604020202020204" pitchFamily="34" charset="0"/>
-              <a:buNone/>
-            </a:pPr>
-            <a:r>
-              <a:rPr lang="en-US" sz="1000" b="1" dirty="0">
-                <a:solidFill>
-                  <a:srgbClr val="3D3D4E"/>
-                </a:solidFill>
-                <a:highlight>
-                  <a:srgbClr val="FFFF00"/>
-                </a:highlight>
-                <a:latin typeface="Century Gothic" panose="020B0502020202020204" pitchFamily="34" charset="0"/>
-              </a:rPr>
-              <a:t>Recursion:</a:t>
-            </a:r>
-          </a:p>
-          <a:p>
-            <a:pPr marL="0" indent="0">
-              <a:buNone/>
-            </a:pPr>
-            <a:r>
-              <a:rPr lang="en-US" sz="1000" b="1" i="0" dirty="0">
-                <a:effectLst/>
-                <a:latin typeface="Century Gothic" panose="020B0502020202020204" pitchFamily="34" charset="0"/>
-              </a:rPr>
-              <a:t>Rules for the recursive call</a:t>
-            </a:r>
-          </a:p>
-          <a:p>
-            <a:pPr marL="0" indent="0" algn="l">
-              <a:buNone/>
-            </a:pPr>
-            <a:r>
-              <a:rPr lang="en-US" sz="1000" b="0" i="0" dirty="0">
-                <a:solidFill>
-                  <a:srgbClr val="3D3D4E"/>
-                </a:solidFill>
-                <a:effectLst/>
-                <a:latin typeface="Century Gothic" panose="020B0502020202020204" pitchFamily="34" charset="0"/>
-              </a:rPr>
-              <a:t>we need to make sure the following points:</a:t>
-            </a:r>
-          </a:p>
-          <a:p>
-            <a:pPr algn="l">
-              <a:spcBef>
-                <a:spcPts val="600"/>
-              </a:spcBef>
-              <a:buFont typeface="Wingdings" panose="05000000000000000000" pitchFamily="2" charset="2"/>
-              <a:buChar char="ü"/>
-            </a:pPr>
-            <a:r>
-              <a:rPr lang="en-US" sz="1000" b="0" i="0" dirty="0">
-                <a:solidFill>
-                  <a:srgbClr val="3D3D4E"/>
-                </a:solidFill>
-                <a:effectLst/>
-                <a:latin typeface="Century Gothic" panose="020B0502020202020204" pitchFamily="34" charset="0"/>
-              </a:rPr>
-              <a:t>the problem can be </a:t>
-            </a:r>
-            <a:r>
-              <a:rPr lang="en-US" sz="1000" b="0" i="0" dirty="0">
-                <a:solidFill>
-                  <a:srgbClr val="3D3D4E"/>
-                </a:solidFill>
-                <a:effectLst/>
-                <a:highlight>
-                  <a:srgbClr val="FFFF00"/>
-                </a:highlight>
-                <a:latin typeface="Century Gothic" panose="020B0502020202020204" pitchFamily="34" charset="0"/>
-              </a:rPr>
-              <a:t>broken down into smaller problems of the same type</a:t>
-            </a:r>
-            <a:r>
-              <a:rPr lang="en-US" sz="1000" b="0" i="0" dirty="0">
-                <a:solidFill>
-                  <a:srgbClr val="3D3D4E"/>
-                </a:solidFill>
-                <a:effectLst/>
-                <a:latin typeface="Century Gothic" panose="020B0502020202020204" pitchFamily="34" charset="0"/>
-              </a:rPr>
-              <a:t>,</a:t>
-            </a:r>
-          </a:p>
-          <a:p>
-            <a:pPr algn="l">
-              <a:spcBef>
-                <a:spcPts val="600"/>
-              </a:spcBef>
-              <a:buFont typeface="Wingdings" panose="05000000000000000000" pitchFamily="2" charset="2"/>
-              <a:buChar char="ü"/>
-            </a:pPr>
-            <a:r>
-              <a:rPr lang="en-US" sz="1000" b="0" i="0" dirty="0">
-                <a:solidFill>
-                  <a:srgbClr val="3D3D4E"/>
-                </a:solidFill>
-                <a:effectLst/>
-                <a:latin typeface="Century Gothic" panose="020B0502020202020204" pitchFamily="34" charset="0"/>
-              </a:rPr>
-              <a:t>the </a:t>
-            </a:r>
-            <a:r>
-              <a:rPr lang="en-US" sz="1000" b="0" i="0" dirty="0">
-                <a:solidFill>
-                  <a:srgbClr val="3D3D4E"/>
-                </a:solidFill>
-                <a:effectLst/>
-                <a:highlight>
-                  <a:srgbClr val="FFFF00"/>
-                </a:highlight>
-                <a:latin typeface="Century Gothic" panose="020B0502020202020204" pitchFamily="34" charset="0"/>
-              </a:rPr>
-              <a:t>problem has some base case</a:t>
-            </a:r>
-            <a:r>
-              <a:rPr lang="en-US" sz="1000" b="0" i="0" dirty="0">
-                <a:solidFill>
-                  <a:srgbClr val="3D3D4E"/>
-                </a:solidFill>
-                <a:effectLst/>
-                <a:latin typeface="Century Gothic" panose="020B0502020202020204" pitchFamily="34" charset="0"/>
-              </a:rPr>
-              <a:t>(s),</a:t>
-            </a:r>
-          </a:p>
-          <a:p>
-            <a:pPr algn="l">
-              <a:spcBef>
-                <a:spcPts val="600"/>
-              </a:spcBef>
-              <a:buFont typeface="Wingdings" panose="05000000000000000000" pitchFamily="2" charset="2"/>
-              <a:buChar char="ü"/>
-            </a:pPr>
-            <a:r>
-              <a:rPr lang="en-US" sz="1000" b="0" i="0" dirty="0">
-                <a:solidFill>
-                  <a:srgbClr val="3D3D4E"/>
-                </a:solidFill>
-                <a:effectLst/>
-                <a:latin typeface="Century Gothic" panose="020B0502020202020204" pitchFamily="34" charset="0"/>
-              </a:rPr>
-              <a:t>the </a:t>
-            </a:r>
-            <a:r>
-              <a:rPr lang="en-US" sz="1000" b="0" i="0" dirty="0">
-                <a:solidFill>
-                  <a:srgbClr val="3D3D4E"/>
-                </a:solidFill>
-                <a:effectLst/>
-                <a:highlight>
-                  <a:srgbClr val="FFFF00"/>
-                </a:highlight>
-                <a:latin typeface="Century Gothic" panose="020B0502020202020204" pitchFamily="34" charset="0"/>
-              </a:rPr>
-              <a:t>base case is reached before the stack size limit exceeds</a:t>
-            </a:r>
-            <a:r>
-              <a:rPr lang="en-US" sz="1000" b="0" i="0" dirty="0">
-                <a:solidFill>
-                  <a:srgbClr val="3D3D4E"/>
-                </a:solidFill>
-                <a:effectLst/>
-                <a:latin typeface="Century Gothic" panose="020B0502020202020204" pitchFamily="34" charset="0"/>
-              </a:rPr>
-              <a:t>.</a:t>
-            </a:r>
-          </a:p>
-          <a:p>
-            <a:pPr marL="0" indent="0">
-              <a:buFont typeface="Arial" panose="020B0604020202020204" pitchFamily="34" charset="0"/>
-              <a:buNone/>
-            </a:pPr>
-            <a:endParaRPr lang="en-US" sz="1000" dirty="0">
-              <a:solidFill>
-                <a:srgbClr val="3D3D4E"/>
-              </a:solidFill>
-              <a:latin typeface="Century Gothic" panose="020B0502020202020204" pitchFamily="34" charset="0"/>
-            </a:endParaRPr>
-          </a:p>
-          <a:p>
-            <a:pPr marL="0" indent="0">
+              <a:spcBef>
+                <a:spcPts val="0"/>
+              </a:spcBef>
               <a:buNone/>
             </a:pPr>
             <a:r>
               <a:rPr lang="en-IN" sz="1000" b="1" dirty="0">
                 <a:solidFill>
-                  <a:srgbClr val="3D3D4E"/>
-                </a:solidFill>
-                <a:highlight>
-                  <a:srgbClr val="FFFF00"/>
-                </a:highlight>
-                <a:latin typeface="Century Gothic" panose="020B0502020202020204" pitchFamily="34" charset="0"/>
-              </a:rPr>
-              <a:t>Backtracking</a:t>
+                  <a:srgbClr val="000000"/>
+                </a:solidFill>
+                <a:latin typeface="Century Gothic" panose="020B0502020202020204" pitchFamily="34" charset="0"/>
+              </a:rPr>
+              <a:t>Advantages &amp; Disadvantages</a:t>
             </a:r>
           </a:p>
           <a:p>
@@ -8438,101 +8965,9 @@
               <a:spcBef>
                 <a:spcPts val="0"/>
               </a:spcBef>
-              <a:buFont typeface="Arial" panose="020B0604020202020204" pitchFamily="34" charset="0"/>
-              <a:buNone/>
-            </a:pPr>
-            <a:r>
-              <a:rPr lang="en-US" sz="1000" b="0" i="0" dirty="0">
-                <a:solidFill>
-                  <a:srgbClr val="3D3D4E"/>
-                </a:solidFill>
-                <a:effectLst/>
-                <a:latin typeface="Century Gothic" panose="020B0502020202020204" pitchFamily="34" charset="0"/>
-              </a:rPr>
-              <a:t>Backtracking is an algorithmic paradigm that tries different solutions until a solution is found that works.</a:t>
-            </a:r>
-          </a:p>
-          <a:p>
-            <a:pPr marL="0" indent="0">
-              <a:spcBef>
-                <a:spcPts val="0"/>
-              </a:spcBef>
-              <a:buFont typeface="Arial" panose="020B0604020202020204" pitchFamily="34" charset="0"/>
-              <a:buNone/>
-            </a:pPr>
-            <a:r>
-              <a:rPr lang="en-US" sz="1000" b="0" i="0" dirty="0">
-                <a:solidFill>
-                  <a:srgbClr val="3D3D4E"/>
-                </a:solidFill>
-                <a:effectLst/>
-                <a:latin typeface="Century Gothic" panose="020B0502020202020204" pitchFamily="34" charset="0"/>
-              </a:rPr>
-              <a:t>Problems that are typically solved using the Backtracking technique can only be solved by trying every possible configuration and each configuration is tried only once. </a:t>
-            </a:r>
-            <a:endParaRPr lang="en-US" sz="1000" dirty="0">
-              <a:solidFill>
-                <a:srgbClr val="3D3D4E"/>
-              </a:solidFill>
-              <a:latin typeface="Century Gothic" panose="020B0502020202020204" pitchFamily="34" charset="0"/>
-            </a:endParaRPr>
-          </a:p>
-          <a:p>
-            <a:pPr marL="0" indent="0">
-              <a:spcBef>
-                <a:spcPts val="0"/>
-              </a:spcBef>
-              <a:buFont typeface="Arial" panose="020B0604020202020204" pitchFamily="34" charset="0"/>
-              <a:buNone/>
-            </a:pPr>
-            <a:r>
-              <a:rPr lang="en-US" sz="1000" b="0" i="0" dirty="0">
-                <a:solidFill>
-                  <a:srgbClr val="3D3D4E"/>
-                </a:solidFill>
-                <a:effectLst/>
-                <a:highlight>
-                  <a:srgbClr val="FFFF00"/>
-                </a:highlight>
-                <a:latin typeface="Century Gothic" panose="020B0502020202020204" pitchFamily="34" charset="0"/>
-              </a:rPr>
-              <a:t>We can solve this by using Recursion</a:t>
-            </a:r>
-            <a:r>
-              <a:rPr lang="en-US" sz="1000" b="0" i="0" dirty="0">
-                <a:solidFill>
-                  <a:srgbClr val="3D3D4E"/>
-                </a:solidFill>
-                <a:effectLst/>
-                <a:latin typeface="Century Gothic" panose="020B0502020202020204" pitchFamily="34" charset="0"/>
-              </a:rPr>
-              <a:t>.</a:t>
-            </a:r>
-          </a:p>
-          <a:p>
-            <a:pPr marL="0" indent="0">
-              <a:spcBef>
-                <a:spcPts val="0"/>
-              </a:spcBef>
-              <a:buFont typeface="Arial" panose="020B0604020202020204" pitchFamily="34" charset="0"/>
-              <a:buNone/>
-            </a:pPr>
-            <a:endParaRPr lang="en-US" sz="1000" dirty="0">
-              <a:solidFill>
-                <a:srgbClr val="3D3D4E"/>
-              </a:solidFill>
-              <a:latin typeface="Century Gothic" panose="020B0502020202020204" pitchFamily="34" charset="0"/>
-            </a:endParaRPr>
-          </a:p>
-          <a:p>
-            <a:pPr marL="0" indent="0">
-              <a:spcBef>
-                <a:spcPts val="0"/>
-              </a:spcBef>
-              <a:buFont typeface="Arial" panose="020B0604020202020204" pitchFamily="34" charset="0"/>
-              <a:buNone/>
-            </a:pPr>
-            <a:endParaRPr lang="en-US" sz="1000" b="0" i="0" dirty="0">
+              <a:buNone/>
+            </a:pPr>
+            <a:endParaRPr lang="en-US" sz="1000" b="1" i="0" dirty="0">
               <a:solidFill>
                 <a:srgbClr val="3D3D4E"/>
               </a:solidFill>
@@ -8545,10 +8980,26 @@
               <a:spcBef>
                 <a:spcPts val="0"/>
               </a:spcBef>
-              <a:buFont typeface="Arial" panose="020B0604020202020204" pitchFamily="34" charset="0"/>
-              <a:buNone/>
-            </a:pPr>
-            <a:endParaRPr lang="en-US" sz="1000" dirty="0">
+              <a:buNone/>
+            </a:pPr>
+            <a:r>
+              <a:rPr lang="en-US" sz="1000" b="1" dirty="0">
+                <a:solidFill>
+                  <a:srgbClr val="3D3D4E"/>
+                </a:solidFill>
+                <a:latin typeface="Century Gothic" panose="020B0502020202020204" pitchFamily="34" charset="0"/>
+              </a:rPr>
+              <a:t>Iteration to Recursive</a:t>
+            </a:r>
+          </a:p>
+          <a:p>
+            <a:pPr marL="0" indent="0">
+              <a:spcBef>
+                <a:spcPts val="0"/>
+              </a:spcBef>
+              <a:buNone/>
+            </a:pPr>
+            <a:endParaRPr lang="en-US" sz="1000" b="1" dirty="0">
               <a:solidFill>
                 <a:srgbClr val="3D3D4E"/>
               </a:solidFill>
@@ -8560,25 +9011,58 @@
               <a:spcBef>
                 <a:spcPts val="0"/>
               </a:spcBef>
-              <a:buFont typeface="Arial" panose="020B0604020202020204" pitchFamily="34" charset="0"/>
-              <a:buNone/>
-            </a:pPr>
-            <a:endParaRPr lang="en-US" sz="1000" dirty="0">
+              <a:buNone/>
+            </a:pPr>
+            <a:r>
+              <a:rPr lang="en-IN" sz="1000" dirty="0">
+                <a:solidFill>
+                  <a:srgbClr val="000000"/>
+                </a:solidFill>
+                <a:latin typeface="Century Gothic" panose="020B0502020202020204" pitchFamily="34" charset="0"/>
+              </a:rPr>
+              <a:t>Let’s learn this with example.</a:t>
+            </a:r>
+          </a:p>
+          <a:p>
+            <a:pPr marL="0" indent="0">
+              <a:spcBef>
+                <a:spcPts val="0"/>
+              </a:spcBef>
+              <a:buNone/>
+            </a:pPr>
+            <a:endParaRPr lang="en-IN" sz="1000">
+              <a:solidFill>
+                <a:srgbClr val="000000"/>
+              </a:solidFill>
+              <a:latin typeface="Century Gothic" panose="020B0502020202020204" pitchFamily="34" charset="0"/>
+            </a:endParaRPr>
+          </a:p>
+          <a:p>
+            <a:pPr marL="0" indent="0">
+              <a:spcBef>
+                <a:spcPts val="0"/>
+              </a:spcBef>
+              <a:buNone/>
+            </a:pPr>
+            <a:endParaRPr lang="en-IN" sz="1000" dirty="0">
+              <a:solidFill>
+                <a:srgbClr val="000000"/>
+              </a:solidFill>
+              <a:latin typeface="Century Gothic" panose="020B0502020202020204" pitchFamily="34" charset="0"/>
+            </a:endParaRPr>
+          </a:p>
+          <a:p>
+            <a:pPr marL="0" indent="0">
+              <a:spcBef>
+                <a:spcPts val="0"/>
+              </a:spcBef>
+              <a:buNone/>
+            </a:pPr>
+            <a:endParaRPr lang="en-US" sz="1000" i="0" dirty="0">
               <a:solidFill>
                 <a:srgbClr val="3D3D4E"/>
               </a:solidFill>
-              <a:latin typeface="Century Gothic" panose="020B0502020202020204" pitchFamily="34" charset="0"/>
-            </a:endParaRPr>
-          </a:p>
-          <a:p>
-            <a:pPr marL="0" indent="0">
-              <a:buFont typeface="Arial" panose="020B0604020202020204" pitchFamily="34" charset="0"/>
-              <a:buNone/>
-            </a:pPr>
-            <a:endParaRPr lang="en-US" sz="1000" dirty="0">
-              <a:solidFill>
-                <a:srgbClr val="3D3D4E"/>
-              </a:solidFill>
+              <a:effectLst/>
               <a:latin typeface="Century Gothic" panose="020B0502020202020204" pitchFamily="34" charset="0"/>
             </a:endParaRPr>
           </a:p>
@@ -8641,6 +9125,695 @@
     </p:spTree>
     <p:extLst>
       <p:ext uri="{BB962C8B-B14F-4D97-AF65-F5344CB8AC3E}">
+        <p14:creationId xmlns:p14="http://schemas.microsoft.com/office/powerpoint/2010/main" val="445213602"/>
+      </p:ext>
+    </p:extLst>
+  </p:cSld>
+  <p:clrMapOvr>
+    <a:masterClrMapping/>
+  </p:clrMapOvr>
+</p:sld>
+</file>
+
+<file path=ppt/slides/slide7.xml><?xml version="1.0" encoding="utf-8"?>
+<p:sld xmlns:a="http://schemas.openxmlformats.org/drawingml/2006/main" xmlns:r="http://schemas.openxmlformats.org/officeDocument/2006/relationships" xmlns:p="http://schemas.openxmlformats.org/presentationml/2006/main">
+  <p:cSld>
+    <p:spTree>
+      <p:nvGrpSpPr>
+        <p:cNvPr id="1" name=""/>
+        <p:cNvGrpSpPr/>
+        <p:nvPr/>
+      </p:nvGrpSpPr>
+      <p:grpSpPr>
+        <a:xfrm>
+          <a:off x="0" y="0"/>
+          <a:ext cx="0" cy="0"/>
+          <a:chOff x="0" y="0"/>
+          <a:chExt cx="0" cy="0"/>
+        </a:xfrm>
+      </p:grpSpPr>
+      <p:sp>
+        <p:nvSpPr>
+          <p:cNvPr id="6" name="Rectangle 5">
+            <a:extLst>
+              <a:ext uri="{FF2B5EF4-FFF2-40B4-BE49-F238E27FC236}">
+                <a16:creationId xmlns:a16="http://schemas.microsoft.com/office/drawing/2014/main" id="{23D9A284-E705-4058-BC97-E411758071E2}"/>
+              </a:ext>
+            </a:extLst>
+          </p:cNvPr>
+          <p:cNvSpPr/>
+          <p:nvPr/>
+        </p:nvSpPr>
+        <p:spPr>
+          <a:xfrm>
+            <a:off x="0" y="0"/>
+            <a:ext cx="12192000" cy="623843"/>
+          </a:xfrm>
+          <a:prstGeom prst="rect">
+            <a:avLst/>
+          </a:prstGeom>
+        </p:spPr>
+        <p:style>
+          <a:lnRef idx="2">
+            <a:schemeClr val="accent1">
+              <a:shade val="50000"/>
+            </a:schemeClr>
+          </a:lnRef>
+          <a:fillRef idx="1">
+            <a:schemeClr val="accent1"/>
+          </a:fillRef>
+          <a:effectRef idx="0">
+            <a:schemeClr val="accent1"/>
+          </a:effectRef>
+          <a:fontRef idx="minor">
+            <a:schemeClr val="lt1"/>
+          </a:fontRef>
+        </p:style>
+        <p:txBody>
+          <a:bodyPr rtlCol="0" anchor="ctr"/>
+          <a:lstStyle/>
+          <a:p>
+            <a:pPr algn="ctr"/>
+            <a:endParaRPr lang="en-IN" b="1" i="0" dirty="0">
+              <a:effectLst/>
+              <a:latin typeface="Nunito Sans" pitchFamily="2" charset="0"/>
+            </a:endParaRPr>
+          </a:p>
+          <a:p>
+            <a:pPr algn="ctr"/>
+            <a:r>
+              <a:rPr lang="en-IN" b="1" i="0" dirty="0">
+                <a:effectLst/>
+                <a:latin typeface="Nunito Sans" pitchFamily="2" charset="0"/>
+              </a:rPr>
+              <a:t>Recursion &amp; Backtracking - Introduction</a:t>
+            </a:r>
+          </a:p>
+          <a:p>
+            <a:pPr algn="ctr"/>
+            <a:endParaRPr lang="en-IN" dirty="0"/>
+          </a:p>
+        </p:txBody>
+      </p:sp>
+      <p:sp>
+        <p:nvSpPr>
+          <p:cNvPr id="9" name="Content Placeholder 7">
+            <a:extLst>
+              <a:ext uri="{FF2B5EF4-FFF2-40B4-BE49-F238E27FC236}">
+                <a16:creationId xmlns:a16="http://schemas.microsoft.com/office/drawing/2014/main" id="{A5D67D54-6D66-4C14-8EAC-A9B924086C06}"/>
+              </a:ext>
+            </a:extLst>
+          </p:cNvPr>
+          <p:cNvSpPr txBox="1">
+            <a:spLocks/>
+          </p:cNvSpPr>
+          <p:nvPr/>
+        </p:nvSpPr>
+        <p:spPr>
+          <a:xfrm>
+            <a:off x="447675" y="865841"/>
+            <a:ext cx="10906125" cy="5126318"/>
+          </a:xfrm>
+          <a:prstGeom prst="rect">
+            <a:avLst/>
+          </a:prstGeom>
+        </p:spPr>
+        <p:txBody>
+          <a:bodyPr vert="horz" lIns="91440" tIns="45720" rIns="91440" bIns="45720" rtlCol="0">
+            <a:normAutofit/>
+          </a:bodyPr>
+          <a:lstStyle>
+            <a:lvl1pPr marL="228600" indent="-228600" algn="l" defTabSz="914400" rtl="0" eaLnBrk="1" latinLnBrk="0" hangingPunct="1">
+              <a:lnSpc>
+                <a:spcPct val="90000"/>
+              </a:lnSpc>
+              <a:spcBef>
+                <a:spcPts val="1000"/>
+              </a:spcBef>
+              <a:buFont typeface="Arial" panose="020B0604020202020204" pitchFamily="34" charset="0"/>
+              <a:buChar char="•"/>
+              <a:defRPr sz="2800" kern="1200">
+                <a:solidFill>
+                  <a:schemeClr val="tx1"/>
+                </a:solidFill>
+                <a:latin typeface="+mn-lt"/>
+                <a:ea typeface="+mn-ea"/>
+                <a:cs typeface="+mn-cs"/>
+              </a:defRPr>
+            </a:lvl1pPr>
+            <a:lvl2pPr marL="685800" indent="-228600" algn="l" defTabSz="914400" rtl="0" eaLnBrk="1" latinLnBrk="0" hangingPunct="1">
+              <a:lnSpc>
+                <a:spcPct val="90000"/>
+              </a:lnSpc>
+              <a:spcBef>
+                <a:spcPts val="500"/>
+              </a:spcBef>
+              <a:buFont typeface="Arial" panose="020B0604020202020204" pitchFamily="34" charset="0"/>
+              <a:buChar char="•"/>
+              <a:defRPr sz="2400" kern="1200">
+                <a:solidFill>
+                  <a:schemeClr val="tx1"/>
+                </a:solidFill>
+                <a:latin typeface="+mn-lt"/>
+                <a:ea typeface="+mn-ea"/>
+                <a:cs typeface="+mn-cs"/>
+              </a:defRPr>
+            </a:lvl2pPr>
+            <a:lvl3pPr marL="1143000" indent="-228600" algn="l" defTabSz="914400" rtl="0" eaLnBrk="1" latinLnBrk="0" hangingPunct="1">
+              <a:lnSpc>
+                <a:spcPct val="90000"/>
+              </a:lnSpc>
+              <a:spcBef>
+                <a:spcPts val="500"/>
+              </a:spcBef>
+              <a:buFont typeface="Arial" panose="020B0604020202020204" pitchFamily="34" charset="0"/>
+              <a:buChar char="•"/>
+              <a:defRPr sz="2000" kern="1200">
+                <a:solidFill>
+                  <a:schemeClr val="tx1"/>
+                </a:solidFill>
+                <a:latin typeface="+mn-lt"/>
+                <a:ea typeface="+mn-ea"/>
+                <a:cs typeface="+mn-cs"/>
+              </a:defRPr>
+            </a:lvl3pPr>
+            <a:lvl4pPr marL="1600200" indent="-228600" algn="l" defTabSz="914400" rtl="0" eaLnBrk="1" latinLnBrk="0" hangingPunct="1">
+              <a:lnSpc>
+                <a:spcPct val="90000"/>
+              </a:lnSpc>
+              <a:spcBef>
+                <a:spcPts val="500"/>
+              </a:spcBef>
+              <a:buFont typeface="Arial" panose="020B0604020202020204" pitchFamily="34" charset="0"/>
+              <a:buChar char="•"/>
+              <a:defRPr sz="1800" kern="1200">
+                <a:solidFill>
+                  <a:schemeClr val="tx1"/>
+                </a:solidFill>
+                <a:latin typeface="+mn-lt"/>
+                <a:ea typeface="+mn-ea"/>
+                <a:cs typeface="+mn-cs"/>
+              </a:defRPr>
+            </a:lvl4pPr>
+            <a:lvl5pPr marL="2057400" indent="-228600" algn="l" defTabSz="914400" rtl="0" eaLnBrk="1" latinLnBrk="0" hangingPunct="1">
+              <a:lnSpc>
+                <a:spcPct val="90000"/>
+              </a:lnSpc>
+              <a:spcBef>
+                <a:spcPts val="500"/>
+              </a:spcBef>
+              <a:buFont typeface="Arial" panose="020B0604020202020204" pitchFamily="34" charset="0"/>
+              <a:buChar char="•"/>
+              <a:defRPr sz="1800" kern="1200">
+                <a:solidFill>
+                  <a:schemeClr val="tx1"/>
+                </a:solidFill>
+                <a:latin typeface="+mn-lt"/>
+                <a:ea typeface="+mn-ea"/>
+                <a:cs typeface="+mn-cs"/>
+              </a:defRPr>
+            </a:lvl5pPr>
+            <a:lvl6pPr marL="2514600" indent="-228600" algn="l" defTabSz="914400" rtl="0" eaLnBrk="1" latinLnBrk="0" hangingPunct="1">
+              <a:lnSpc>
+                <a:spcPct val="90000"/>
+              </a:lnSpc>
+              <a:spcBef>
+                <a:spcPts val="500"/>
+              </a:spcBef>
+              <a:buFont typeface="Arial" panose="020B0604020202020204" pitchFamily="34" charset="0"/>
+              <a:buChar char="•"/>
+              <a:defRPr sz="1800" kern="1200">
+                <a:solidFill>
+                  <a:schemeClr val="tx1"/>
+                </a:solidFill>
+                <a:latin typeface="+mn-lt"/>
+                <a:ea typeface="+mn-ea"/>
+                <a:cs typeface="+mn-cs"/>
+              </a:defRPr>
+            </a:lvl6pPr>
+            <a:lvl7pPr marL="2971800" indent="-228600" algn="l" defTabSz="914400" rtl="0" eaLnBrk="1" latinLnBrk="0" hangingPunct="1">
+              <a:lnSpc>
+                <a:spcPct val="90000"/>
+              </a:lnSpc>
+              <a:spcBef>
+                <a:spcPts val="500"/>
+              </a:spcBef>
+              <a:buFont typeface="Arial" panose="020B0604020202020204" pitchFamily="34" charset="0"/>
+              <a:buChar char="•"/>
+              <a:defRPr sz="1800" kern="1200">
+                <a:solidFill>
+                  <a:schemeClr val="tx1"/>
+                </a:solidFill>
+                <a:latin typeface="+mn-lt"/>
+                <a:ea typeface="+mn-ea"/>
+                <a:cs typeface="+mn-cs"/>
+              </a:defRPr>
+            </a:lvl7pPr>
+            <a:lvl8pPr marL="3429000" indent="-228600" algn="l" defTabSz="914400" rtl="0" eaLnBrk="1" latinLnBrk="0" hangingPunct="1">
+              <a:lnSpc>
+                <a:spcPct val="90000"/>
+              </a:lnSpc>
+              <a:spcBef>
+                <a:spcPts val="500"/>
+              </a:spcBef>
+              <a:buFont typeface="Arial" panose="020B0604020202020204" pitchFamily="34" charset="0"/>
+              <a:buChar char="•"/>
+              <a:defRPr sz="1800" kern="1200">
+                <a:solidFill>
+                  <a:schemeClr val="tx1"/>
+                </a:solidFill>
+                <a:latin typeface="+mn-lt"/>
+                <a:ea typeface="+mn-ea"/>
+                <a:cs typeface="+mn-cs"/>
+              </a:defRPr>
+            </a:lvl8pPr>
+            <a:lvl9pPr marL="3886200" indent="-228600" algn="l" defTabSz="914400" rtl="0" eaLnBrk="1" latinLnBrk="0" hangingPunct="1">
+              <a:lnSpc>
+                <a:spcPct val="90000"/>
+              </a:lnSpc>
+              <a:spcBef>
+                <a:spcPts val="500"/>
+              </a:spcBef>
+              <a:buFont typeface="Arial" panose="020B0604020202020204" pitchFamily="34" charset="0"/>
+              <a:buChar char="•"/>
+              <a:defRPr sz="1800" kern="1200">
+                <a:solidFill>
+                  <a:schemeClr val="tx1"/>
+                </a:solidFill>
+                <a:latin typeface="+mn-lt"/>
+                <a:ea typeface="+mn-ea"/>
+                <a:cs typeface="+mn-cs"/>
+              </a:defRPr>
+            </a:lvl9pPr>
+          </a:lstStyle>
+          <a:p>
+            <a:pPr marL="0" indent="0">
+              <a:buFont typeface="Arial" panose="020B0604020202020204" pitchFamily="34" charset="0"/>
+              <a:buNone/>
+            </a:pPr>
+            <a:r>
+              <a:rPr lang="en-US" sz="1000" b="1" dirty="0">
+                <a:solidFill>
+                  <a:srgbClr val="3D3D4E"/>
+                </a:solidFill>
+                <a:highlight>
+                  <a:srgbClr val="FFFF00"/>
+                </a:highlight>
+                <a:latin typeface="Century Gothic" panose="020B0502020202020204" pitchFamily="34" charset="0"/>
+              </a:rPr>
+              <a:t>Recursion:</a:t>
+            </a:r>
+          </a:p>
+          <a:p>
+            <a:pPr marL="0" indent="0">
+              <a:buNone/>
+            </a:pPr>
+            <a:r>
+              <a:rPr lang="en-US" sz="1000" b="1" i="0" dirty="0">
+                <a:effectLst/>
+                <a:latin typeface="Century Gothic" panose="020B0502020202020204" pitchFamily="34" charset="0"/>
+              </a:rPr>
+              <a:t>Rules for the recursive call</a:t>
+            </a:r>
+          </a:p>
+          <a:p>
+            <a:pPr marL="0" indent="0" algn="l">
+              <a:buNone/>
+            </a:pPr>
+            <a:r>
+              <a:rPr lang="en-US" sz="1000" b="0" i="0" dirty="0">
+                <a:solidFill>
+                  <a:srgbClr val="3D3D4E"/>
+                </a:solidFill>
+                <a:effectLst/>
+                <a:latin typeface="Century Gothic" panose="020B0502020202020204" pitchFamily="34" charset="0"/>
+              </a:rPr>
+              <a:t>we need to make sure the following points:</a:t>
+            </a:r>
+          </a:p>
+          <a:p>
+            <a:pPr algn="l">
+              <a:spcBef>
+                <a:spcPts val="600"/>
+              </a:spcBef>
+              <a:buFont typeface="Wingdings" panose="05000000000000000000" pitchFamily="2" charset="2"/>
+              <a:buChar char="ü"/>
+            </a:pPr>
+            <a:r>
+              <a:rPr lang="en-US" sz="1000" b="0" i="0" dirty="0">
+                <a:solidFill>
+                  <a:srgbClr val="3D3D4E"/>
+                </a:solidFill>
+                <a:effectLst/>
+                <a:latin typeface="Century Gothic" panose="020B0502020202020204" pitchFamily="34" charset="0"/>
+              </a:rPr>
+              <a:t>the problem can be </a:t>
+            </a:r>
+            <a:r>
+              <a:rPr lang="en-US" sz="1000" b="0" i="0" dirty="0">
+                <a:solidFill>
+                  <a:srgbClr val="3D3D4E"/>
+                </a:solidFill>
+                <a:effectLst/>
+                <a:highlight>
+                  <a:srgbClr val="FFFF00"/>
+                </a:highlight>
+                <a:latin typeface="Century Gothic" panose="020B0502020202020204" pitchFamily="34" charset="0"/>
+              </a:rPr>
+              <a:t>broken down into smaller problems of the same type</a:t>
+            </a:r>
+            <a:r>
+              <a:rPr lang="en-US" sz="1000" b="0" i="0" dirty="0">
+                <a:solidFill>
+                  <a:srgbClr val="3D3D4E"/>
+                </a:solidFill>
+                <a:effectLst/>
+                <a:latin typeface="Century Gothic" panose="020B0502020202020204" pitchFamily="34" charset="0"/>
+              </a:rPr>
+              <a:t>,</a:t>
+            </a:r>
+          </a:p>
+          <a:p>
+            <a:pPr algn="l">
+              <a:spcBef>
+                <a:spcPts val="600"/>
+              </a:spcBef>
+              <a:buFont typeface="Wingdings" panose="05000000000000000000" pitchFamily="2" charset="2"/>
+              <a:buChar char="ü"/>
+            </a:pPr>
+            <a:r>
+              <a:rPr lang="en-US" sz="1000" b="0" i="0" dirty="0">
+                <a:solidFill>
+                  <a:srgbClr val="3D3D4E"/>
+                </a:solidFill>
+                <a:effectLst/>
+                <a:latin typeface="Century Gothic" panose="020B0502020202020204" pitchFamily="34" charset="0"/>
+              </a:rPr>
+              <a:t>the </a:t>
+            </a:r>
+            <a:r>
+              <a:rPr lang="en-US" sz="1000" b="0" i="0" dirty="0">
+                <a:solidFill>
+                  <a:srgbClr val="3D3D4E"/>
+                </a:solidFill>
+                <a:effectLst/>
+                <a:highlight>
+                  <a:srgbClr val="FFFF00"/>
+                </a:highlight>
+                <a:latin typeface="Century Gothic" panose="020B0502020202020204" pitchFamily="34" charset="0"/>
+              </a:rPr>
+              <a:t>problem has some base case</a:t>
+            </a:r>
+            <a:r>
+              <a:rPr lang="en-US" sz="1000" b="0" i="0" dirty="0">
+                <a:solidFill>
+                  <a:srgbClr val="3D3D4E"/>
+                </a:solidFill>
+                <a:effectLst/>
+                <a:latin typeface="Century Gothic" panose="020B0502020202020204" pitchFamily="34" charset="0"/>
+              </a:rPr>
+              <a:t>(s),</a:t>
+            </a:r>
+          </a:p>
+          <a:p>
+            <a:pPr algn="l">
+              <a:spcBef>
+                <a:spcPts val="600"/>
+              </a:spcBef>
+              <a:buFont typeface="Wingdings" panose="05000000000000000000" pitchFamily="2" charset="2"/>
+              <a:buChar char="ü"/>
+            </a:pPr>
+            <a:r>
+              <a:rPr lang="en-US" sz="1000" b="0" i="0" dirty="0">
+                <a:solidFill>
+                  <a:srgbClr val="3D3D4E"/>
+                </a:solidFill>
+                <a:effectLst/>
+                <a:latin typeface="Century Gothic" panose="020B0502020202020204" pitchFamily="34" charset="0"/>
+              </a:rPr>
+              <a:t>the </a:t>
+            </a:r>
+            <a:r>
+              <a:rPr lang="en-US" sz="1000" b="0" i="0" dirty="0">
+                <a:solidFill>
+                  <a:srgbClr val="3D3D4E"/>
+                </a:solidFill>
+                <a:effectLst/>
+                <a:highlight>
+                  <a:srgbClr val="FFFF00"/>
+                </a:highlight>
+                <a:latin typeface="Century Gothic" panose="020B0502020202020204" pitchFamily="34" charset="0"/>
+              </a:rPr>
+              <a:t>base case is reached before the stack size limit exceeds</a:t>
+            </a:r>
+            <a:r>
+              <a:rPr lang="en-US" sz="1000" b="0" i="0" dirty="0">
+                <a:solidFill>
+                  <a:srgbClr val="3D3D4E"/>
+                </a:solidFill>
+                <a:effectLst/>
+                <a:latin typeface="Century Gothic" panose="020B0502020202020204" pitchFamily="34" charset="0"/>
+              </a:rPr>
+              <a:t>.</a:t>
+            </a:r>
+          </a:p>
+          <a:p>
+            <a:pPr marL="0" indent="0">
+              <a:buFont typeface="Arial" panose="020B0604020202020204" pitchFamily="34" charset="0"/>
+              <a:buNone/>
+            </a:pPr>
+            <a:endParaRPr lang="en-US" sz="1000" dirty="0">
+              <a:solidFill>
+                <a:srgbClr val="3D3D4E"/>
+              </a:solidFill>
+              <a:latin typeface="Century Gothic" panose="020B0502020202020204" pitchFamily="34" charset="0"/>
+            </a:endParaRPr>
+          </a:p>
+          <a:p>
+            <a:pPr marL="0" indent="0">
+              <a:buNone/>
+            </a:pPr>
+            <a:r>
+              <a:rPr lang="en-IN" sz="1000" b="1" dirty="0">
+                <a:solidFill>
+                  <a:srgbClr val="3D3D4E"/>
+                </a:solidFill>
+                <a:highlight>
+                  <a:srgbClr val="FFFF00"/>
+                </a:highlight>
+                <a:latin typeface="Century Gothic" panose="020B0502020202020204" pitchFamily="34" charset="0"/>
+              </a:rPr>
+              <a:t>Backtracking</a:t>
+            </a:r>
+          </a:p>
+          <a:p>
+            <a:pPr marL="0" indent="0">
+              <a:spcBef>
+                <a:spcPts val="0"/>
+              </a:spcBef>
+              <a:buFont typeface="Arial" panose="020B0604020202020204" pitchFamily="34" charset="0"/>
+              <a:buNone/>
+            </a:pPr>
+            <a:r>
+              <a:rPr lang="en-US" sz="1000" b="0" i="0" dirty="0">
+                <a:solidFill>
+                  <a:srgbClr val="3D3D4E"/>
+                </a:solidFill>
+                <a:effectLst/>
+                <a:latin typeface="Century Gothic" panose="020B0502020202020204" pitchFamily="34" charset="0"/>
+              </a:rPr>
+              <a:t>Backtracking is an algorithmic paradigm that tries different solutions until a solution is found that works.</a:t>
+            </a:r>
+          </a:p>
+          <a:p>
+            <a:pPr marL="0" indent="0">
+              <a:spcBef>
+                <a:spcPts val="0"/>
+              </a:spcBef>
+              <a:buFont typeface="Arial" panose="020B0604020202020204" pitchFamily="34" charset="0"/>
+              <a:buNone/>
+            </a:pPr>
+            <a:r>
+              <a:rPr lang="en-US" sz="1000" b="0" i="0" dirty="0">
+                <a:solidFill>
+                  <a:srgbClr val="3D3D4E"/>
+                </a:solidFill>
+                <a:effectLst/>
+                <a:latin typeface="Century Gothic" panose="020B0502020202020204" pitchFamily="34" charset="0"/>
+              </a:rPr>
+              <a:t>Problems that are typically solved using the Backtracking technique can only be solved by trying every possible configuration and each configuration is tried only once. </a:t>
+            </a:r>
+            <a:endParaRPr lang="en-US" sz="1000" dirty="0">
+              <a:solidFill>
+                <a:srgbClr val="3D3D4E"/>
+              </a:solidFill>
+              <a:latin typeface="Century Gothic" panose="020B0502020202020204" pitchFamily="34" charset="0"/>
+            </a:endParaRPr>
+          </a:p>
+          <a:p>
+            <a:pPr marL="0" indent="0">
+              <a:spcBef>
+                <a:spcPts val="0"/>
+              </a:spcBef>
+              <a:buFont typeface="Arial" panose="020B0604020202020204" pitchFamily="34" charset="0"/>
+              <a:buNone/>
+            </a:pPr>
+            <a:r>
+              <a:rPr lang="en-US" sz="1000" b="0" i="0" dirty="0">
+                <a:solidFill>
+                  <a:srgbClr val="3D3D4E"/>
+                </a:solidFill>
+                <a:effectLst/>
+                <a:highlight>
+                  <a:srgbClr val="FFFF00"/>
+                </a:highlight>
+                <a:latin typeface="Century Gothic" panose="020B0502020202020204" pitchFamily="34" charset="0"/>
+              </a:rPr>
+              <a:t>We can solve this by using Recursion</a:t>
+            </a:r>
+            <a:r>
+              <a:rPr lang="en-US" sz="1000" b="0" i="0" dirty="0">
+                <a:solidFill>
+                  <a:srgbClr val="3D3D4E"/>
+                </a:solidFill>
+                <a:effectLst/>
+                <a:latin typeface="Century Gothic" panose="020B0502020202020204" pitchFamily="34" charset="0"/>
+              </a:rPr>
+              <a:t>.</a:t>
+            </a:r>
+          </a:p>
+          <a:p>
+            <a:pPr marL="0" indent="0">
+              <a:spcBef>
+                <a:spcPts val="0"/>
+              </a:spcBef>
+              <a:buFont typeface="Arial" panose="020B0604020202020204" pitchFamily="34" charset="0"/>
+              <a:buNone/>
+            </a:pPr>
+            <a:endParaRPr lang="en-US" sz="1000" dirty="0">
+              <a:solidFill>
+                <a:srgbClr val="3D3D4E"/>
+              </a:solidFill>
+              <a:latin typeface="Century Gothic" panose="020B0502020202020204" pitchFamily="34" charset="0"/>
+            </a:endParaRPr>
+          </a:p>
+          <a:p>
+            <a:pPr marL="0" indent="0">
+              <a:spcBef>
+                <a:spcPts val="0"/>
+              </a:spcBef>
+              <a:buFont typeface="Arial" panose="020B0604020202020204" pitchFamily="34" charset="0"/>
+              <a:buNone/>
+            </a:pPr>
+            <a:endParaRPr lang="en-US" sz="1000" b="0" i="0" dirty="0">
+              <a:solidFill>
+                <a:srgbClr val="3D3D4E"/>
+              </a:solidFill>
+              <a:effectLst/>
+              <a:latin typeface="Century Gothic" panose="020B0502020202020204" pitchFamily="34" charset="0"/>
+            </a:endParaRPr>
+          </a:p>
+          <a:p>
+            <a:pPr marL="0" indent="0">
+              <a:spcBef>
+                <a:spcPts val="0"/>
+              </a:spcBef>
+              <a:buFont typeface="Arial" panose="020B0604020202020204" pitchFamily="34" charset="0"/>
+              <a:buNone/>
+            </a:pPr>
+            <a:endParaRPr lang="en-US" sz="1000" dirty="0">
+              <a:solidFill>
+                <a:srgbClr val="3D3D4E"/>
+              </a:solidFill>
+              <a:latin typeface="Century Gothic" panose="020B0502020202020204" pitchFamily="34" charset="0"/>
+            </a:endParaRPr>
+          </a:p>
+          <a:p>
+            <a:pPr marL="0" indent="0">
+              <a:spcBef>
+                <a:spcPts val="0"/>
+              </a:spcBef>
+              <a:buFont typeface="Arial" panose="020B0604020202020204" pitchFamily="34" charset="0"/>
+              <a:buNone/>
+            </a:pPr>
+            <a:endParaRPr lang="en-US" sz="1000" dirty="0">
+              <a:solidFill>
+                <a:srgbClr val="3D3D4E"/>
+              </a:solidFill>
+              <a:latin typeface="Century Gothic" panose="020B0502020202020204" pitchFamily="34" charset="0"/>
+            </a:endParaRPr>
+          </a:p>
+          <a:p>
+            <a:pPr marL="0" indent="0">
+              <a:buFont typeface="Arial" panose="020B0604020202020204" pitchFamily="34" charset="0"/>
+              <a:buNone/>
+            </a:pPr>
+            <a:endParaRPr lang="en-US" sz="1000" dirty="0">
+              <a:solidFill>
+                <a:srgbClr val="3D3D4E"/>
+              </a:solidFill>
+              <a:latin typeface="Century Gothic" panose="020B0502020202020204" pitchFamily="34" charset="0"/>
+            </a:endParaRPr>
+          </a:p>
+        </p:txBody>
+      </p:sp>
+      <p:sp>
+        <p:nvSpPr>
+          <p:cNvPr id="2" name="Rectangle 1">
+            <a:extLst>
+              <a:ext uri="{FF2B5EF4-FFF2-40B4-BE49-F238E27FC236}">
+                <a16:creationId xmlns:a16="http://schemas.microsoft.com/office/drawing/2014/main" id="{92FC7832-74DA-4590-8BF7-CB38914B9190}"/>
+              </a:ext>
+            </a:extLst>
+          </p:cNvPr>
+          <p:cNvSpPr/>
+          <p:nvPr/>
+        </p:nvSpPr>
+        <p:spPr>
+          <a:xfrm>
+            <a:off x="101600" y="749826"/>
+            <a:ext cx="11977511" cy="5662263"/>
+          </a:xfrm>
+          <a:prstGeom prst="rect">
+            <a:avLst/>
+          </a:prstGeom>
+          <a:noFill/>
+          <a:ln w="9525" cap="flat" cmpd="sng" algn="ctr">
+            <a:solidFill>
+              <a:schemeClr val="accent3"/>
+            </a:solidFill>
+            <a:prstDash val="solid"/>
+            <a:round/>
+            <a:headEnd type="none" w="med" len="med"/>
+            <a:tailEnd type="none" w="med" len="med"/>
+          </a:ln>
+        </p:spPr>
+        <p:style>
+          <a:lnRef idx="0">
+            <a:scrgbClr r="0" g="0" b="0"/>
+          </a:lnRef>
+          <a:fillRef idx="0">
+            <a:scrgbClr r="0" g="0" b="0"/>
+          </a:fillRef>
+          <a:effectRef idx="0">
+            <a:scrgbClr r="0" g="0" b="0"/>
+          </a:effectRef>
+          <a:fontRef idx="minor">
+            <a:schemeClr val="accent3"/>
+          </a:fontRef>
+        </p:style>
+        <p:txBody>
+          <a:bodyPr rtlCol="0" anchor="ctr"/>
+          <a:lstStyle/>
+          <a:p>
+            <a:pPr algn="ctr"/>
+            <a:endParaRPr lang="en-IN"/>
+          </a:p>
+        </p:txBody>
+      </p:sp>
+    </p:spTree>
+    <p:extLst>
+      <p:ext uri="{BB962C8B-B14F-4D97-AF65-F5344CB8AC3E}">
         <p14:creationId xmlns:p14="http://schemas.microsoft.com/office/powerpoint/2010/main" val="4130892289"/>
       </p:ext>
     </p:extLst>
@@ -8651,7 +9824,7 @@
 </p:sld>
 </file>
 
-<file path=ppt/slides/slide7.xml><?xml version="1.0" encoding="utf-8"?>
+<file path=ppt/slides/slide8.xml><?xml version="1.0" encoding="utf-8"?>
 <p:sld xmlns:a="http://schemas.openxmlformats.org/drawingml/2006/main" xmlns:r="http://schemas.openxmlformats.org/officeDocument/2006/relationships" xmlns:p="http://schemas.openxmlformats.org/presentationml/2006/main">
   <p:cSld>
     <p:spTree>
@@ -10296,7 +11469,7 @@
 </p:sld>
 </file>
 
-<file path=ppt/slides/slide8.xml><?xml version="1.0" encoding="utf-8"?>
+<file path=ppt/slides/slide9.xml><?xml version="1.0" encoding="utf-8"?>
 <p:sld xmlns:a="http://schemas.openxmlformats.org/drawingml/2006/main" xmlns:r="http://schemas.openxmlformats.org/officeDocument/2006/relationships" xmlns:p="http://schemas.openxmlformats.org/presentationml/2006/main">
   <p:cSld>
     <p:spTree>
@@ -10935,741 +12108,6 @@
     <p:extLst>
       <p:ext uri="{BB962C8B-B14F-4D97-AF65-F5344CB8AC3E}">
         <p14:creationId xmlns:p14="http://schemas.microsoft.com/office/powerpoint/2010/main" val="2506123877"/>
-      </p:ext>
-    </p:extLst>
-  </p:cSld>
-  <p:clrMapOvr>
-    <a:masterClrMapping/>
-  </p:clrMapOvr>
-</p:sld>
-</file>
-
-<file path=ppt/slides/slide9.xml><?xml version="1.0" encoding="utf-8"?>
-<p:sld xmlns:a="http://schemas.openxmlformats.org/drawingml/2006/main" xmlns:r="http://schemas.openxmlformats.org/officeDocument/2006/relationships" xmlns:p="http://schemas.openxmlformats.org/presentationml/2006/main">
-  <p:cSld>
-    <p:spTree>
-      <p:nvGrpSpPr>
-        <p:cNvPr id="1" name=""/>
-        <p:cNvGrpSpPr/>
-        <p:nvPr/>
-      </p:nvGrpSpPr>
-      <p:grpSpPr>
-        <a:xfrm>
-          <a:off x="0" y="0"/>
-          <a:ext cx="0" cy="0"/>
-          <a:chOff x="0" y="0"/>
-          <a:chExt cx="0" cy="0"/>
-        </a:xfrm>
-      </p:grpSpPr>
-      <p:sp>
-        <p:nvSpPr>
-          <p:cNvPr id="6" name="Rectangle 5">
-            <a:extLst>
-              <a:ext uri="{FF2B5EF4-FFF2-40B4-BE49-F238E27FC236}">
-                <a16:creationId xmlns:a16="http://schemas.microsoft.com/office/drawing/2014/main" id="{23D9A284-E705-4058-BC97-E411758071E2}"/>
-              </a:ext>
-            </a:extLst>
-          </p:cNvPr>
-          <p:cNvSpPr/>
-          <p:nvPr/>
-        </p:nvSpPr>
-        <p:spPr>
-          <a:xfrm>
-            <a:off x="0" y="0"/>
-            <a:ext cx="12192000" cy="623843"/>
-          </a:xfrm>
-          <a:prstGeom prst="rect">
-            <a:avLst/>
-          </a:prstGeom>
-        </p:spPr>
-        <p:style>
-          <a:lnRef idx="2">
-            <a:schemeClr val="accent1">
-              <a:shade val="50000"/>
-            </a:schemeClr>
-          </a:lnRef>
-          <a:fillRef idx="1">
-            <a:schemeClr val="accent1"/>
-          </a:fillRef>
-          <a:effectRef idx="0">
-            <a:schemeClr val="accent1"/>
-          </a:effectRef>
-          <a:fontRef idx="minor">
-            <a:schemeClr val="lt1"/>
-          </a:fontRef>
-        </p:style>
-        <p:txBody>
-          <a:bodyPr rtlCol="0" anchor="ctr"/>
-          <a:lstStyle/>
-          <a:p>
-            <a:pPr algn="ctr"/>
-            <a:endParaRPr lang="en-IN" b="1" i="0" dirty="0">
-              <a:effectLst/>
-              <a:latin typeface="Nunito Sans" pitchFamily="2" charset="0"/>
-            </a:endParaRPr>
-          </a:p>
-          <a:p>
-            <a:pPr algn="ctr"/>
-            <a:r>
-              <a:rPr lang="en-IN" b="1" dirty="0">
-                <a:latin typeface="Nunito Sans" pitchFamily="2" charset="0"/>
-              </a:rPr>
-              <a:t>Problem – N Queens problem</a:t>
-            </a:r>
-            <a:endParaRPr lang="en-IN" b="1" i="0" dirty="0">
-              <a:effectLst/>
-              <a:latin typeface="Nunito Sans" pitchFamily="2" charset="0"/>
-            </a:endParaRPr>
-          </a:p>
-          <a:p>
-            <a:pPr algn="ctr"/>
-            <a:endParaRPr lang="en-IN" dirty="0"/>
-          </a:p>
-        </p:txBody>
-      </p:sp>
-      <p:sp>
-        <p:nvSpPr>
-          <p:cNvPr id="2" name="Rectangle 1">
-            <a:extLst>
-              <a:ext uri="{FF2B5EF4-FFF2-40B4-BE49-F238E27FC236}">
-                <a16:creationId xmlns:a16="http://schemas.microsoft.com/office/drawing/2014/main" id="{92FC7832-74DA-4590-8BF7-CB38914B9190}"/>
-              </a:ext>
-            </a:extLst>
-          </p:cNvPr>
-          <p:cNvSpPr/>
-          <p:nvPr/>
-        </p:nvSpPr>
-        <p:spPr>
-          <a:xfrm>
-            <a:off x="101600" y="749826"/>
-            <a:ext cx="11977511" cy="5662263"/>
-          </a:xfrm>
-          <a:prstGeom prst="rect">
-            <a:avLst/>
-          </a:prstGeom>
-          <a:noFill/>
-          <a:ln w="9525" cap="flat" cmpd="sng" algn="ctr">
-            <a:solidFill>
-              <a:schemeClr val="accent3"/>
-            </a:solidFill>
-            <a:prstDash val="solid"/>
-            <a:round/>
-            <a:headEnd type="none" w="med" len="med"/>
-            <a:tailEnd type="none" w="med" len="med"/>
-          </a:ln>
-        </p:spPr>
-        <p:style>
-          <a:lnRef idx="0">
-            <a:scrgbClr r="0" g="0" b="0"/>
-          </a:lnRef>
-          <a:fillRef idx="0">
-            <a:scrgbClr r="0" g="0" b="0"/>
-          </a:fillRef>
-          <a:effectRef idx="0">
-            <a:scrgbClr r="0" g="0" b="0"/>
-          </a:effectRef>
-          <a:fontRef idx="minor">
-            <a:schemeClr val="accent3"/>
-          </a:fontRef>
-        </p:style>
-        <p:txBody>
-          <a:bodyPr rtlCol="0" anchor="ctr"/>
-          <a:lstStyle/>
-          <a:p>
-            <a:pPr algn="ctr"/>
-            <a:endParaRPr lang="en-IN"/>
-          </a:p>
-        </p:txBody>
-      </p:sp>
-      <p:sp>
-        <p:nvSpPr>
-          <p:cNvPr id="13" name="TextBox 12">
-            <a:extLst>
-              <a:ext uri="{FF2B5EF4-FFF2-40B4-BE49-F238E27FC236}">
-                <a16:creationId xmlns:a16="http://schemas.microsoft.com/office/drawing/2014/main" id="{85D22AC9-DFC3-4A6B-A1C9-C6410C69CB95}"/>
-              </a:ext>
-            </a:extLst>
-          </p:cNvPr>
-          <p:cNvSpPr txBox="1"/>
-          <p:nvPr/>
-        </p:nvSpPr>
-        <p:spPr>
-          <a:xfrm>
-            <a:off x="299104" y="965675"/>
-            <a:ext cx="5982056" cy="4955203"/>
-          </a:xfrm>
-          <a:prstGeom prst="rect">
-            <a:avLst/>
-          </a:prstGeom>
-          <a:noFill/>
-        </p:spPr>
-        <p:txBody>
-          <a:bodyPr wrap="square" rtlCol="0">
-            <a:spAutoFit/>
-          </a:bodyPr>
-          <a:lstStyle/>
-          <a:p>
-            <a:r>
-              <a:rPr lang="en-IN" sz="1000" b="1" i="0" dirty="0">
-                <a:solidFill>
-                  <a:srgbClr val="000000"/>
-                </a:solidFill>
-                <a:effectLst/>
-                <a:latin typeface="Century Gothic" panose="020B0502020202020204" pitchFamily="34" charset="0"/>
-              </a:rPr>
-              <a:t>N Queens Problem – Very famous recursive and backtrack problem</a:t>
-            </a:r>
-          </a:p>
-          <a:p>
-            <a:endParaRPr lang="en-IN" sz="1000" dirty="0">
-              <a:solidFill>
-                <a:srgbClr val="008000"/>
-              </a:solidFill>
-              <a:latin typeface="Century Gothic" panose="020B0502020202020204" pitchFamily="34" charset="0"/>
-            </a:endParaRPr>
-          </a:p>
-          <a:p>
-            <a:r>
-              <a:rPr lang="en-IN" sz="1000" dirty="0">
-                <a:solidFill>
-                  <a:srgbClr val="008000"/>
-                </a:solidFill>
-                <a:latin typeface="Century Gothic" panose="020B0502020202020204" pitchFamily="34" charset="0"/>
-              </a:rPr>
-              <a:t>N - Queens Problem</a:t>
-            </a:r>
-            <a:endParaRPr lang="en-IN" sz="1000" dirty="0">
-              <a:solidFill>
-                <a:srgbClr val="000000"/>
-              </a:solidFill>
-              <a:latin typeface="Century Gothic" panose="020B0502020202020204" pitchFamily="34" charset="0"/>
-            </a:endParaRPr>
-          </a:p>
-          <a:p>
-            <a:r>
-              <a:rPr lang="en-IN" sz="1000" dirty="0">
-                <a:solidFill>
-                  <a:srgbClr val="008000"/>
-                </a:solidFill>
-                <a:latin typeface="Century Gothic" panose="020B0502020202020204" pitchFamily="34" charset="0"/>
-              </a:rPr>
-              <a:t>Problem statement</a:t>
-            </a:r>
-            <a:endParaRPr lang="en-IN" sz="1000" dirty="0">
-              <a:solidFill>
-                <a:srgbClr val="000000"/>
-              </a:solidFill>
-              <a:latin typeface="Century Gothic" panose="020B0502020202020204" pitchFamily="34" charset="0"/>
-            </a:endParaRPr>
-          </a:p>
-          <a:p>
-            <a:endParaRPr lang="en-IN" sz="1000" dirty="0">
-              <a:solidFill>
-                <a:srgbClr val="000000"/>
-              </a:solidFill>
-              <a:latin typeface="Century Gothic" panose="020B0502020202020204" pitchFamily="34" charset="0"/>
-            </a:endParaRPr>
-          </a:p>
-          <a:p>
-            <a:r>
-              <a:rPr lang="en-IN" sz="1000" dirty="0">
-                <a:solidFill>
-                  <a:srgbClr val="008000"/>
-                </a:solidFill>
-                <a:latin typeface="Century Gothic" panose="020B0502020202020204" pitchFamily="34" charset="0"/>
-              </a:rPr>
-              <a:t>Problem statement</a:t>
-            </a:r>
-            <a:endParaRPr lang="en-IN" sz="1000" dirty="0">
-              <a:solidFill>
-                <a:srgbClr val="000000"/>
-              </a:solidFill>
-              <a:latin typeface="Century Gothic" panose="020B0502020202020204" pitchFamily="34" charset="0"/>
-            </a:endParaRPr>
-          </a:p>
-          <a:p>
-            <a:r>
-              <a:rPr lang="en-US" sz="1000" dirty="0">
-                <a:solidFill>
-                  <a:srgbClr val="008000"/>
-                </a:solidFill>
-                <a:latin typeface="Century Gothic" panose="020B0502020202020204" pitchFamily="34" charset="0"/>
-              </a:rPr>
-              <a:t>You are given an empty chessboard of size N * N. </a:t>
-            </a:r>
-            <a:endParaRPr lang="en-US" sz="1000" dirty="0">
-              <a:solidFill>
-                <a:srgbClr val="000000"/>
-              </a:solidFill>
-              <a:latin typeface="Century Gothic" panose="020B0502020202020204" pitchFamily="34" charset="0"/>
-            </a:endParaRPr>
-          </a:p>
-          <a:p>
-            <a:endParaRPr lang="en-IN" sz="1000" dirty="0">
-              <a:solidFill>
-                <a:srgbClr val="000000"/>
-              </a:solidFill>
-              <a:latin typeface="Century Gothic" panose="020B0502020202020204" pitchFamily="34" charset="0"/>
-            </a:endParaRPr>
-          </a:p>
-          <a:p>
-            <a:r>
-              <a:rPr lang="en-US" sz="1000" dirty="0">
-                <a:solidFill>
-                  <a:srgbClr val="008000"/>
-                </a:solidFill>
-                <a:latin typeface="Century Gothic" panose="020B0502020202020204" pitchFamily="34" charset="0"/>
-              </a:rPr>
-              <a:t>Find the number of ways to place N queens on the board, </a:t>
-            </a:r>
-            <a:endParaRPr lang="en-US" sz="1000" dirty="0">
-              <a:solidFill>
-                <a:srgbClr val="000000"/>
-              </a:solidFill>
-              <a:latin typeface="Century Gothic" panose="020B0502020202020204" pitchFamily="34" charset="0"/>
-            </a:endParaRPr>
-          </a:p>
-          <a:p>
-            <a:r>
-              <a:rPr lang="en-US" sz="1000" dirty="0">
-                <a:solidFill>
-                  <a:srgbClr val="008000"/>
-                </a:solidFill>
-                <a:latin typeface="Century Gothic" panose="020B0502020202020204" pitchFamily="34" charset="0"/>
-              </a:rPr>
-              <a:t>such that no two queens can kill each other in one move. </a:t>
-            </a:r>
-            <a:endParaRPr lang="en-US" sz="1000" dirty="0">
-              <a:solidFill>
-                <a:srgbClr val="000000"/>
-              </a:solidFill>
-              <a:latin typeface="Century Gothic" panose="020B0502020202020204" pitchFamily="34" charset="0"/>
-            </a:endParaRPr>
-          </a:p>
-          <a:p>
-            <a:r>
-              <a:rPr lang="en-US" sz="1000" dirty="0">
-                <a:solidFill>
-                  <a:srgbClr val="008000"/>
-                </a:solidFill>
-                <a:latin typeface="Century Gothic" panose="020B0502020202020204" pitchFamily="34" charset="0"/>
-              </a:rPr>
-              <a:t>A queen can move vertically, horizontally, and diagonally.</a:t>
-            </a:r>
-            <a:endParaRPr lang="en-US" sz="1000" dirty="0">
-              <a:solidFill>
-                <a:srgbClr val="000000"/>
-              </a:solidFill>
-              <a:latin typeface="Century Gothic" panose="020B0502020202020204" pitchFamily="34" charset="0"/>
-            </a:endParaRPr>
-          </a:p>
-          <a:p>
-            <a:endParaRPr lang="en-IN" sz="1000" dirty="0">
-              <a:solidFill>
-                <a:srgbClr val="000000"/>
-              </a:solidFill>
-              <a:latin typeface="Century Gothic" panose="020B0502020202020204" pitchFamily="34" charset="0"/>
-            </a:endParaRPr>
-          </a:p>
-          <a:p>
-            <a:r>
-              <a:rPr lang="en-IN" sz="1000" dirty="0">
-                <a:solidFill>
-                  <a:srgbClr val="008000"/>
-                </a:solidFill>
-                <a:latin typeface="Century Gothic" panose="020B0502020202020204" pitchFamily="34" charset="0"/>
-              </a:rPr>
-              <a:t>Solution:</a:t>
-            </a:r>
-          </a:p>
-          <a:p>
-            <a:endParaRPr lang="en-IN" sz="1000" dirty="0">
-              <a:solidFill>
-                <a:srgbClr val="000000"/>
-              </a:solidFill>
-              <a:latin typeface="Century Gothic" panose="020B0502020202020204" pitchFamily="34" charset="0"/>
-            </a:endParaRPr>
-          </a:p>
-          <a:p>
-            <a:r>
-              <a:rPr lang="en-IN" sz="1000" dirty="0">
-                <a:solidFill>
-                  <a:srgbClr val="008000"/>
-                </a:solidFill>
-                <a:latin typeface="Century Gothic" panose="020B0502020202020204" pitchFamily="34" charset="0"/>
-              </a:rPr>
-              <a:t>[Backtracking Approach]</a:t>
-            </a:r>
-            <a:endParaRPr lang="en-IN" sz="1000" dirty="0">
-              <a:solidFill>
-                <a:srgbClr val="000000"/>
-              </a:solidFill>
-              <a:latin typeface="Century Gothic" panose="020B0502020202020204" pitchFamily="34" charset="0"/>
-            </a:endParaRPr>
-          </a:p>
-          <a:p>
-            <a:r>
-              <a:rPr lang="en-US" sz="1000" dirty="0">
-                <a:solidFill>
-                  <a:srgbClr val="008000"/>
-                </a:solidFill>
-                <a:latin typeface="Century Gothic" panose="020B0502020202020204" pitchFamily="34" charset="0"/>
-              </a:rPr>
-              <a:t>The idea is to place queens one by one in different columns, starting from the leftmost column.</a:t>
-            </a:r>
-            <a:endParaRPr lang="en-US" sz="1000" dirty="0">
-              <a:solidFill>
-                <a:srgbClr val="000000"/>
-              </a:solidFill>
-              <a:latin typeface="Century Gothic" panose="020B0502020202020204" pitchFamily="34" charset="0"/>
-            </a:endParaRPr>
-          </a:p>
-          <a:p>
-            <a:r>
-              <a:rPr lang="en-US" sz="1000" dirty="0">
-                <a:solidFill>
-                  <a:srgbClr val="008000"/>
-                </a:solidFill>
-                <a:latin typeface="Century Gothic" panose="020B0502020202020204" pitchFamily="34" charset="0"/>
-              </a:rPr>
-              <a:t>When we place a queen in a column, we checked for clashes with already placed queens. </a:t>
-            </a:r>
-            <a:endParaRPr lang="en-US" sz="1000" dirty="0">
-              <a:solidFill>
-                <a:srgbClr val="000000"/>
-              </a:solidFill>
-              <a:latin typeface="Century Gothic" panose="020B0502020202020204" pitchFamily="34" charset="0"/>
-            </a:endParaRPr>
-          </a:p>
-          <a:p>
-            <a:r>
-              <a:rPr lang="en-US" sz="1000" dirty="0">
-                <a:solidFill>
-                  <a:srgbClr val="008000"/>
-                </a:solidFill>
-                <a:latin typeface="Century Gothic" panose="020B0502020202020204" pitchFamily="34" charset="0"/>
-              </a:rPr>
-              <a:t>In the current column, if we find a row for which there is no clash, we mark this row &amp; column</a:t>
-            </a:r>
-            <a:endParaRPr lang="en-US" sz="1000" dirty="0">
-              <a:solidFill>
-                <a:srgbClr val="000000"/>
-              </a:solidFill>
-              <a:latin typeface="Century Gothic" panose="020B0502020202020204" pitchFamily="34" charset="0"/>
-            </a:endParaRPr>
-          </a:p>
-          <a:p>
-            <a:r>
-              <a:rPr lang="en-US" sz="1000" dirty="0">
-                <a:solidFill>
-                  <a:srgbClr val="008000"/>
-                </a:solidFill>
-                <a:latin typeface="Century Gothic" panose="020B0502020202020204" pitchFamily="34" charset="0"/>
-              </a:rPr>
-              <a:t>as part of solution. if we don't find such a row due to clashes, we return false and backtrack.</a:t>
-            </a:r>
-            <a:endParaRPr lang="en-IN" sz="1000" b="1" dirty="0">
-              <a:solidFill>
-                <a:srgbClr val="000000"/>
-              </a:solidFill>
-              <a:latin typeface="Century Gothic" panose="020B0502020202020204" pitchFamily="34" charset="0"/>
-            </a:endParaRPr>
-          </a:p>
-          <a:p>
-            <a:endParaRPr lang="en-IN" sz="1000" b="1" i="0" dirty="0">
-              <a:solidFill>
-                <a:srgbClr val="000000"/>
-              </a:solidFill>
-              <a:effectLst/>
-              <a:latin typeface="Century Gothic" panose="020B0502020202020204" pitchFamily="34" charset="0"/>
-            </a:endParaRPr>
-          </a:p>
-          <a:p>
-            <a:r>
-              <a:rPr lang="en-IN" sz="1000" b="1" i="0" dirty="0">
-                <a:solidFill>
-                  <a:srgbClr val="000000"/>
-                </a:solidFill>
-                <a:effectLst/>
-                <a:latin typeface="Century Gothic" panose="020B0502020202020204" pitchFamily="34" charset="0"/>
-              </a:rPr>
-              <a:t>Code Link : </a:t>
-            </a:r>
-          </a:p>
-          <a:p>
-            <a:endParaRPr lang="en-IN" sz="1000" dirty="0">
-              <a:solidFill>
-                <a:srgbClr val="000000"/>
-              </a:solidFill>
-              <a:latin typeface="Century Gothic" panose="020B0502020202020204" pitchFamily="34" charset="0"/>
-            </a:endParaRPr>
-          </a:p>
-          <a:p>
-            <a:endParaRPr lang="en-IN" sz="1000" b="1" i="0" dirty="0">
-              <a:solidFill>
-                <a:srgbClr val="000000"/>
-              </a:solidFill>
-              <a:effectLst/>
-              <a:latin typeface="Century Gothic" panose="020B0502020202020204" pitchFamily="34" charset="0"/>
-            </a:endParaRPr>
-          </a:p>
-          <a:p>
-            <a:endParaRPr lang="en-US" sz="1000" dirty="0">
-              <a:solidFill>
-                <a:srgbClr val="3D3D4E"/>
-              </a:solidFill>
-              <a:latin typeface="Century Gothic" panose="020B0502020202020204" pitchFamily="34" charset="0"/>
-            </a:endParaRPr>
-          </a:p>
-          <a:p>
-            <a:endParaRPr lang="en-US" sz="1000" dirty="0">
-              <a:solidFill>
-                <a:srgbClr val="3D3D4E"/>
-              </a:solidFill>
-              <a:latin typeface="Century Gothic" panose="020B0502020202020204" pitchFamily="34" charset="0"/>
-            </a:endParaRPr>
-          </a:p>
-          <a:p>
-            <a:endParaRPr lang="en-US" sz="1000" dirty="0">
-              <a:solidFill>
-                <a:srgbClr val="3D3D4E"/>
-              </a:solidFill>
-              <a:latin typeface="Century Gothic" panose="020B0502020202020204" pitchFamily="34" charset="0"/>
-            </a:endParaRPr>
-          </a:p>
-          <a:p>
-            <a:endParaRPr lang="en-US" sz="1000" dirty="0">
-              <a:solidFill>
-                <a:srgbClr val="3D3D4E"/>
-              </a:solidFill>
-              <a:latin typeface="Century Gothic" panose="020B0502020202020204" pitchFamily="34" charset="0"/>
-            </a:endParaRPr>
-          </a:p>
-          <a:p>
-            <a:endParaRPr lang="en-IN" dirty="0"/>
-          </a:p>
-          <a:p>
-            <a:endParaRPr lang="en-IN" dirty="0"/>
-          </a:p>
-        </p:txBody>
-      </p:sp>
-      <p:sp>
-        <p:nvSpPr>
-          <p:cNvPr id="3" name="Rectangle 2">
-            <a:extLst>
-              <a:ext uri="{FF2B5EF4-FFF2-40B4-BE49-F238E27FC236}">
-                <a16:creationId xmlns:a16="http://schemas.microsoft.com/office/drawing/2014/main" id="{F6A7575A-0BA4-4673-99B9-B68ECA40AFA3}"/>
-              </a:ext>
-            </a:extLst>
-          </p:cNvPr>
-          <p:cNvSpPr/>
-          <p:nvPr/>
-        </p:nvSpPr>
-        <p:spPr>
-          <a:xfrm>
-            <a:off x="256374" y="940037"/>
-            <a:ext cx="5913690" cy="4982199"/>
-          </a:xfrm>
-          <a:prstGeom prst="rect">
-            <a:avLst/>
-          </a:prstGeom>
-          <a:solidFill>
-            <a:schemeClr val="accent4">
-              <a:alpha val="50000"/>
-            </a:schemeClr>
-          </a:solidFill>
-          <a:ln>
-            <a:noFill/>
-          </a:ln>
-        </p:spPr>
-        <p:style>
-          <a:lnRef idx="0">
-            <a:scrgbClr r="0" g="0" b="0"/>
-          </a:lnRef>
-          <a:fillRef idx="0">
-            <a:scrgbClr r="0" g="0" b="0"/>
-          </a:fillRef>
-          <a:effectRef idx="0">
-            <a:scrgbClr r="0" g="0" b="0"/>
-          </a:effectRef>
-          <a:fontRef idx="minor">
-            <a:schemeClr val="lt1"/>
-          </a:fontRef>
-        </p:style>
-        <p:txBody>
-          <a:bodyPr rtlCol="0" anchor="ctr"/>
-          <a:lstStyle/>
-          <a:p>
-            <a:pPr algn="ctr"/>
-            <a:endParaRPr lang="en-IN" dirty="0"/>
-          </a:p>
-        </p:txBody>
-      </p:sp>
-      <p:sp>
-        <p:nvSpPr>
-          <p:cNvPr id="10" name="TextBox 9">
-            <a:extLst>
-              <a:ext uri="{FF2B5EF4-FFF2-40B4-BE49-F238E27FC236}">
-                <a16:creationId xmlns:a16="http://schemas.microsoft.com/office/drawing/2014/main" id="{A6CBCF43-9ADC-4F16-888D-6B12DB6EB847}"/>
-              </a:ext>
-            </a:extLst>
-          </p:cNvPr>
-          <p:cNvSpPr txBox="1"/>
-          <p:nvPr/>
-        </p:nvSpPr>
-        <p:spPr>
-          <a:xfrm>
-            <a:off x="6512846" y="991313"/>
-            <a:ext cx="5006885" cy="2339102"/>
-          </a:xfrm>
-          <a:prstGeom prst="rect">
-            <a:avLst/>
-          </a:prstGeom>
-          <a:noFill/>
-        </p:spPr>
-        <p:txBody>
-          <a:bodyPr wrap="square" rtlCol="0">
-            <a:spAutoFit/>
-          </a:bodyPr>
-          <a:lstStyle/>
-          <a:p>
-            <a:r>
-              <a:rPr lang="en-IN" sz="1000" b="1" i="0" dirty="0">
-                <a:solidFill>
-                  <a:srgbClr val="000000"/>
-                </a:solidFill>
-                <a:effectLst/>
-                <a:latin typeface="Nunito Sans" pitchFamily="2" charset="0"/>
-              </a:rPr>
-              <a:t>Rat in a Maze Problem</a:t>
-            </a:r>
-          </a:p>
-          <a:p>
-            <a:r>
-              <a:rPr lang="en-IN" sz="1000" b="1" i="0" dirty="0">
-                <a:effectLst/>
-                <a:latin typeface="Nunito Sans" pitchFamily="2" charset="0"/>
-              </a:rPr>
-              <a:t>Problem statement</a:t>
-            </a:r>
-          </a:p>
-          <a:p>
-            <a:endParaRPr lang="en-IN" sz="1000" b="1" dirty="0">
-              <a:solidFill>
-                <a:srgbClr val="000000"/>
-              </a:solidFill>
-              <a:latin typeface="Nunito Sans" pitchFamily="2" charset="0"/>
-            </a:endParaRPr>
-          </a:p>
-          <a:p>
-            <a:endParaRPr lang="en-IN" sz="1000" b="1" i="0" dirty="0">
-              <a:solidFill>
-                <a:srgbClr val="000000"/>
-              </a:solidFill>
-              <a:effectLst/>
-              <a:latin typeface="Nunito Sans" pitchFamily="2" charset="0"/>
-            </a:endParaRPr>
-          </a:p>
-          <a:p>
-            <a:endParaRPr lang="en-IN" sz="1000" b="1" i="0" dirty="0">
-              <a:solidFill>
-                <a:srgbClr val="000000"/>
-              </a:solidFill>
-              <a:effectLst/>
-              <a:latin typeface="Nunito Sans" pitchFamily="2" charset="0"/>
-            </a:endParaRPr>
-          </a:p>
-          <a:p>
-            <a:endParaRPr lang="en-IN" sz="1000" dirty="0">
-              <a:solidFill>
-                <a:srgbClr val="008000"/>
-              </a:solidFill>
-              <a:latin typeface="Century Gothic" panose="020B0502020202020204" pitchFamily="34" charset="0"/>
-            </a:endParaRPr>
-          </a:p>
-          <a:p>
-            <a:endParaRPr lang="en-IN" sz="1000" b="1" i="0" dirty="0">
-              <a:solidFill>
-                <a:srgbClr val="000000"/>
-              </a:solidFill>
-              <a:effectLst/>
-              <a:latin typeface="Century Gothic" panose="020B0502020202020204" pitchFamily="34" charset="0"/>
-            </a:endParaRPr>
-          </a:p>
-          <a:p>
-            <a:endParaRPr lang="en-US" sz="1000" dirty="0">
-              <a:solidFill>
-                <a:srgbClr val="3D3D4E"/>
-              </a:solidFill>
-              <a:latin typeface="Century Gothic" panose="020B0502020202020204" pitchFamily="34" charset="0"/>
-            </a:endParaRPr>
-          </a:p>
-          <a:p>
-            <a:endParaRPr lang="en-US" sz="1000" dirty="0">
-              <a:solidFill>
-                <a:srgbClr val="3D3D4E"/>
-              </a:solidFill>
-              <a:latin typeface="Century Gothic" panose="020B0502020202020204" pitchFamily="34" charset="0"/>
-            </a:endParaRPr>
-          </a:p>
-          <a:p>
-            <a:endParaRPr lang="en-US" sz="1000" dirty="0">
-              <a:solidFill>
-                <a:srgbClr val="3D3D4E"/>
-              </a:solidFill>
-              <a:latin typeface="Century Gothic" panose="020B0502020202020204" pitchFamily="34" charset="0"/>
-            </a:endParaRPr>
-          </a:p>
-          <a:p>
-            <a:endParaRPr lang="en-US" sz="1000" dirty="0">
-              <a:solidFill>
-                <a:srgbClr val="3D3D4E"/>
-              </a:solidFill>
-              <a:latin typeface="Century Gothic" panose="020B0502020202020204" pitchFamily="34" charset="0"/>
-            </a:endParaRPr>
-          </a:p>
-          <a:p>
-            <a:endParaRPr lang="en-IN" dirty="0"/>
-          </a:p>
-          <a:p>
-            <a:endParaRPr lang="en-IN" dirty="0"/>
-          </a:p>
-        </p:txBody>
-      </p:sp>
-      <p:pic>
-        <p:nvPicPr>
-          <p:cNvPr id="5" name="Picture 4">
-            <a:extLst>
-              <a:ext uri="{FF2B5EF4-FFF2-40B4-BE49-F238E27FC236}">
-                <a16:creationId xmlns:a16="http://schemas.microsoft.com/office/drawing/2014/main" id="{78AC6497-C445-483F-AB59-F12F1269F26A}"/>
-              </a:ext>
-            </a:extLst>
-          </p:cNvPr>
-          <p:cNvPicPr>
-            <a:picLocks noChangeAspect="1"/>
-          </p:cNvPicPr>
-          <p:nvPr/>
-        </p:nvPicPr>
-        <p:blipFill>
-          <a:blip r:embed="rId2"/>
-          <a:stretch>
-            <a:fillRect/>
-          </a:stretch>
-        </p:blipFill>
-        <p:spPr>
-          <a:xfrm>
-            <a:off x="1479054" y="4122028"/>
-            <a:ext cx="3400596" cy="1658671"/>
-          </a:xfrm>
-          <a:prstGeom prst="rect">
-            <a:avLst/>
-          </a:prstGeom>
-        </p:spPr>
-      </p:pic>
-    </p:spTree>
-    <p:extLst>
-      <p:ext uri="{BB962C8B-B14F-4D97-AF65-F5344CB8AC3E}">
-        <p14:creationId xmlns:p14="http://schemas.microsoft.com/office/powerpoint/2010/main" val="3717722501"/>
       </p:ext>
     </p:extLst>
   </p:cSld>

</xml_diff>

<commit_message>
Characterised as Level 01 - Completed
</commit_message>
<xml_diff>
--- a/RecursionAndBacktracking/Recursion_Backtracking.pptx
+++ b/RecursionAndBacktracking/Recursion_Backtracking.pptx
@@ -288,7 +288,7 @@
           <a:p>
             <a:fld id="{BDC0887E-30F6-48B0-B326-7E062E530290}" type="datetimeFigureOut">
               <a:rPr lang="en-IN" smtClean="0"/>
-              <a:t>02-02-2022</a:t>
+              <a:t>06-02-2022</a:t>
             </a:fld>
             <a:endParaRPr lang="en-IN"/>
           </a:p>
@@ -488,7 +488,7 @@
           <a:p>
             <a:fld id="{BDC0887E-30F6-48B0-B326-7E062E530290}" type="datetimeFigureOut">
               <a:rPr lang="en-IN" smtClean="0"/>
-              <a:t>02-02-2022</a:t>
+              <a:t>06-02-2022</a:t>
             </a:fld>
             <a:endParaRPr lang="en-IN"/>
           </a:p>
@@ -698,7 +698,7 @@
           <a:p>
             <a:fld id="{BDC0887E-30F6-48B0-B326-7E062E530290}" type="datetimeFigureOut">
               <a:rPr lang="en-IN" smtClean="0"/>
-              <a:t>02-02-2022</a:t>
+              <a:t>06-02-2022</a:t>
             </a:fld>
             <a:endParaRPr lang="en-IN"/>
           </a:p>
@@ -898,7 +898,7 @@
           <a:p>
             <a:fld id="{BDC0887E-30F6-48B0-B326-7E062E530290}" type="datetimeFigureOut">
               <a:rPr lang="en-IN" smtClean="0"/>
-              <a:t>02-02-2022</a:t>
+              <a:t>06-02-2022</a:t>
             </a:fld>
             <a:endParaRPr lang="en-IN"/>
           </a:p>
@@ -1174,7 +1174,7 @@
           <a:p>
             <a:fld id="{BDC0887E-30F6-48B0-B326-7E062E530290}" type="datetimeFigureOut">
               <a:rPr lang="en-IN" smtClean="0"/>
-              <a:t>02-02-2022</a:t>
+              <a:t>06-02-2022</a:t>
             </a:fld>
             <a:endParaRPr lang="en-IN"/>
           </a:p>
@@ -1442,7 +1442,7 @@
           <a:p>
             <a:fld id="{BDC0887E-30F6-48B0-B326-7E062E530290}" type="datetimeFigureOut">
               <a:rPr lang="en-IN" smtClean="0"/>
-              <a:t>02-02-2022</a:t>
+              <a:t>06-02-2022</a:t>
             </a:fld>
             <a:endParaRPr lang="en-IN"/>
           </a:p>
@@ -1857,7 +1857,7 @@
           <a:p>
             <a:fld id="{BDC0887E-30F6-48B0-B326-7E062E530290}" type="datetimeFigureOut">
               <a:rPr lang="en-IN" smtClean="0"/>
-              <a:t>02-02-2022</a:t>
+              <a:t>06-02-2022</a:t>
             </a:fld>
             <a:endParaRPr lang="en-IN"/>
           </a:p>
@@ -1999,7 +1999,7 @@
           <a:p>
             <a:fld id="{BDC0887E-30F6-48B0-B326-7E062E530290}" type="datetimeFigureOut">
               <a:rPr lang="en-IN" smtClean="0"/>
-              <a:t>02-02-2022</a:t>
+              <a:t>06-02-2022</a:t>
             </a:fld>
             <a:endParaRPr lang="en-IN"/>
           </a:p>
@@ -2112,7 +2112,7 @@
           <a:p>
             <a:fld id="{BDC0887E-30F6-48B0-B326-7E062E530290}" type="datetimeFigureOut">
               <a:rPr lang="en-IN" smtClean="0"/>
-              <a:t>02-02-2022</a:t>
+              <a:t>06-02-2022</a:t>
             </a:fld>
             <a:endParaRPr lang="en-IN"/>
           </a:p>
@@ -2425,7 +2425,7 @@
           <a:p>
             <a:fld id="{BDC0887E-30F6-48B0-B326-7E062E530290}" type="datetimeFigureOut">
               <a:rPr lang="en-IN" smtClean="0"/>
-              <a:t>02-02-2022</a:t>
+              <a:t>06-02-2022</a:t>
             </a:fld>
             <a:endParaRPr lang="en-IN"/>
           </a:p>
@@ -2714,7 +2714,7 @@
           <a:p>
             <a:fld id="{BDC0887E-30F6-48B0-B326-7E062E530290}" type="datetimeFigureOut">
               <a:rPr lang="en-IN" smtClean="0"/>
-              <a:t>02-02-2022</a:t>
+              <a:t>06-02-2022</a:t>
             </a:fld>
             <a:endParaRPr lang="en-IN"/>
           </a:p>
@@ -2957,7 +2957,7 @@
           <a:p>
             <a:fld id="{BDC0887E-30F6-48B0-B326-7E062E530290}" type="datetimeFigureOut">
               <a:rPr lang="en-IN" smtClean="0"/>
-              <a:t>02-02-2022</a:t>
+              <a:t>06-02-2022</a:t>
             </a:fld>
             <a:endParaRPr lang="en-IN"/>
           </a:p>
@@ -3424,11 +3424,18 @@
           <a:p>
             <a:pPr algn="ctr"/>
             <a:r>
+              <a:rPr lang="en-IN" b="1" i="0">
+                <a:effectLst/>
+                <a:latin typeface="Nunito Sans" pitchFamily="2" charset="0"/>
+              </a:rPr>
+              <a:t>Level 01 : Recursion </a:t>
+            </a:r>
+            <a:r>
               <a:rPr lang="en-IN" b="1" i="0" dirty="0">
                 <a:effectLst/>
                 <a:latin typeface="Nunito Sans" pitchFamily="2" charset="0"/>
               </a:rPr>
-              <a:t>Recursion &amp; Backtracking – Fundamentals </a:t>
+              <a:t>&amp; Backtracking – Fundamentals </a:t>
             </a:r>
           </a:p>
           <a:p>

</xml_diff>